<commit_message>
edit to collaborative network based on avenues of overlap between rob and elana
</commit_message>
<xml_diff>
--- a/CollaborativeNetwork.pptx
+++ b/CollaborativeNetwork.pptx
@@ -3646,8 +3646,8 @@
           </p:nvSpPr>
           <p:spPr>
             <a:xfrm rot="16200000">
-              <a:off x="1969040" y="3218377"/>
-              <a:ext cx="1120820" cy="461665"/>
+              <a:off x="1697135" y="3218377"/>
+              <a:ext cx="1664638" cy="461665"/>
             </a:xfrm>
             <a:prstGeom prst="rect">
               <a:avLst/>
@@ -3669,20 +3669,7 @@
                   <a:latin typeface="Arial"/>
                   <a:cs typeface="Arial"/>
                 </a:rPr>
-                <a:t>Sensitivity to</a:t>
-              </a:r>
-            </a:p>
-            <a:p>
-              <a:pPr algn="ctr"/>
-              <a:r>
-                <a:rPr lang="en-US" sz="1200" dirty="0">
-                  <a:solidFill>
-                    <a:srgbClr val="0000FF"/>
-                  </a:solidFill>
-                  <a:latin typeface="Arial"/>
-                  <a:cs typeface="Arial"/>
-                </a:rPr>
-                <a:t>i</a:t>
+                <a:t>Sensitivity </a:t>
               </a:r>
               <a:r>
                 <a:rPr lang="en-US" sz="1200" dirty="0" smtClean="0">
@@ -3692,7 +3679,27 @@
                   <a:latin typeface="Arial"/>
                   <a:cs typeface="Arial"/>
                 </a:rPr>
-                <a:t>nput features</a:t>
+                <a:t>to input</a:t>
+              </a:r>
+              <a:endParaRPr lang="en-US" sz="1200" dirty="0" smtClean="0">
+                <a:solidFill>
+                  <a:srgbClr val="0000FF"/>
+                </a:solidFill>
+                <a:latin typeface="Arial"/>
+                <a:cs typeface="Arial"/>
+              </a:endParaRPr>
+            </a:p>
+            <a:p>
+              <a:pPr algn="ctr"/>
+              <a:r>
+                <a:rPr lang="en-US" sz="1200" dirty="0" smtClean="0">
+                  <a:solidFill>
+                    <a:srgbClr val="0000FF"/>
+                  </a:solidFill>
+                  <a:latin typeface="Arial"/>
+                  <a:cs typeface="Arial"/>
+                </a:rPr>
+                <a:t>features and variance</a:t>
               </a:r>
               <a:endParaRPr lang="en-US" sz="1200" dirty="0">
                 <a:solidFill>
@@ -4389,6 +4396,72 @@
           </a:fontRef>
         </p:style>
       </p:cxnSp>
+      <p:sp>
+        <p:nvSpPr>
+          <p:cNvPr id="25" name="TextBox 24"/>
+          <p:cNvSpPr txBox="1"/>
+          <p:nvPr/>
+        </p:nvSpPr>
+        <p:spPr>
+          <a:xfrm rot="16200000">
+            <a:off x="2559696" y="2787937"/>
+            <a:ext cx="1014370" cy="461665"/>
+          </a:xfrm>
+          <a:prstGeom prst="rect">
+            <a:avLst/>
+          </a:prstGeom>
+          <a:noFill/>
+        </p:spPr>
+        <p:txBody>
+          <a:bodyPr wrap="none" rtlCol="0">
+            <a:spAutoFit/>
+          </a:bodyPr>
+          <a:lstStyle/>
+          <a:p>
+            <a:pPr algn="ctr"/>
+            <a:r>
+              <a:rPr lang="en-US" sz="1200" dirty="0" smtClean="0">
+                <a:solidFill>
+                  <a:srgbClr val="0000FF"/>
+                </a:solidFill>
+                <a:latin typeface="Arial"/>
+                <a:cs typeface="Arial"/>
+              </a:rPr>
+              <a:t>Efficient</a:t>
+            </a:r>
+          </a:p>
+          <a:p>
+            <a:pPr algn="ctr"/>
+            <a:r>
+              <a:rPr lang="en-US" sz="1200" dirty="0">
+                <a:solidFill>
+                  <a:srgbClr val="0000FF"/>
+                </a:solidFill>
+                <a:latin typeface="Arial"/>
+                <a:cs typeface="Arial"/>
+              </a:rPr>
+              <a:t>f</a:t>
+            </a:r>
+            <a:r>
+              <a:rPr lang="en-US" sz="1200" dirty="0" smtClean="0">
+                <a:solidFill>
+                  <a:srgbClr val="0000FF"/>
+                </a:solidFill>
+                <a:latin typeface="Arial"/>
+                <a:cs typeface="Arial"/>
+              </a:rPr>
+              <a:t>actorization</a:t>
+            </a:r>
+            <a:endParaRPr lang="en-US" sz="1200" dirty="0" smtClean="0">
+              <a:solidFill>
+                <a:srgbClr val="0000FF"/>
+              </a:solidFill>
+              <a:latin typeface="Arial"/>
+              <a:cs typeface="Arial"/>
+            </a:endParaRPr>
+          </a:p>
+        </p:txBody>
+      </p:sp>
     </p:spTree>
     <p:extLst>
       <p:ext uri="{BB962C8B-B14F-4D97-AF65-F5344CB8AC3E}">

</xml_diff>

<commit_message>
added interaction on visualization with Garmire group
</commit_message>
<xml_diff>
--- a/CollaborativeNetwork.pptx
+++ b/CollaborativeNetwork.pptx
@@ -288,7 +288,7 @@
           <a:p>
             <a:fld id="{91377481-43A8-5941-AAB2-47ECF08824BE}" type="datetimeFigureOut">
               <a:rPr lang="en-US" smtClean="0"/>
-              <a:t>8/24/17</a:t>
+              <a:t>8/26/17</a:t>
             </a:fld>
             <a:endParaRPr lang="en-US"/>
           </a:p>
@@ -458,7 +458,7 @@
           <a:p>
             <a:fld id="{91377481-43A8-5941-AAB2-47ECF08824BE}" type="datetimeFigureOut">
               <a:rPr lang="en-US" smtClean="0"/>
-              <a:t>8/24/17</a:t>
+              <a:t>8/26/17</a:t>
             </a:fld>
             <a:endParaRPr lang="en-US"/>
           </a:p>
@@ -638,7 +638,7 @@
           <a:p>
             <a:fld id="{91377481-43A8-5941-AAB2-47ECF08824BE}" type="datetimeFigureOut">
               <a:rPr lang="en-US" smtClean="0"/>
-              <a:t>8/24/17</a:t>
+              <a:t>8/26/17</a:t>
             </a:fld>
             <a:endParaRPr lang="en-US"/>
           </a:p>
@@ -808,7 +808,7 @@
           <a:p>
             <a:fld id="{91377481-43A8-5941-AAB2-47ECF08824BE}" type="datetimeFigureOut">
               <a:rPr lang="en-US" smtClean="0"/>
-              <a:t>8/24/17</a:t>
+              <a:t>8/26/17</a:t>
             </a:fld>
             <a:endParaRPr lang="en-US"/>
           </a:p>
@@ -1054,7 +1054,7 @@
           <a:p>
             <a:fld id="{91377481-43A8-5941-AAB2-47ECF08824BE}" type="datetimeFigureOut">
               <a:rPr lang="en-US" smtClean="0"/>
-              <a:t>8/24/17</a:t>
+              <a:t>8/26/17</a:t>
             </a:fld>
             <a:endParaRPr lang="en-US"/>
           </a:p>
@@ -1342,7 +1342,7 @@
           <a:p>
             <a:fld id="{91377481-43A8-5941-AAB2-47ECF08824BE}" type="datetimeFigureOut">
               <a:rPr lang="en-US" smtClean="0"/>
-              <a:t>8/24/17</a:t>
+              <a:t>8/26/17</a:t>
             </a:fld>
             <a:endParaRPr lang="en-US"/>
           </a:p>
@@ -1764,7 +1764,7 @@
           <a:p>
             <a:fld id="{91377481-43A8-5941-AAB2-47ECF08824BE}" type="datetimeFigureOut">
               <a:rPr lang="en-US" smtClean="0"/>
-              <a:t>8/24/17</a:t>
+              <a:t>8/26/17</a:t>
             </a:fld>
             <a:endParaRPr lang="en-US"/>
           </a:p>
@@ -1882,7 +1882,7 @@
           <a:p>
             <a:fld id="{91377481-43A8-5941-AAB2-47ECF08824BE}" type="datetimeFigureOut">
               <a:rPr lang="en-US" smtClean="0"/>
-              <a:t>8/24/17</a:t>
+              <a:t>8/26/17</a:t>
             </a:fld>
             <a:endParaRPr lang="en-US"/>
           </a:p>
@@ -1977,7 +1977,7 @@
           <a:p>
             <a:fld id="{91377481-43A8-5941-AAB2-47ECF08824BE}" type="datetimeFigureOut">
               <a:rPr lang="en-US" smtClean="0"/>
-              <a:t>8/24/17</a:t>
+              <a:t>8/26/17</a:t>
             </a:fld>
             <a:endParaRPr lang="en-US"/>
           </a:p>
@@ -2254,7 +2254,7 @@
           <a:p>
             <a:fld id="{91377481-43A8-5941-AAB2-47ECF08824BE}" type="datetimeFigureOut">
               <a:rPr lang="en-US" smtClean="0"/>
-              <a:t>8/24/17</a:t>
+              <a:t>8/26/17</a:t>
             </a:fld>
             <a:endParaRPr lang="en-US"/>
           </a:p>
@@ -2507,7 +2507,7 @@
           <a:p>
             <a:fld id="{91377481-43A8-5941-AAB2-47ECF08824BE}" type="datetimeFigureOut">
               <a:rPr lang="en-US" smtClean="0"/>
-              <a:t>8/24/17</a:t>
+              <a:t>8/26/17</a:t>
             </a:fld>
             <a:endParaRPr lang="en-US"/>
           </a:p>
@@ -2720,7 +2720,7 @@
           <a:p>
             <a:fld id="{91377481-43A8-5941-AAB2-47ECF08824BE}" type="datetimeFigureOut">
               <a:rPr lang="en-US" smtClean="0"/>
-              <a:t>8/24/17</a:t>
+              <a:t>8/26/17</a:t>
             </a:fld>
             <a:endParaRPr lang="en-US"/>
           </a:p>
@@ -3669,25 +3669,8 @@
                   <a:latin typeface="Arial"/>
                   <a:cs typeface="Arial"/>
                 </a:rPr>
-                <a:t>Sensitivity </a:t>
+                <a:t>Sensitivity to input</a:t>
               </a:r>
-              <a:r>
-                <a:rPr lang="en-US" sz="1200" dirty="0" smtClean="0">
-                  <a:solidFill>
-                    <a:srgbClr val="0000FF"/>
-                  </a:solidFill>
-                  <a:latin typeface="Arial"/>
-                  <a:cs typeface="Arial"/>
-                </a:rPr>
-                <a:t>to input</a:t>
-              </a:r>
-              <a:endParaRPr lang="en-US" sz="1200" dirty="0" smtClean="0">
-                <a:solidFill>
-                  <a:srgbClr val="0000FF"/>
-                </a:solidFill>
-                <a:latin typeface="Arial"/>
-                <a:cs typeface="Arial"/>
-              </a:endParaRPr>
             </a:p>
             <a:p>
               <a:pPr algn="ctr"/>
@@ -4452,16 +4435,50 @@
               </a:rPr>
               <a:t>actorization</a:t>
             </a:r>
-            <a:endParaRPr lang="en-US" sz="1200" dirty="0" smtClean="0">
-              <a:solidFill>
-                <a:srgbClr val="0000FF"/>
-              </a:solidFill>
-              <a:latin typeface="Arial"/>
-              <a:cs typeface="Arial"/>
-            </a:endParaRPr>
-          </a:p>
-        </p:txBody>
-      </p:sp>
+          </a:p>
+        </p:txBody>
+      </p:sp>
+      <p:cxnSp>
+        <p:nvCxnSpPr>
+          <p:cNvPr id="22" name="Straight Arrow Connector 21"/>
+          <p:cNvCxnSpPr>
+            <a:stCxn id="12" idx="2"/>
+          </p:cNvCxnSpPr>
+          <p:nvPr/>
+        </p:nvCxnSpPr>
+        <p:spPr>
+          <a:xfrm flipH="1">
+            <a:off x="3297711" y="4202100"/>
+            <a:ext cx="5053" cy="1396814"/>
+          </a:xfrm>
+          <a:prstGeom prst="straightConnector1">
+            <a:avLst/>
+          </a:prstGeom>
+          <a:ln>
+            <a:solidFill>
+              <a:srgbClr val="0000FF"/>
+            </a:solidFill>
+            <a:prstDash val="dot"/>
+            <a:headEnd type="arrow"/>
+            <a:tailEnd type="arrow"/>
+          </a:ln>
+          <a:effectLst/>
+        </p:spPr>
+        <p:style>
+          <a:lnRef idx="2">
+            <a:schemeClr val="accent1"/>
+          </a:lnRef>
+          <a:fillRef idx="0">
+            <a:schemeClr val="accent1"/>
+          </a:fillRef>
+          <a:effectRef idx="1">
+            <a:schemeClr val="accent1"/>
+          </a:effectRef>
+          <a:fontRef idx="minor">
+            <a:schemeClr val="tx1"/>
+          </a:fontRef>
+        </p:style>
+      </p:cxnSp>
     </p:spTree>
     <p:extLst>
       <p:ext uri="{BB962C8B-B14F-4D97-AF65-F5344CB8AC3E}">

</xml_diff>

<commit_message>
collaboration with Smita Krishnaswamy
</commit_message>
<xml_diff>
--- a/CollaborativeNetwork.pptx
+++ b/CollaborativeNetwork.pptx
@@ -288,7 +288,7 @@
           <a:p>
             <a:fld id="{91377481-43A8-5941-AAB2-47ECF08824BE}" type="datetimeFigureOut">
               <a:rPr lang="en-US" smtClean="0"/>
-              <a:t>8/26/17</a:t>
+              <a:t>8/27/17</a:t>
             </a:fld>
             <a:endParaRPr lang="en-US"/>
           </a:p>
@@ -458,7 +458,7 @@
           <a:p>
             <a:fld id="{91377481-43A8-5941-AAB2-47ECF08824BE}" type="datetimeFigureOut">
               <a:rPr lang="en-US" smtClean="0"/>
-              <a:t>8/26/17</a:t>
+              <a:t>8/27/17</a:t>
             </a:fld>
             <a:endParaRPr lang="en-US"/>
           </a:p>
@@ -638,7 +638,7 @@
           <a:p>
             <a:fld id="{91377481-43A8-5941-AAB2-47ECF08824BE}" type="datetimeFigureOut">
               <a:rPr lang="en-US" smtClean="0"/>
-              <a:t>8/26/17</a:t>
+              <a:t>8/27/17</a:t>
             </a:fld>
             <a:endParaRPr lang="en-US"/>
           </a:p>
@@ -808,7 +808,7 @@
           <a:p>
             <a:fld id="{91377481-43A8-5941-AAB2-47ECF08824BE}" type="datetimeFigureOut">
               <a:rPr lang="en-US" smtClean="0"/>
-              <a:t>8/26/17</a:t>
+              <a:t>8/27/17</a:t>
             </a:fld>
             <a:endParaRPr lang="en-US"/>
           </a:p>
@@ -1054,7 +1054,7 @@
           <a:p>
             <a:fld id="{91377481-43A8-5941-AAB2-47ECF08824BE}" type="datetimeFigureOut">
               <a:rPr lang="en-US" smtClean="0"/>
-              <a:t>8/26/17</a:t>
+              <a:t>8/27/17</a:t>
             </a:fld>
             <a:endParaRPr lang="en-US"/>
           </a:p>
@@ -1342,7 +1342,7 @@
           <a:p>
             <a:fld id="{91377481-43A8-5941-AAB2-47ECF08824BE}" type="datetimeFigureOut">
               <a:rPr lang="en-US" smtClean="0"/>
-              <a:t>8/26/17</a:t>
+              <a:t>8/27/17</a:t>
             </a:fld>
             <a:endParaRPr lang="en-US"/>
           </a:p>
@@ -1764,7 +1764,7 @@
           <a:p>
             <a:fld id="{91377481-43A8-5941-AAB2-47ECF08824BE}" type="datetimeFigureOut">
               <a:rPr lang="en-US" smtClean="0"/>
-              <a:t>8/26/17</a:t>
+              <a:t>8/27/17</a:t>
             </a:fld>
             <a:endParaRPr lang="en-US"/>
           </a:p>
@@ -1882,7 +1882,7 @@
           <a:p>
             <a:fld id="{91377481-43A8-5941-AAB2-47ECF08824BE}" type="datetimeFigureOut">
               <a:rPr lang="en-US" smtClean="0"/>
-              <a:t>8/26/17</a:t>
+              <a:t>8/27/17</a:t>
             </a:fld>
             <a:endParaRPr lang="en-US"/>
           </a:p>
@@ -1977,7 +1977,7 @@
           <a:p>
             <a:fld id="{91377481-43A8-5941-AAB2-47ECF08824BE}" type="datetimeFigureOut">
               <a:rPr lang="en-US" smtClean="0"/>
-              <a:t>8/26/17</a:t>
+              <a:t>8/27/17</a:t>
             </a:fld>
             <a:endParaRPr lang="en-US"/>
           </a:p>
@@ -2254,7 +2254,7 @@
           <a:p>
             <a:fld id="{91377481-43A8-5941-AAB2-47ECF08824BE}" type="datetimeFigureOut">
               <a:rPr lang="en-US" smtClean="0"/>
-              <a:t>8/26/17</a:t>
+              <a:t>8/27/17</a:t>
             </a:fld>
             <a:endParaRPr lang="en-US"/>
           </a:p>
@@ -2507,7 +2507,7 @@
           <a:p>
             <a:fld id="{91377481-43A8-5941-AAB2-47ECF08824BE}" type="datetimeFigureOut">
               <a:rPr lang="en-US" smtClean="0"/>
-              <a:t>8/26/17</a:t>
+              <a:t>8/27/17</a:t>
             </a:fld>
             <a:endParaRPr lang="en-US"/>
           </a:p>
@@ -2720,7 +2720,7 @@
           <a:p>
             <a:fld id="{91377481-43A8-5941-AAB2-47ECF08824BE}" type="datetimeFigureOut">
               <a:rPr lang="en-US" smtClean="0"/>
-              <a:t>8/26/17</a:t>
+              <a:t>8/27/17</a:t>
             </a:fld>
             <a:endParaRPr lang="en-US"/>
           </a:p>
@@ -3213,7 +3213,7 @@
         </p:nvSpPr>
         <p:spPr>
           <a:xfrm rot="16200000">
-            <a:off x="-1101453" y="3177422"/>
+            <a:off x="-1101453" y="3082172"/>
             <a:ext cx="4431209" cy="307777"/>
           </a:xfrm>
           <a:prstGeom prst="rect">
@@ -3331,7 +3331,7 @@
         </p:nvSpPr>
         <p:spPr>
           <a:xfrm>
-            <a:off x="3761720" y="4631756"/>
+            <a:off x="3751357" y="4631756"/>
             <a:ext cx="1910248" cy="523220"/>
           </a:xfrm>
           <a:prstGeom prst="rect">
@@ -3402,8 +3402,8 @@
         </p:nvSpPr>
         <p:spPr>
           <a:xfrm>
-            <a:off x="2932587" y="5735680"/>
-            <a:ext cx="3533264" cy="523220"/>
+            <a:off x="3571689" y="6207372"/>
+            <a:ext cx="2269584" cy="523220"/>
           </a:xfrm>
           <a:prstGeom prst="rect">
             <a:avLst/>
@@ -3427,7 +3427,7 @@
                 <a:latin typeface="Arial"/>
                 <a:cs typeface="Arial"/>
               </a:rPr>
-              <a:t>Visualization, Biologist-facing Interface</a:t>
+              <a:t>Visualization</a:t>
             </a:r>
             <a:endParaRPr lang="en-US" sz="1400" dirty="0" smtClean="0">
               <a:solidFill>
@@ -3475,6 +3475,30 @@
                 <a:latin typeface="Arial"/>
                 <a:cs typeface="Arial"/>
               </a:rPr>
+              <a:t> / </a:t>
+            </a:r>
+            <a:r>
+              <a:rPr lang="en-US" sz="1400" dirty="0" err="1" smtClean="0">
+                <a:solidFill>
+                  <a:schemeClr val="bg1">
+                    <a:lumMod val="50000"/>
+                  </a:schemeClr>
+                </a:solidFill>
+                <a:latin typeface="Arial"/>
+                <a:cs typeface="Arial"/>
+              </a:rPr>
+              <a:t>Krishnaswamy</a:t>
+            </a:r>
+            <a:r>
+              <a:rPr lang="en-US" sz="1400" dirty="0" smtClean="0">
+                <a:solidFill>
+                  <a:schemeClr val="bg1">
+                    <a:lumMod val="50000"/>
+                  </a:schemeClr>
+                </a:solidFill>
+                <a:latin typeface="Arial"/>
+                <a:cs typeface="Arial"/>
+              </a:rPr>
               <a:t>)</a:t>
             </a:r>
             <a:endParaRPr lang="en-US" sz="1400" dirty="0">
@@ -3489,57 +3513,31 @@
           </a:p>
         </p:txBody>
       </p:sp>
-      <p:grpSp>
-        <p:nvGrpSpPr>
-          <p:cNvPr id="54" name="Group 53"/>
-          <p:cNvGrpSpPr/>
+      <p:sp>
+        <p:nvSpPr>
+          <p:cNvPr id="11" name="TextBox 10"/>
+          <p:cNvSpPr txBox="1"/>
           <p:nvPr/>
-        </p:nvGrpSpPr>
-        <p:grpSpPr>
+        </p:nvSpPr>
+        <p:spPr>
           <a:xfrm>
-            <a:off x="1948285" y="1815880"/>
-            <a:ext cx="5729148" cy="2718186"/>
-            <a:chOff x="1948285" y="2245716"/>
-            <a:chExt cx="5729148" cy="2718186"/>
+            <a:off x="5252816" y="3678880"/>
+            <a:ext cx="2130286" cy="523220"/>
           </a:xfrm>
-          <a:effectLst/>
-        </p:grpSpPr>
-        <p:sp>
-          <p:nvSpPr>
-            <p:cNvPr id="11" name="TextBox 10"/>
-            <p:cNvSpPr txBox="1"/>
-            <p:nvPr/>
-          </p:nvSpPr>
-          <p:spPr>
-            <a:xfrm>
-              <a:off x="4958482" y="4108716"/>
-              <a:ext cx="2718951" cy="523220"/>
-            </a:xfrm>
-            <a:prstGeom prst="rect">
-              <a:avLst/>
-            </a:prstGeom>
-            <a:noFill/>
-          </p:spPr>
-          <p:txBody>
-            <a:bodyPr wrap="none" rtlCol="0">
-              <a:spAutoFit/>
-            </a:bodyPr>
-            <a:lstStyle/>
-            <a:p>
-              <a:pPr algn="ctr"/>
-              <a:r>
-                <a:rPr lang="en-US" sz="1400" b="1" dirty="0" smtClean="0">
-                  <a:solidFill>
-                    <a:schemeClr val="bg1">
-                      <a:lumMod val="50000"/>
-                    </a:schemeClr>
-                  </a:solidFill>
-                  <a:latin typeface="Arial"/>
-                  <a:cs typeface="Arial"/>
-                </a:rPr>
-                <a:t>Deep learning / Latent spaces</a:t>
-              </a:r>
-              <a:endParaRPr lang="en-US" sz="1400" dirty="0" smtClean="0">
+          <a:prstGeom prst="rect">
+            <a:avLst/>
+          </a:prstGeom>
+          <a:noFill/>
+        </p:spPr>
+        <p:txBody>
+          <a:bodyPr wrap="none" rtlCol="0">
+            <a:spAutoFit/>
+          </a:bodyPr>
+          <a:lstStyle/>
+          <a:p>
+            <a:pPr algn="ctr"/>
+            <a:r>
+              <a:rPr lang="en-US" sz="1400" b="1" dirty="0" smtClean="0">
                 <a:solidFill>
                   <a:schemeClr val="bg1">
                     <a:lumMod val="50000"/>
@@ -3547,23 +3545,23 @@
                 </a:solidFill>
                 <a:latin typeface="Arial"/>
                 <a:cs typeface="Arial"/>
-              </a:endParaRPr>
-            </a:p>
-            <a:p>
-              <a:pPr algn="ctr"/>
-              <a:r>
-                <a:rPr lang="en-US" sz="1400" dirty="0" smtClean="0">
-                  <a:solidFill>
-                    <a:schemeClr val="bg1">
-                      <a:lumMod val="50000"/>
-                    </a:schemeClr>
-                  </a:solidFill>
-                  <a:latin typeface="Arial"/>
-                  <a:cs typeface="Arial"/>
-                </a:rPr>
-                <a:t>(Greene)</a:t>
-              </a:r>
-              <a:endParaRPr lang="en-US" sz="1400" dirty="0">
+              </a:rPr>
+              <a:t>Gene signatures</a:t>
+            </a:r>
+            <a:endParaRPr lang="en-US" sz="1400" dirty="0" smtClean="0">
+              <a:solidFill>
+                <a:schemeClr val="bg1">
+                  <a:lumMod val="50000"/>
+                </a:schemeClr>
+              </a:solidFill>
+              <a:latin typeface="Arial"/>
+              <a:cs typeface="Arial"/>
+            </a:endParaRPr>
+          </a:p>
+          <a:p>
+            <a:pPr algn="ctr"/>
+            <a:r>
+              <a:rPr lang="en-US" sz="1400" dirty="0" smtClean="0">
                 <a:solidFill>
                   <a:schemeClr val="bg1">
                     <a:lumMod val="50000"/>
@@ -3571,699 +3569,766 @@
                 </a:solidFill>
                 <a:latin typeface="Arial"/>
                 <a:cs typeface="Arial"/>
-              </a:endParaRPr>
-            </a:p>
-          </p:txBody>
-        </p:sp>
-        <p:sp>
-          <p:nvSpPr>
-            <p:cNvPr id="12" name="TextBox 11"/>
-            <p:cNvSpPr txBox="1"/>
-            <p:nvPr/>
-          </p:nvSpPr>
-          <p:spPr>
-            <a:xfrm>
-              <a:off x="1948285" y="4108716"/>
-              <a:ext cx="2708957" cy="523220"/>
-            </a:xfrm>
-            <a:prstGeom prst="rect">
-              <a:avLst/>
-            </a:prstGeom>
-            <a:noFill/>
-          </p:spPr>
-          <p:txBody>
-            <a:bodyPr wrap="none" rtlCol="0">
-              <a:spAutoFit/>
-            </a:bodyPr>
-            <a:lstStyle/>
-            <a:p>
-              <a:pPr algn="ctr"/>
-              <a:r>
-                <a:rPr lang="en-US" sz="1400" b="1" dirty="0" smtClean="0">
-                  <a:solidFill>
-                    <a:srgbClr val="0000FF"/>
-                  </a:solidFill>
-                  <a:latin typeface="Arial"/>
-                  <a:cs typeface="Arial"/>
-                </a:rPr>
-                <a:t>Trajectory / temporal patterns</a:t>
-              </a:r>
-              <a:endParaRPr lang="en-US" sz="1400" dirty="0" smtClean="0">
-                <a:solidFill>
-                  <a:srgbClr val="0000FF"/>
+              </a:rPr>
+              <a:t>(</a:t>
+            </a:r>
+            <a:r>
+              <a:rPr lang="en-US" sz="1400" dirty="0" smtClean="0">
+                <a:solidFill>
+                  <a:schemeClr val="bg1">
+                    <a:lumMod val="50000"/>
+                  </a:schemeClr>
                 </a:solidFill>
                 <a:latin typeface="Arial"/>
                 <a:cs typeface="Arial"/>
-              </a:endParaRPr>
-            </a:p>
-            <a:p>
-              <a:pPr algn="ctr"/>
-              <a:r>
-                <a:rPr lang="en-US" sz="1400" dirty="0" smtClean="0">
-                  <a:solidFill>
-                    <a:srgbClr val="0000FF"/>
-                  </a:solidFill>
-                  <a:latin typeface="Arial"/>
-                  <a:cs typeface="Arial"/>
-                </a:rPr>
-                <a:t>(Fertig)</a:t>
-              </a:r>
-              <a:endParaRPr lang="en-US" sz="1400" dirty="0">
-                <a:solidFill>
-                  <a:srgbClr val="0000FF"/>
+              </a:rPr>
+              <a:t>Greene / </a:t>
+            </a:r>
+            <a:r>
+              <a:rPr lang="en-US" sz="1400" dirty="0" err="1" smtClean="0">
+                <a:solidFill>
+                  <a:schemeClr val="bg1">
+                    <a:lumMod val="50000"/>
+                  </a:schemeClr>
                 </a:solidFill>
                 <a:latin typeface="Arial"/>
                 <a:cs typeface="Arial"/>
-              </a:endParaRPr>
-            </a:p>
-          </p:txBody>
-        </p:sp>
-        <p:sp>
-          <p:nvSpPr>
-            <p:cNvPr id="20" name="TextBox 19"/>
-            <p:cNvSpPr txBox="1"/>
-            <p:nvPr/>
-          </p:nvSpPr>
-          <p:spPr>
-            <a:xfrm rot="16200000">
-              <a:off x="1697135" y="3218377"/>
-              <a:ext cx="1664638" cy="461665"/>
-            </a:xfrm>
-            <a:prstGeom prst="rect">
-              <a:avLst/>
-            </a:prstGeom>
-            <a:noFill/>
-          </p:spPr>
-          <p:txBody>
-            <a:bodyPr wrap="none" rtlCol="0">
-              <a:spAutoFit/>
-            </a:bodyPr>
-            <a:lstStyle/>
-            <a:p>
-              <a:pPr algn="ctr"/>
-              <a:r>
-                <a:rPr lang="en-US" sz="1200" dirty="0" smtClean="0">
-                  <a:solidFill>
-                    <a:srgbClr val="0000FF"/>
-                  </a:solidFill>
-                  <a:latin typeface="Arial"/>
-                  <a:cs typeface="Arial"/>
-                </a:rPr>
-                <a:t>Sensitivity to input</a:t>
-              </a:r>
-            </a:p>
-            <a:p>
-              <a:pPr algn="ctr"/>
-              <a:r>
-                <a:rPr lang="en-US" sz="1200" dirty="0" smtClean="0">
-                  <a:solidFill>
-                    <a:srgbClr val="0000FF"/>
-                  </a:solidFill>
-                  <a:latin typeface="Arial"/>
-                  <a:cs typeface="Arial"/>
-                </a:rPr>
-                <a:t>features and variance</a:t>
-              </a:r>
-              <a:endParaRPr lang="en-US" sz="1200" dirty="0">
-                <a:solidFill>
-                  <a:srgbClr val="0000FF"/>
+              </a:rPr>
+              <a:t>Krisnaswamy</a:t>
+            </a:r>
+            <a:r>
+              <a:rPr lang="en-US" sz="1400" dirty="0" smtClean="0">
+                <a:solidFill>
+                  <a:schemeClr val="bg1">
+                    <a:lumMod val="50000"/>
+                  </a:schemeClr>
                 </a:solidFill>
                 <a:latin typeface="Arial"/>
                 <a:cs typeface="Arial"/>
-              </a:endParaRPr>
-            </a:p>
-          </p:txBody>
-        </p:sp>
-        <p:sp>
-          <p:nvSpPr>
-            <p:cNvPr id="9" name="TextBox 8"/>
-            <p:cNvSpPr txBox="1"/>
-            <p:nvPr/>
-          </p:nvSpPr>
-          <p:spPr>
-            <a:xfrm>
-              <a:off x="2272770" y="2245716"/>
-              <a:ext cx="2059979" cy="523220"/>
-            </a:xfrm>
-            <a:prstGeom prst="rect">
-              <a:avLst/>
-            </a:prstGeom>
-            <a:noFill/>
-          </p:spPr>
-          <p:txBody>
-            <a:bodyPr wrap="none" rtlCol="0">
-              <a:spAutoFit/>
-            </a:bodyPr>
-            <a:lstStyle/>
-            <a:p>
-              <a:pPr algn="ctr"/>
-              <a:r>
-                <a:rPr lang="en-US" sz="1400" b="1" dirty="0" smtClean="0">
-                  <a:solidFill>
-                    <a:schemeClr val="bg1">
-                      <a:lumMod val="50000"/>
-                    </a:schemeClr>
-                  </a:solidFill>
-                  <a:latin typeface="Arial"/>
-                  <a:cs typeface="Arial"/>
-                </a:rPr>
-                <a:t>Feature quantification</a:t>
-              </a:r>
-            </a:p>
-            <a:p>
-              <a:pPr algn="ctr"/>
-              <a:r>
-                <a:rPr lang="en-US" sz="1400" dirty="0" smtClean="0">
-                  <a:solidFill>
-                    <a:schemeClr val="bg1">
-                      <a:lumMod val="50000"/>
-                    </a:schemeClr>
-                  </a:solidFill>
-                  <a:latin typeface="Arial"/>
-                  <a:cs typeface="Arial"/>
-                </a:rPr>
-                <a:t>(</a:t>
-              </a:r>
-              <a:r>
-                <a:rPr lang="en-US" sz="1400" dirty="0" err="1" smtClean="0">
-                  <a:solidFill>
-                    <a:schemeClr val="bg1">
-                      <a:lumMod val="50000"/>
-                    </a:schemeClr>
-                  </a:solidFill>
-                  <a:latin typeface="Arial"/>
-                  <a:cs typeface="Arial"/>
-                </a:rPr>
-                <a:t>Patro</a:t>
-              </a:r>
-              <a:r>
-                <a:rPr lang="en-US" sz="1400" dirty="0" smtClean="0">
-                  <a:solidFill>
-                    <a:schemeClr val="bg1">
-                      <a:lumMod val="50000"/>
-                    </a:schemeClr>
-                  </a:solidFill>
-                  <a:latin typeface="Arial"/>
-                  <a:cs typeface="Arial"/>
-                </a:rPr>
-                <a:t>)</a:t>
-              </a:r>
-              <a:endParaRPr lang="en-US" sz="1400" dirty="0">
-                <a:solidFill>
-                  <a:schemeClr val="bg1">
-                    <a:lumMod val="50000"/>
-                  </a:schemeClr>
+              </a:rPr>
+              <a:t>)</a:t>
+            </a:r>
+            <a:endParaRPr lang="en-US" sz="1400" dirty="0">
+              <a:solidFill>
+                <a:schemeClr val="bg1">
+                  <a:lumMod val="50000"/>
+                </a:schemeClr>
+              </a:solidFill>
+              <a:latin typeface="Arial"/>
+              <a:cs typeface="Arial"/>
+            </a:endParaRPr>
+          </a:p>
+        </p:txBody>
+      </p:sp>
+      <p:sp>
+        <p:nvSpPr>
+          <p:cNvPr id="12" name="TextBox 11"/>
+          <p:cNvSpPr txBox="1"/>
+          <p:nvPr/>
+        </p:nvSpPr>
+        <p:spPr>
+          <a:xfrm>
+            <a:off x="1948285" y="3678880"/>
+            <a:ext cx="2708957" cy="523220"/>
+          </a:xfrm>
+          <a:prstGeom prst="rect">
+            <a:avLst/>
+          </a:prstGeom>
+          <a:noFill/>
+        </p:spPr>
+        <p:txBody>
+          <a:bodyPr wrap="none" rtlCol="0">
+            <a:spAutoFit/>
+          </a:bodyPr>
+          <a:lstStyle/>
+          <a:p>
+            <a:pPr algn="ctr"/>
+            <a:r>
+              <a:rPr lang="en-US" sz="1400" b="1" dirty="0" smtClean="0">
+                <a:solidFill>
+                  <a:srgbClr val="0000FF"/>
                 </a:solidFill>
                 <a:latin typeface="Arial"/>
                 <a:cs typeface="Arial"/>
-              </a:endParaRPr>
-            </a:p>
-          </p:txBody>
-        </p:sp>
-        <p:sp>
-          <p:nvSpPr>
-            <p:cNvPr id="10" name="TextBox 9"/>
-            <p:cNvSpPr txBox="1"/>
-            <p:nvPr/>
-          </p:nvSpPr>
-          <p:spPr>
-            <a:xfrm>
-              <a:off x="5591980" y="2272731"/>
-              <a:ext cx="1451940" cy="523220"/>
-            </a:xfrm>
-            <a:prstGeom prst="rect">
-              <a:avLst/>
-            </a:prstGeom>
-            <a:noFill/>
-          </p:spPr>
-          <p:txBody>
-            <a:bodyPr wrap="none" rtlCol="0">
-              <a:spAutoFit/>
-            </a:bodyPr>
-            <a:lstStyle/>
-            <a:p>
-              <a:pPr algn="ctr"/>
-              <a:r>
-                <a:rPr lang="en-US" sz="1400" b="1" dirty="0" smtClean="0">
-                  <a:solidFill>
-                    <a:schemeClr val="bg1">
-                      <a:lumMod val="50000"/>
-                    </a:schemeClr>
-                  </a:solidFill>
-                  <a:latin typeface="Arial"/>
-                  <a:cs typeface="Arial"/>
-                </a:rPr>
-                <a:t>Image features</a:t>
-              </a:r>
-              <a:endParaRPr lang="en-US" sz="1400" dirty="0" smtClean="0">
-                <a:solidFill>
-                  <a:schemeClr val="bg1">
-                    <a:lumMod val="50000"/>
-                  </a:schemeClr>
-                </a:solidFill>
-                <a:latin typeface="Arial"/>
-                <a:cs typeface="Arial"/>
-              </a:endParaRPr>
-            </a:p>
-            <a:p>
-              <a:pPr algn="ctr"/>
-              <a:r>
-                <a:rPr lang="en-US" sz="1400" dirty="0" smtClean="0">
-                  <a:solidFill>
-                    <a:schemeClr val="bg1">
-                      <a:lumMod val="50000"/>
-                    </a:schemeClr>
-                  </a:solidFill>
-                  <a:latin typeface="Arial"/>
-                  <a:cs typeface="Arial"/>
-                </a:rPr>
-                <a:t>(Raj)</a:t>
-              </a:r>
-              <a:endParaRPr lang="en-US" sz="1400" dirty="0">
-                <a:solidFill>
-                  <a:schemeClr val="bg1">
-                    <a:lumMod val="50000"/>
-                  </a:schemeClr>
-                </a:solidFill>
-                <a:latin typeface="Arial"/>
-                <a:cs typeface="Arial"/>
-              </a:endParaRPr>
-            </a:p>
-          </p:txBody>
-        </p:sp>
-        <p:sp>
-          <p:nvSpPr>
-            <p:cNvPr id="15" name="TextBox 14"/>
-            <p:cNvSpPr txBox="1"/>
-            <p:nvPr/>
-          </p:nvSpPr>
-          <p:spPr>
-            <a:xfrm rot="16200000">
-              <a:off x="6107366" y="3107811"/>
-              <a:ext cx="1142861" cy="646331"/>
-            </a:xfrm>
-            <a:prstGeom prst="rect">
-              <a:avLst/>
-            </a:prstGeom>
-            <a:noFill/>
-          </p:spPr>
-          <p:txBody>
-            <a:bodyPr wrap="none" rtlCol="0">
-              <a:spAutoFit/>
-            </a:bodyPr>
-            <a:lstStyle/>
-            <a:p>
-              <a:pPr algn="ctr"/>
-              <a:r>
-                <a:rPr lang="en-US" sz="1200" dirty="0" smtClean="0">
-                  <a:solidFill>
-                    <a:schemeClr val="bg1">
-                      <a:lumMod val="50000"/>
-                    </a:schemeClr>
-                  </a:solidFill>
-                  <a:latin typeface="Arial"/>
-                  <a:cs typeface="Arial"/>
-                </a:rPr>
-                <a:t>Deep learning</a:t>
-              </a:r>
-            </a:p>
-            <a:p>
-              <a:pPr algn="ctr"/>
-              <a:r>
-                <a:rPr lang="en-US" sz="1200" dirty="0" smtClean="0">
-                  <a:solidFill>
-                    <a:schemeClr val="bg1">
-                      <a:lumMod val="50000"/>
-                    </a:schemeClr>
-                  </a:solidFill>
-                  <a:latin typeface="Arial"/>
-                  <a:cs typeface="Arial"/>
-                </a:rPr>
-                <a:t>/ benchmark</a:t>
-              </a:r>
-            </a:p>
-            <a:p>
-              <a:pPr algn="ctr"/>
-              <a:r>
-                <a:rPr lang="en-US" sz="1200" dirty="0" smtClean="0">
-                  <a:solidFill>
-                    <a:schemeClr val="bg1">
-                      <a:lumMod val="50000"/>
-                    </a:schemeClr>
-                  </a:solidFill>
-                  <a:latin typeface="Arial"/>
-                  <a:cs typeface="Arial"/>
-                </a:rPr>
-                <a:t>data</a:t>
-              </a:r>
-              <a:endParaRPr lang="en-US" sz="1200" dirty="0">
-                <a:solidFill>
-                  <a:schemeClr val="bg1">
-                    <a:lumMod val="50000"/>
-                  </a:schemeClr>
-                </a:solidFill>
-                <a:latin typeface="Arial"/>
-                <a:cs typeface="Arial"/>
-              </a:endParaRPr>
-            </a:p>
-          </p:txBody>
-        </p:sp>
-        <p:cxnSp>
-          <p:nvCxnSpPr>
-            <p:cNvPr id="17" name="Straight Arrow Connector 16"/>
-            <p:cNvCxnSpPr/>
-            <p:nvPr/>
-          </p:nvCxnSpPr>
-          <p:spPr>
-            <a:xfrm>
-              <a:off x="6317950" y="2774594"/>
-              <a:ext cx="1" cy="1312765"/>
-            </a:xfrm>
-            <a:prstGeom prst="straightConnector1">
-              <a:avLst/>
-            </a:prstGeom>
-            <a:ln>
-              <a:solidFill>
-                <a:srgbClr val="A6A6A6"/>
-              </a:solidFill>
-              <a:prstDash val="dot"/>
-              <a:headEnd type="arrow"/>
-              <a:tailEnd type="arrow"/>
-            </a:ln>
-            <a:effectLst/>
-          </p:spPr>
-          <p:style>
-            <a:lnRef idx="2">
-              <a:schemeClr val="accent1"/>
-            </a:lnRef>
-            <a:fillRef idx="0">
-              <a:schemeClr val="accent1"/>
-            </a:fillRef>
-            <a:effectRef idx="1">
-              <a:schemeClr val="accent1"/>
-            </a:effectRef>
-            <a:fontRef idx="minor">
-              <a:schemeClr val="tx1"/>
-            </a:fontRef>
-          </p:style>
-        </p:cxnSp>
-        <p:cxnSp>
-          <p:nvCxnSpPr>
-            <p:cNvPr id="18" name="Straight Arrow Connector 17"/>
-            <p:cNvCxnSpPr/>
-            <p:nvPr/>
-          </p:nvCxnSpPr>
-          <p:spPr>
-            <a:xfrm>
-              <a:off x="2794670" y="2795350"/>
-              <a:ext cx="0" cy="1261102"/>
-            </a:xfrm>
-            <a:prstGeom prst="straightConnector1">
-              <a:avLst/>
-            </a:prstGeom>
-            <a:ln>
+              </a:rPr>
+              <a:t>Trajectory / temporal patterns</a:t>
+            </a:r>
+            <a:endParaRPr lang="en-US" sz="1400" dirty="0" smtClean="0">
               <a:solidFill>
                 <a:srgbClr val="0000FF"/>
               </a:solidFill>
-              <a:prstDash val="dot"/>
-              <a:headEnd type="arrow"/>
-              <a:tailEnd type="arrow"/>
-            </a:ln>
-            <a:effectLst/>
-          </p:spPr>
-          <p:style>
-            <a:lnRef idx="2">
-              <a:schemeClr val="accent1"/>
-            </a:lnRef>
-            <a:fillRef idx="0">
-              <a:schemeClr val="accent1"/>
-            </a:fillRef>
-            <a:effectRef idx="1">
-              <a:schemeClr val="accent1"/>
-            </a:effectRef>
-            <a:fontRef idx="minor">
-              <a:schemeClr val="tx1"/>
-            </a:fontRef>
-          </p:style>
-        </p:cxnSp>
-        <p:cxnSp>
-          <p:nvCxnSpPr>
-            <p:cNvPr id="23" name="Curved Connector 22"/>
-            <p:cNvCxnSpPr>
-              <a:stCxn id="12" idx="0"/>
-              <a:endCxn id="11" idx="0"/>
-            </p:cNvCxnSpPr>
-            <p:nvPr/>
-          </p:nvCxnSpPr>
-          <p:spPr>
-            <a:xfrm rot="5400000" flipH="1" flipV="1">
-              <a:off x="4810361" y="2601119"/>
-              <a:ext cx="12700" cy="3015194"/>
-            </a:xfrm>
-            <a:prstGeom prst="curvedConnector3">
-              <a:avLst>
-                <a:gd name="adj1" fmla="val 1800000"/>
-              </a:avLst>
-            </a:prstGeom>
-            <a:ln>
+              <a:latin typeface="Arial"/>
+              <a:cs typeface="Arial"/>
+            </a:endParaRPr>
+          </a:p>
+          <a:p>
+            <a:pPr algn="ctr"/>
+            <a:r>
+              <a:rPr lang="en-US" sz="1400" dirty="0" smtClean="0">
+                <a:solidFill>
+                  <a:srgbClr val="0000FF"/>
+                </a:solidFill>
+                <a:latin typeface="Arial"/>
+                <a:cs typeface="Arial"/>
+              </a:rPr>
+              <a:t>(Fertig)</a:t>
+            </a:r>
+            <a:endParaRPr lang="en-US" sz="1400" dirty="0">
               <a:solidFill>
                 <a:srgbClr val="0000FF"/>
               </a:solidFill>
-              <a:prstDash val="dot"/>
-              <a:headEnd type="arrow"/>
-              <a:tailEnd type="arrow"/>
-            </a:ln>
-            <a:effectLst/>
-          </p:spPr>
-          <p:style>
-            <a:lnRef idx="2">
-              <a:schemeClr val="accent1"/>
-            </a:lnRef>
-            <a:fillRef idx="0">
-              <a:schemeClr val="accent1"/>
-            </a:fillRef>
-            <a:effectRef idx="1">
-              <a:schemeClr val="accent1"/>
-            </a:effectRef>
-            <a:fontRef idx="minor">
-              <a:schemeClr val="tx1"/>
-            </a:fontRef>
-          </p:style>
-        </p:cxnSp>
-        <p:cxnSp>
-          <p:nvCxnSpPr>
-            <p:cNvPr id="27" name="Straight Arrow Connector 26"/>
-            <p:cNvCxnSpPr>
-              <a:stCxn id="9" idx="2"/>
-              <a:endCxn id="12" idx="0"/>
-            </p:cNvCxnSpPr>
-            <p:nvPr/>
-          </p:nvCxnSpPr>
-          <p:spPr>
-            <a:xfrm>
-              <a:off x="3302760" y="2768936"/>
-              <a:ext cx="4" cy="1339780"/>
-            </a:xfrm>
-            <a:prstGeom prst="straightConnector1">
-              <a:avLst/>
-            </a:prstGeom>
-            <a:ln>
+              <a:latin typeface="Arial"/>
+              <a:cs typeface="Arial"/>
+            </a:endParaRPr>
+          </a:p>
+        </p:txBody>
+      </p:sp>
+      <p:sp>
+        <p:nvSpPr>
+          <p:cNvPr id="20" name="TextBox 19"/>
+          <p:cNvSpPr txBox="1"/>
+          <p:nvPr/>
+        </p:nvSpPr>
+        <p:spPr>
+          <a:xfrm rot="16200000">
+            <a:off x="2221010" y="2613916"/>
+            <a:ext cx="1664638" cy="461665"/>
+          </a:xfrm>
+          <a:prstGeom prst="rect">
+            <a:avLst/>
+          </a:prstGeom>
+          <a:noFill/>
+        </p:spPr>
+        <p:txBody>
+          <a:bodyPr wrap="none" rtlCol="0">
+            <a:spAutoFit/>
+          </a:bodyPr>
+          <a:lstStyle/>
+          <a:p>
+            <a:pPr algn="ctr"/>
+            <a:r>
+              <a:rPr lang="en-US" sz="1200" dirty="0" smtClean="0">
+                <a:solidFill>
+                  <a:srgbClr val="0000FF"/>
+                </a:solidFill>
+                <a:latin typeface="Arial"/>
+                <a:cs typeface="Arial"/>
+              </a:rPr>
+              <a:t>Sensitivity to input</a:t>
+            </a:r>
+          </a:p>
+          <a:p>
+            <a:pPr algn="ctr"/>
+            <a:r>
+              <a:rPr lang="en-US" sz="1200" dirty="0" smtClean="0">
+                <a:solidFill>
+                  <a:srgbClr val="0000FF"/>
+                </a:solidFill>
+                <a:latin typeface="Arial"/>
+                <a:cs typeface="Arial"/>
+              </a:rPr>
+              <a:t>features and variance</a:t>
+            </a:r>
+            <a:endParaRPr lang="en-US" sz="1200" dirty="0">
               <a:solidFill>
                 <a:srgbClr val="0000FF"/>
               </a:solidFill>
-              <a:tailEnd type="arrow"/>
-            </a:ln>
-            <a:effectLst/>
-          </p:spPr>
-          <p:style>
-            <a:lnRef idx="2">
-              <a:schemeClr val="accent1"/>
-            </a:lnRef>
-            <a:fillRef idx="0">
-              <a:schemeClr val="accent1"/>
-            </a:fillRef>
-            <a:effectRef idx="1">
-              <a:schemeClr val="accent1"/>
-            </a:effectRef>
-            <a:fontRef idx="minor">
-              <a:schemeClr val="tx1"/>
-            </a:fontRef>
-          </p:style>
-        </p:cxnSp>
-        <p:cxnSp>
-          <p:nvCxnSpPr>
-            <p:cNvPr id="29" name="Straight Arrow Connector 28"/>
-            <p:cNvCxnSpPr>
-              <a:stCxn id="9" idx="2"/>
-            </p:cNvCxnSpPr>
-            <p:nvPr/>
-          </p:nvCxnSpPr>
-          <p:spPr>
-            <a:xfrm>
-              <a:off x="3302760" y="2768936"/>
-              <a:ext cx="3015190" cy="1233471"/>
-            </a:xfrm>
-            <a:prstGeom prst="straightConnector1">
-              <a:avLst/>
-            </a:prstGeom>
-            <a:ln>
-              <a:solidFill>
-                <a:srgbClr val="A6A6A6"/>
-              </a:solidFill>
-              <a:tailEnd type="arrow"/>
-            </a:ln>
-            <a:effectLst/>
-          </p:spPr>
-          <p:style>
-            <a:lnRef idx="2">
-              <a:schemeClr val="accent1"/>
-            </a:lnRef>
-            <a:fillRef idx="0">
-              <a:schemeClr val="accent1"/>
-            </a:fillRef>
-            <a:effectRef idx="1">
-              <a:schemeClr val="accent1"/>
-            </a:effectRef>
-            <a:fontRef idx="minor">
-              <a:schemeClr val="tx1"/>
-            </a:fontRef>
-          </p:style>
-        </p:cxnSp>
-        <p:sp>
-          <p:nvSpPr>
-            <p:cNvPr id="21" name="TextBox 20"/>
-            <p:cNvSpPr txBox="1"/>
-            <p:nvPr/>
-          </p:nvSpPr>
-          <p:spPr>
-            <a:xfrm>
-              <a:off x="3429605" y="3373947"/>
-              <a:ext cx="1305165" cy="461665"/>
-            </a:xfrm>
-            <a:prstGeom prst="rect">
-              <a:avLst/>
-            </a:prstGeom>
-            <a:noFill/>
-          </p:spPr>
-          <p:txBody>
-            <a:bodyPr wrap="none" rtlCol="0">
-              <a:spAutoFit/>
-            </a:bodyPr>
-            <a:lstStyle/>
-            <a:p>
-              <a:pPr algn="ctr"/>
-              <a:r>
-                <a:rPr lang="en-US" sz="1200" dirty="0" smtClean="0">
-                  <a:solidFill>
-                    <a:srgbClr val="0000FF"/>
-                  </a:solidFill>
-                  <a:latin typeface="Arial"/>
-                  <a:cs typeface="Arial"/>
-                </a:rPr>
-                <a:t>Sub/re-sampling</a:t>
-              </a:r>
-            </a:p>
-            <a:p>
-              <a:pPr algn="ctr"/>
-              <a:r>
-                <a:rPr lang="en-US" sz="1200" dirty="0" smtClean="0">
-                  <a:solidFill>
-                    <a:srgbClr val="0000FF"/>
-                  </a:solidFill>
-                  <a:latin typeface="Arial"/>
-                  <a:cs typeface="Arial"/>
-                </a:rPr>
-                <a:t>evaluation</a:t>
-              </a:r>
-              <a:endParaRPr lang="en-US" sz="1200" dirty="0">
-                <a:solidFill>
-                  <a:srgbClr val="0000FF"/>
+              <a:latin typeface="Arial"/>
+              <a:cs typeface="Arial"/>
+            </a:endParaRPr>
+          </a:p>
+        </p:txBody>
+      </p:sp>
+      <p:sp>
+        <p:nvSpPr>
+          <p:cNvPr id="9" name="TextBox 8"/>
+          <p:cNvSpPr txBox="1"/>
+          <p:nvPr/>
+        </p:nvSpPr>
+        <p:spPr>
+          <a:xfrm>
+            <a:off x="2272770" y="1503726"/>
+            <a:ext cx="2059979" cy="523220"/>
+          </a:xfrm>
+          <a:prstGeom prst="rect">
+            <a:avLst/>
+          </a:prstGeom>
+          <a:noFill/>
+        </p:spPr>
+        <p:txBody>
+          <a:bodyPr wrap="none" rtlCol="0">
+            <a:spAutoFit/>
+          </a:bodyPr>
+          <a:lstStyle/>
+          <a:p>
+            <a:pPr algn="ctr"/>
+            <a:r>
+              <a:rPr lang="en-US" sz="1400" b="1" dirty="0" smtClean="0">
+                <a:solidFill>
+                  <a:schemeClr val="bg1">
+                    <a:lumMod val="50000"/>
+                  </a:schemeClr>
                 </a:solidFill>
                 <a:latin typeface="Arial"/>
                 <a:cs typeface="Arial"/>
-              </a:endParaRPr>
-            </a:p>
-          </p:txBody>
-        </p:sp>
-        <p:cxnSp>
-          <p:nvCxnSpPr>
-            <p:cNvPr id="39" name="Straight Arrow Connector 38"/>
-            <p:cNvCxnSpPr>
-              <a:stCxn id="12" idx="2"/>
-            </p:cNvCxnSpPr>
-            <p:nvPr/>
-          </p:nvCxnSpPr>
-          <p:spPr>
-            <a:xfrm>
-              <a:off x="3302764" y="4631936"/>
-              <a:ext cx="1029985" cy="331966"/>
-            </a:xfrm>
-            <a:prstGeom prst="straightConnector1">
-              <a:avLst/>
-            </a:prstGeom>
-            <a:ln>
+              </a:rPr>
+              <a:t>Feature </a:t>
+            </a:r>
+            <a:r>
+              <a:rPr lang="en-US" sz="1400" b="1" dirty="0" smtClean="0">
+                <a:solidFill>
+                  <a:schemeClr val="bg1">
+                    <a:lumMod val="50000"/>
+                  </a:schemeClr>
+                </a:solidFill>
+                <a:latin typeface="Arial"/>
+                <a:cs typeface="Arial"/>
+              </a:rPr>
+              <a:t>quantification</a:t>
+            </a:r>
+            <a:endParaRPr lang="en-US" sz="1400" b="1" dirty="0" smtClean="0">
+              <a:solidFill>
+                <a:schemeClr val="bg1">
+                  <a:lumMod val="50000"/>
+                </a:schemeClr>
+              </a:solidFill>
+              <a:latin typeface="Arial"/>
+              <a:cs typeface="Arial"/>
+            </a:endParaRPr>
+          </a:p>
+          <a:p>
+            <a:pPr algn="ctr"/>
+            <a:r>
+              <a:rPr lang="en-US" sz="1400" dirty="0" smtClean="0">
+                <a:solidFill>
+                  <a:schemeClr val="bg1">
+                    <a:lumMod val="50000"/>
+                  </a:schemeClr>
+                </a:solidFill>
+                <a:latin typeface="Arial"/>
+                <a:cs typeface="Arial"/>
+              </a:rPr>
+              <a:t>(</a:t>
+            </a:r>
+            <a:r>
+              <a:rPr lang="en-US" sz="1400" dirty="0" err="1" smtClean="0">
+                <a:solidFill>
+                  <a:schemeClr val="bg1">
+                    <a:lumMod val="50000"/>
+                  </a:schemeClr>
+                </a:solidFill>
+                <a:latin typeface="Arial"/>
+                <a:cs typeface="Arial"/>
+              </a:rPr>
+              <a:t>Patro</a:t>
+            </a:r>
+            <a:r>
+              <a:rPr lang="en-US" sz="1400" dirty="0" smtClean="0">
+                <a:solidFill>
+                  <a:schemeClr val="bg1">
+                    <a:lumMod val="50000"/>
+                  </a:schemeClr>
+                </a:solidFill>
+                <a:latin typeface="Arial"/>
+                <a:cs typeface="Arial"/>
+              </a:rPr>
+              <a:t>)</a:t>
+            </a:r>
+            <a:endParaRPr lang="en-US" sz="1400" dirty="0">
+              <a:solidFill>
+                <a:schemeClr val="bg1">
+                  <a:lumMod val="50000"/>
+                </a:schemeClr>
+              </a:solidFill>
+              <a:latin typeface="Arial"/>
+              <a:cs typeface="Arial"/>
+            </a:endParaRPr>
+          </a:p>
+        </p:txBody>
+      </p:sp>
+      <p:sp>
+        <p:nvSpPr>
+          <p:cNvPr id="10" name="TextBox 9"/>
+          <p:cNvSpPr txBox="1"/>
+          <p:nvPr/>
+        </p:nvSpPr>
+        <p:spPr>
+          <a:xfrm>
+            <a:off x="5591980" y="1503726"/>
+            <a:ext cx="1451940" cy="523220"/>
+          </a:xfrm>
+          <a:prstGeom prst="rect">
+            <a:avLst/>
+          </a:prstGeom>
+          <a:noFill/>
+        </p:spPr>
+        <p:txBody>
+          <a:bodyPr wrap="none" rtlCol="0">
+            <a:spAutoFit/>
+          </a:bodyPr>
+          <a:lstStyle/>
+          <a:p>
+            <a:pPr algn="ctr"/>
+            <a:r>
+              <a:rPr lang="en-US" sz="1400" b="1" dirty="0" smtClean="0">
+                <a:solidFill>
+                  <a:schemeClr val="bg1">
+                    <a:lumMod val="50000"/>
+                  </a:schemeClr>
+                </a:solidFill>
+                <a:latin typeface="Arial"/>
+                <a:cs typeface="Arial"/>
+              </a:rPr>
+              <a:t>Image features</a:t>
+            </a:r>
+            <a:endParaRPr lang="en-US" sz="1400" dirty="0" smtClean="0">
+              <a:solidFill>
+                <a:schemeClr val="bg1">
+                  <a:lumMod val="50000"/>
+                </a:schemeClr>
+              </a:solidFill>
+              <a:latin typeface="Arial"/>
+              <a:cs typeface="Arial"/>
+            </a:endParaRPr>
+          </a:p>
+          <a:p>
+            <a:pPr algn="ctr"/>
+            <a:r>
+              <a:rPr lang="en-US" sz="1400" dirty="0" smtClean="0">
+                <a:solidFill>
+                  <a:schemeClr val="bg1">
+                    <a:lumMod val="50000"/>
+                  </a:schemeClr>
+                </a:solidFill>
+                <a:latin typeface="Arial"/>
+                <a:cs typeface="Arial"/>
+              </a:rPr>
+              <a:t>(Raj)</a:t>
+            </a:r>
+            <a:endParaRPr lang="en-US" sz="1400" dirty="0">
+              <a:solidFill>
+                <a:schemeClr val="bg1">
+                  <a:lumMod val="50000"/>
+                </a:schemeClr>
+              </a:solidFill>
+              <a:latin typeface="Arial"/>
+              <a:cs typeface="Arial"/>
+            </a:endParaRPr>
+          </a:p>
+        </p:txBody>
+      </p:sp>
+      <p:sp>
+        <p:nvSpPr>
+          <p:cNvPr id="15" name="TextBox 14"/>
+          <p:cNvSpPr txBox="1"/>
+          <p:nvPr/>
+        </p:nvSpPr>
+        <p:spPr>
+          <a:xfrm rot="16200000">
+            <a:off x="6107366" y="2471600"/>
+            <a:ext cx="1142861" cy="646331"/>
+          </a:xfrm>
+          <a:prstGeom prst="rect">
+            <a:avLst/>
+          </a:prstGeom>
+          <a:noFill/>
+        </p:spPr>
+        <p:txBody>
+          <a:bodyPr wrap="none" rtlCol="0">
+            <a:spAutoFit/>
+          </a:bodyPr>
+          <a:lstStyle/>
+          <a:p>
+            <a:pPr algn="ctr"/>
+            <a:r>
+              <a:rPr lang="en-US" sz="1200" dirty="0" smtClean="0">
+                <a:solidFill>
+                  <a:schemeClr val="bg1">
+                    <a:lumMod val="50000"/>
+                  </a:schemeClr>
+                </a:solidFill>
+                <a:latin typeface="Arial"/>
+                <a:cs typeface="Arial"/>
+              </a:rPr>
+              <a:t>Deep learning</a:t>
+            </a:r>
+          </a:p>
+          <a:p>
+            <a:pPr algn="ctr"/>
+            <a:r>
+              <a:rPr lang="en-US" sz="1200" dirty="0" smtClean="0">
+                <a:solidFill>
+                  <a:schemeClr val="bg1">
+                    <a:lumMod val="50000"/>
+                  </a:schemeClr>
+                </a:solidFill>
+                <a:latin typeface="Arial"/>
+                <a:cs typeface="Arial"/>
+              </a:rPr>
+              <a:t>/ benchmark</a:t>
+            </a:r>
+          </a:p>
+          <a:p>
+            <a:pPr algn="ctr"/>
+            <a:r>
+              <a:rPr lang="en-US" sz="1200" dirty="0" smtClean="0">
+                <a:solidFill>
+                  <a:schemeClr val="bg1">
+                    <a:lumMod val="50000"/>
+                  </a:schemeClr>
+                </a:solidFill>
+                <a:latin typeface="Arial"/>
+                <a:cs typeface="Arial"/>
+              </a:rPr>
+              <a:t>data</a:t>
+            </a:r>
+            <a:endParaRPr lang="en-US" sz="1200" dirty="0">
+              <a:solidFill>
+                <a:schemeClr val="bg1">
+                  <a:lumMod val="50000"/>
+                </a:schemeClr>
+              </a:solidFill>
+              <a:latin typeface="Arial"/>
+              <a:cs typeface="Arial"/>
+            </a:endParaRPr>
+          </a:p>
+        </p:txBody>
+      </p:sp>
+      <p:cxnSp>
+        <p:nvCxnSpPr>
+          <p:cNvPr id="17" name="Straight Arrow Connector 16"/>
+          <p:cNvCxnSpPr>
+            <a:stCxn id="10" idx="2"/>
+          </p:cNvCxnSpPr>
+          <p:nvPr/>
+        </p:nvCxnSpPr>
+        <p:spPr>
+          <a:xfrm>
+            <a:off x="6317950" y="2026946"/>
+            <a:ext cx="1" cy="1630577"/>
+          </a:xfrm>
+          <a:prstGeom prst="straightConnector1">
+            <a:avLst/>
+          </a:prstGeom>
+          <a:ln>
+            <a:solidFill>
+              <a:srgbClr val="A6A6A6"/>
+            </a:solidFill>
+            <a:prstDash val="dot"/>
+            <a:headEnd type="arrow"/>
+            <a:tailEnd type="arrow"/>
+          </a:ln>
+          <a:effectLst/>
+        </p:spPr>
+        <p:style>
+          <a:lnRef idx="2">
+            <a:schemeClr val="accent1"/>
+          </a:lnRef>
+          <a:fillRef idx="0">
+            <a:schemeClr val="accent1"/>
+          </a:fillRef>
+          <a:effectRef idx="1">
+            <a:schemeClr val="accent1"/>
+          </a:effectRef>
+          <a:fontRef idx="minor">
+            <a:schemeClr val="tx1"/>
+          </a:fontRef>
+        </p:style>
+      </p:cxnSp>
+      <p:cxnSp>
+        <p:nvCxnSpPr>
+          <p:cNvPr id="18" name="Straight Arrow Connector 17"/>
+          <p:cNvCxnSpPr/>
+          <p:nvPr/>
+        </p:nvCxnSpPr>
+        <p:spPr>
+          <a:xfrm>
+            <a:off x="2794670" y="2026946"/>
+            <a:ext cx="0" cy="1599670"/>
+          </a:xfrm>
+          <a:prstGeom prst="straightConnector1">
+            <a:avLst/>
+          </a:prstGeom>
+          <a:ln>
+            <a:solidFill>
+              <a:srgbClr val="0000FF"/>
+            </a:solidFill>
+            <a:prstDash val="dot"/>
+            <a:headEnd type="arrow"/>
+            <a:tailEnd type="arrow"/>
+          </a:ln>
+          <a:effectLst/>
+        </p:spPr>
+        <p:style>
+          <a:lnRef idx="2">
+            <a:schemeClr val="accent1"/>
+          </a:lnRef>
+          <a:fillRef idx="0">
+            <a:schemeClr val="accent1"/>
+          </a:fillRef>
+          <a:effectRef idx="1">
+            <a:schemeClr val="accent1"/>
+          </a:effectRef>
+          <a:fontRef idx="minor">
+            <a:schemeClr val="tx1"/>
+          </a:fontRef>
+        </p:style>
+      </p:cxnSp>
+      <p:cxnSp>
+        <p:nvCxnSpPr>
+          <p:cNvPr id="23" name="Curved Connector 22"/>
+          <p:cNvCxnSpPr>
+            <a:stCxn id="12" idx="0"/>
+            <a:endCxn id="11" idx="0"/>
+          </p:cNvCxnSpPr>
+          <p:nvPr/>
+        </p:nvCxnSpPr>
+        <p:spPr>
+          <a:xfrm rot="5400000" flipH="1" flipV="1">
+            <a:off x="4810361" y="2171283"/>
+            <a:ext cx="12700" cy="3015195"/>
+          </a:xfrm>
+          <a:prstGeom prst="curvedConnector3">
+            <a:avLst>
+              <a:gd name="adj1" fmla="val 1800000"/>
+            </a:avLst>
+          </a:prstGeom>
+          <a:ln>
+            <a:solidFill>
+              <a:srgbClr val="0000FF"/>
+            </a:solidFill>
+            <a:prstDash val="dot"/>
+            <a:headEnd type="arrow"/>
+            <a:tailEnd type="arrow"/>
+          </a:ln>
+          <a:effectLst/>
+        </p:spPr>
+        <p:style>
+          <a:lnRef idx="2">
+            <a:schemeClr val="accent1"/>
+          </a:lnRef>
+          <a:fillRef idx="0">
+            <a:schemeClr val="accent1"/>
+          </a:fillRef>
+          <a:effectRef idx="1">
+            <a:schemeClr val="accent1"/>
+          </a:effectRef>
+          <a:fontRef idx="minor">
+            <a:schemeClr val="tx1"/>
+          </a:fontRef>
+        </p:style>
+      </p:cxnSp>
+      <p:cxnSp>
+        <p:nvCxnSpPr>
+          <p:cNvPr id="27" name="Straight Arrow Connector 26"/>
+          <p:cNvCxnSpPr>
+            <a:stCxn id="28" idx="2"/>
+            <a:endCxn id="12" idx="0"/>
+          </p:cNvCxnSpPr>
+          <p:nvPr/>
+        </p:nvCxnSpPr>
+        <p:spPr>
+          <a:xfrm flipH="1">
+            <a:off x="3302764" y="2657078"/>
+            <a:ext cx="1332734" cy="1021802"/>
+          </a:xfrm>
+          <a:prstGeom prst="straightConnector1">
+            <a:avLst/>
+          </a:prstGeom>
+          <a:ln>
+            <a:solidFill>
+              <a:srgbClr val="0000FF"/>
+            </a:solidFill>
+            <a:tailEnd type="arrow"/>
+          </a:ln>
+          <a:effectLst/>
+        </p:spPr>
+        <p:style>
+          <a:lnRef idx="2">
+            <a:schemeClr val="accent1"/>
+          </a:lnRef>
+          <a:fillRef idx="0">
+            <a:schemeClr val="accent1"/>
+          </a:fillRef>
+          <a:effectRef idx="1">
+            <a:schemeClr val="accent1"/>
+          </a:effectRef>
+          <a:fontRef idx="minor">
+            <a:schemeClr val="tx1"/>
+          </a:fontRef>
+        </p:style>
+      </p:cxnSp>
+      <p:cxnSp>
+        <p:nvCxnSpPr>
+          <p:cNvPr id="29" name="Straight Arrow Connector 28"/>
+          <p:cNvCxnSpPr>
+            <a:stCxn id="28" idx="2"/>
+          </p:cNvCxnSpPr>
+          <p:nvPr/>
+        </p:nvCxnSpPr>
+        <p:spPr>
+          <a:xfrm>
+            <a:off x="4635498" y="2657078"/>
+            <a:ext cx="1682452" cy="868877"/>
+          </a:xfrm>
+          <a:prstGeom prst="straightConnector1">
+            <a:avLst/>
+          </a:prstGeom>
+          <a:ln>
+            <a:solidFill>
+              <a:srgbClr val="A6A6A6"/>
+            </a:solidFill>
+            <a:tailEnd type="arrow"/>
+          </a:ln>
+          <a:effectLst/>
+        </p:spPr>
+        <p:style>
+          <a:lnRef idx="2">
+            <a:schemeClr val="accent1"/>
+          </a:lnRef>
+          <a:fillRef idx="0">
+            <a:schemeClr val="accent1"/>
+          </a:fillRef>
+          <a:effectRef idx="1">
+            <a:schemeClr val="accent1"/>
+          </a:effectRef>
+          <a:fontRef idx="minor">
+            <a:schemeClr val="tx1"/>
+          </a:fontRef>
+        </p:style>
+      </p:cxnSp>
+      <p:sp>
+        <p:nvSpPr>
+          <p:cNvPr id="21" name="TextBox 20"/>
+          <p:cNvSpPr txBox="1"/>
+          <p:nvPr/>
+        </p:nvSpPr>
+        <p:spPr>
+          <a:xfrm>
+            <a:off x="3801453" y="3213483"/>
+            <a:ext cx="2049509" cy="276999"/>
+          </a:xfrm>
+          <a:prstGeom prst="rect">
+            <a:avLst/>
+          </a:prstGeom>
+          <a:noFill/>
+        </p:spPr>
+        <p:txBody>
+          <a:bodyPr wrap="none" rtlCol="0">
+            <a:spAutoFit/>
+          </a:bodyPr>
+          <a:lstStyle/>
+          <a:p>
+            <a:pPr algn="ctr"/>
+            <a:r>
+              <a:rPr lang="en-US" sz="1200" dirty="0" smtClean="0">
+                <a:solidFill>
+                  <a:srgbClr val="0000FF"/>
+                </a:solidFill>
+                <a:latin typeface="Arial"/>
+                <a:cs typeface="Arial"/>
+              </a:rPr>
+              <a:t>Sub/re-</a:t>
+            </a:r>
+            <a:r>
+              <a:rPr lang="en-US" sz="1200" dirty="0" smtClean="0">
+                <a:solidFill>
+                  <a:srgbClr val="0000FF"/>
+                </a:solidFill>
+                <a:latin typeface="Arial"/>
+                <a:cs typeface="Arial"/>
+              </a:rPr>
+              <a:t>sampling evaluation</a:t>
+            </a:r>
+            <a:endParaRPr lang="en-US" sz="1200" dirty="0">
               <a:solidFill>
                 <a:srgbClr val="0000FF"/>
               </a:solidFill>
-              <a:tailEnd type="arrow"/>
-            </a:ln>
-            <a:effectLst/>
-          </p:spPr>
-          <p:style>
-            <a:lnRef idx="2">
-              <a:schemeClr val="accent1"/>
-            </a:lnRef>
-            <a:fillRef idx="0">
-              <a:schemeClr val="accent1"/>
-            </a:fillRef>
-            <a:effectRef idx="1">
-              <a:schemeClr val="accent1"/>
-            </a:effectRef>
-            <a:fontRef idx="minor">
-              <a:schemeClr val="tx1"/>
-            </a:fontRef>
-          </p:style>
-        </p:cxnSp>
-        <p:cxnSp>
-          <p:nvCxnSpPr>
-            <p:cNvPr id="41" name="Straight Arrow Connector 40"/>
-            <p:cNvCxnSpPr>
-              <a:stCxn id="11" idx="2"/>
-            </p:cNvCxnSpPr>
-            <p:nvPr/>
-          </p:nvCxnSpPr>
-          <p:spPr>
-            <a:xfrm flipH="1">
-              <a:off x="5058468" y="4631936"/>
-              <a:ext cx="1259490" cy="331966"/>
-            </a:xfrm>
-            <a:prstGeom prst="straightConnector1">
-              <a:avLst/>
-            </a:prstGeom>
-            <a:ln>
-              <a:solidFill>
-                <a:srgbClr val="A6A6A6"/>
-              </a:solidFill>
-              <a:tailEnd type="arrow"/>
-            </a:ln>
-            <a:effectLst/>
-          </p:spPr>
-          <p:style>
-            <a:lnRef idx="2">
-              <a:schemeClr val="accent1"/>
-            </a:lnRef>
-            <a:fillRef idx="0">
-              <a:schemeClr val="accent1"/>
-            </a:fillRef>
-            <a:effectRef idx="1">
-              <a:schemeClr val="accent1"/>
-            </a:effectRef>
-            <a:fontRef idx="minor">
-              <a:schemeClr val="tx1"/>
-            </a:fontRef>
-          </p:style>
-        </p:cxnSp>
-      </p:grpSp>
+              <a:latin typeface="Arial"/>
+              <a:cs typeface="Arial"/>
+            </a:endParaRPr>
+          </a:p>
+        </p:txBody>
+      </p:sp>
+      <p:cxnSp>
+        <p:nvCxnSpPr>
+          <p:cNvPr id="39" name="Straight Arrow Connector 38"/>
+          <p:cNvCxnSpPr>
+            <a:stCxn id="12" idx="2"/>
+          </p:cNvCxnSpPr>
+          <p:nvPr/>
+        </p:nvCxnSpPr>
+        <p:spPr>
+          <a:xfrm>
+            <a:off x="3302764" y="4202100"/>
+            <a:ext cx="1332734" cy="429656"/>
+          </a:xfrm>
+          <a:prstGeom prst="straightConnector1">
+            <a:avLst/>
+          </a:prstGeom>
+          <a:ln>
+            <a:solidFill>
+              <a:srgbClr val="0000FF"/>
+            </a:solidFill>
+            <a:tailEnd type="arrow"/>
+          </a:ln>
+          <a:effectLst/>
+        </p:spPr>
+        <p:style>
+          <a:lnRef idx="2">
+            <a:schemeClr val="accent1"/>
+          </a:lnRef>
+          <a:fillRef idx="0">
+            <a:schemeClr val="accent1"/>
+          </a:fillRef>
+          <a:effectRef idx="1">
+            <a:schemeClr val="accent1"/>
+          </a:effectRef>
+          <a:fontRef idx="minor">
+            <a:schemeClr val="tx1"/>
+          </a:fontRef>
+        </p:style>
+      </p:cxnSp>
+      <p:cxnSp>
+        <p:nvCxnSpPr>
+          <p:cNvPr id="41" name="Straight Arrow Connector 40"/>
+          <p:cNvCxnSpPr>
+            <a:stCxn id="11" idx="2"/>
+            <a:endCxn id="13" idx="0"/>
+          </p:cNvCxnSpPr>
+          <p:nvPr/>
+        </p:nvCxnSpPr>
+        <p:spPr>
+          <a:xfrm flipH="1">
+            <a:off x="4706481" y="4202100"/>
+            <a:ext cx="1611478" cy="429656"/>
+          </a:xfrm>
+          <a:prstGeom prst="straightConnector1">
+            <a:avLst/>
+          </a:prstGeom>
+          <a:ln>
+            <a:solidFill>
+              <a:srgbClr val="A6A6A6"/>
+            </a:solidFill>
+            <a:tailEnd type="arrow"/>
+          </a:ln>
+          <a:effectLst/>
+        </p:spPr>
+        <p:style>
+          <a:lnRef idx="2">
+            <a:schemeClr val="accent1"/>
+          </a:lnRef>
+          <a:fillRef idx="0">
+            <a:schemeClr val="accent1"/>
+          </a:fillRef>
+          <a:effectRef idx="1">
+            <a:schemeClr val="accent1"/>
+          </a:effectRef>
+          <a:fontRef idx="minor">
+            <a:schemeClr val="tx1"/>
+          </a:fontRef>
+        </p:style>
+      </p:cxnSp>
       <p:cxnSp>
         <p:nvCxnSpPr>
           <p:cNvPr id="43" name="Straight Arrow Connector 42"/>
@@ -4272,8 +4337,8 @@
         </p:nvCxnSpPr>
         <p:spPr>
           <a:xfrm>
-            <a:off x="4699214" y="5177704"/>
-            <a:ext cx="0" cy="421210"/>
+            <a:off x="4702847" y="5113502"/>
+            <a:ext cx="7268" cy="347536"/>
           </a:xfrm>
           <a:prstGeom prst="straightConnector1">
             <a:avLst/>
@@ -4311,8 +4376,8 @@
         </p:nvCxnSpPr>
         <p:spPr>
           <a:xfrm flipH="1">
-            <a:off x="3297711" y="821237"/>
-            <a:ext cx="1339313" cy="746366"/>
+            <a:off x="3571689" y="821237"/>
+            <a:ext cx="1065335" cy="593685"/>
           </a:xfrm>
           <a:prstGeom prst="straightConnector1">
             <a:avLst/>
@@ -4351,7 +4416,7 @@
         <p:spPr>
           <a:xfrm>
             <a:off x="4637024" y="821237"/>
-            <a:ext cx="1339312" cy="746366"/>
+            <a:ext cx="1069848" cy="593685"/>
           </a:xfrm>
           <a:prstGeom prst="straightConnector1">
             <a:avLst/>
@@ -4387,7 +4452,7 @@
         </p:nvSpPr>
         <p:spPr>
           <a:xfrm rot="16200000">
-            <a:off x="2559696" y="2787937"/>
+            <a:off x="2028475" y="2671432"/>
             <a:ext cx="1014370" cy="461665"/>
           </a:xfrm>
           <a:prstGeom prst="rect">
@@ -4447,9 +4512,328 @@
           <p:nvPr/>
         </p:nvCxnSpPr>
         <p:spPr>
+          <a:xfrm>
+            <a:off x="3302764" y="4202100"/>
+            <a:ext cx="343950" cy="2238614"/>
+          </a:xfrm>
+          <a:prstGeom prst="straightConnector1">
+            <a:avLst/>
+          </a:prstGeom>
+          <a:ln>
+            <a:solidFill>
+              <a:srgbClr val="0000FF"/>
+            </a:solidFill>
+            <a:prstDash val="dot"/>
+            <a:headEnd type="arrow"/>
+            <a:tailEnd type="arrow"/>
+          </a:ln>
+          <a:effectLst/>
+        </p:spPr>
+        <p:style>
+          <a:lnRef idx="2">
+            <a:schemeClr val="accent1"/>
+          </a:lnRef>
+          <a:fillRef idx="0">
+            <a:schemeClr val="accent1"/>
+          </a:fillRef>
+          <a:effectRef idx="1">
+            <a:schemeClr val="accent1"/>
+          </a:effectRef>
+          <a:fontRef idx="minor">
+            <a:schemeClr val="tx1"/>
+          </a:fontRef>
+        </p:style>
+      </p:cxnSp>
+      <p:sp>
+        <p:nvSpPr>
+          <p:cNvPr id="28" name="TextBox 27"/>
+          <p:cNvSpPr txBox="1"/>
+          <p:nvPr/>
+        </p:nvSpPr>
+        <p:spPr>
+          <a:xfrm>
+            <a:off x="3949634" y="2133858"/>
+            <a:ext cx="1371727" cy="523220"/>
+          </a:xfrm>
+          <a:prstGeom prst="rect">
+            <a:avLst/>
+          </a:prstGeom>
+          <a:noFill/>
+        </p:spPr>
+        <p:txBody>
+          <a:bodyPr wrap="none" rtlCol="0">
+            <a:spAutoFit/>
+          </a:bodyPr>
+          <a:lstStyle/>
+          <a:p>
+            <a:pPr algn="ctr"/>
+            <a:r>
+              <a:rPr lang="en-US" sz="1400" b="1" dirty="0" err="1" smtClean="0">
+                <a:solidFill>
+                  <a:schemeClr val="bg1">
+                    <a:lumMod val="50000"/>
+                  </a:schemeClr>
+                </a:solidFill>
+                <a:latin typeface="Arial"/>
+                <a:cs typeface="Arial"/>
+              </a:rPr>
+              <a:t>Denoising</a:t>
+            </a:r>
+            <a:endParaRPr lang="en-US" sz="1400" b="1" dirty="0" smtClean="0">
+              <a:solidFill>
+                <a:schemeClr val="bg1">
+                  <a:lumMod val="50000"/>
+                </a:schemeClr>
+              </a:solidFill>
+              <a:latin typeface="Arial"/>
+              <a:cs typeface="Arial"/>
+            </a:endParaRPr>
+          </a:p>
+          <a:p>
+            <a:pPr algn="ctr"/>
+            <a:r>
+              <a:rPr lang="en-US" sz="1400" dirty="0" smtClean="0">
+                <a:solidFill>
+                  <a:schemeClr val="bg1">
+                    <a:lumMod val="50000"/>
+                  </a:schemeClr>
+                </a:solidFill>
+                <a:latin typeface="Arial"/>
+                <a:cs typeface="Arial"/>
+              </a:rPr>
+              <a:t>(</a:t>
+            </a:r>
+            <a:r>
+              <a:rPr lang="en-US" sz="1400" dirty="0" err="1" smtClean="0">
+                <a:solidFill>
+                  <a:schemeClr val="bg1">
+                    <a:lumMod val="50000"/>
+                  </a:schemeClr>
+                </a:solidFill>
+                <a:latin typeface="Arial"/>
+                <a:cs typeface="Arial"/>
+              </a:rPr>
+              <a:t>Krisnaswamy</a:t>
+            </a:r>
+            <a:r>
+              <a:rPr lang="en-US" sz="1400" dirty="0" smtClean="0">
+                <a:solidFill>
+                  <a:schemeClr val="bg1">
+                    <a:lumMod val="50000"/>
+                  </a:schemeClr>
+                </a:solidFill>
+                <a:latin typeface="Arial"/>
+                <a:cs typeface="Arial"/>
+              </a:rPr>
+              <a:t>)</a:t>
+            </a:r>
+            <a:endParaRPr lang="en-US" sz="1400" dirty="0">
+              <a:solidFill>
+                <a:schemeClr val="bg1">
+                  <a:lumMod val="50000"/>
+                </a:schemeClr>
+              </a:solidFill>
+              <a:latin typeface="Arial"/>
+              <a:cs typeface="Arial"/>
+            </a:endParaRPr>
+          </a:p>
+        </p:txBody>
+      </p:sp>
+      <p:cxnSp>
+        <p:nvCxnSpPr>
+          <p:cNvPr id="16" name="Straight Arrow Connector 15"/>
+          <p:cNvCxnSpPr>
+            <a:endCxn id="28" idx="1"/>
+          </p:cNvCxnSpPr>
+          <p:nvPr/>
+        </p:nvCxnSpPr>
+        <p:spPr>
+          <a:xfrm>
+            <a:off x="3297711" y="2104571"/>
+            <a:ext cx="651923" cy="290897"/>
+          </a:xfrm>
+          <a:prstGeom prst="straightConnector1">
+            <a:avLst/>
+          </a:prstGeom>
+          <a:ln>
+            <a:solidFill>
+              <a:schemeClr val="bg1">
+                <a:lumMod val="65000"/>
+              </a:schemeClr>
+            </a:solidFill>
+            <a:tailEnd type="arrow"/>
+          </a:ln>
+          <a:effectLst/>
+        </p:spPr>
+        <p:style>
+          <a:lnRef idx="2">
+            <a:schemeClr val="accent1"/>
+          </a:lnRef>
+          <a:fillRef idx="0">
+            <a:schemeClr val="accent1"/>
+          </a:fillRef>
+          <a:effectRef idx="1">
+            <a:schemeClr val="accent1"/>
+          </a:effectRef>
+          <a:fontRef idx="minor">
+            <a:schemeClr val="tx1"/>
+          </a:fontRef>
+        </p:style>
+      </p:cxnSp>
+      <p:sp>
+        <p:nvSpPr>
+          <p:cNvPr id="36" name="TextBox 35"/>
+          <p:cNvSpPr txBox="1"/>
+          <p:nvPr/>
+        </p:nvSpPr>
+        <p:spPr>
+          <a:xfrm>
+            <a:off x="3536799" y="5419564"/>
+            <a:ext cx="2339365" cy="523220"/>
+          </a:xfrm>
+          <a:prstGeom prst="rect">
+            <a:avLst/>
+          </a:prstGeom>
+          <a:noFill/>
+        </p:spPr>
+        <p:txBody>
+          <a:bodyPr wrap="none" rtlCol="0">
+            <a:spAutoFit/>
+          </a:bodyPr>
+          <a:lstStyle/>
+          <a:p>
+            <a:pPr algn="ctr"/>
+            <a:r>
+              <a:rPr lang="en-US" sz="1400" b="1" dirty="0" smtClean="0">
+                <a:solidFill>
+                  <a:schemeClr val="bg1">
+                    <a:lumMod val="50000"/>
+                  </a:schemeClr>
+                </a:solidFill>
+                <a:latin typeface="Arial"/>
+                <a:cs typeface="Arial"/>
+              </a:rPr>
+              <a:t>Biologist</a:t>
+            </a:r>
+            <a:r>
+              <a:rPr lang="en-US" sz="1400" b="1" dirty="0" smtClean="0">
+                <a:solidFill>
+                  <a:schemeClr val="bg1">
+                    <a:lumMod val="50000"/>
+                  </a:schemeClr>
+                </a:solidFill>
+                <a:latin typeface="Arial"/>
+                <a:cs typeface="Arial"/>
+              </a:rPr>
+              <a:t>-facing Interface</a:t>
+            </a:r>
+            <a:endParaRPr lang="en-US" sz="1400" dirty="0" smtClean="0">
+              <a:solidFill>
+                <a:schemeClr val="bg1">
+                  <a:lumMod val="50000"/>
+                </a:schemeClr>
+              </a:solidFill>
+              <a:latin typeface="Arial"/>
+              <a:cs typeface="Arial"/>
+            </a:endParaRPr>
+          </a:p>
+          <a:p>
+            <a:pPr algn="ctr"/>
+            <a:r>
+              <a:rPr lang="en-US" sz="1400" dirty="0" smtClean="0">
+                <a:solidFill>
+                  <a:schemeClr val="bg1">
+                    <a:lumMod val="50000"/>
+                  </a:schemeClr>
+                </a:solidFill>
+                <a:latin typeface="Arial"/>
+                <a:cs typeface="Arial"/>
+              </a:rPr>
+              <a:t>(</a:t>
+            </a:r>
+            <a:r>
+              <a:rPr lang="en-US" sz="1400" dirty="0" err="1" smtClean="0">
+                <a:solidFill>
+                  <a:schemeClr val="bg1">
+                    <a:lumMod val="50000"/>
+                  </a:schemeClr>
+                </a:solidFill>
+                <a:latin typeface="Arial"/>
+                <a:cs typeface="Arial"/>
+              </a:rPr>
+              <a:t>Garmire</a:t>
+            </a:r>
+            <a:r>
+              <a:rPr lang="en-US" sz="1400" dirty="0" smtClean="0">
+                <a:solidFill>
+                  <a:schemeClr val="bg1">
+                    <a:lumMod val="50000"/>
+                  </a:schemeClr>
+                </a:solidFill>
+                <a:latin typeface="Arial"/>
+                <a:cs typeface="Arial"/>
+              </a:rPr>
+              <a:t>)</a:t>
+            </a:r>
+            <a:endParaRPr lang="en-US" sz="1400" dirty="0">
+              <a:solidFill>
+                <a:schemeClr val="bg1">
+                  <a:lumMod val="50000"/>
+                </a:schemeClr>
+              </a:solidFill>
+              <a:latin typeface="Arial"/>
+              <a:cs typeface="Arial"/>
+            </a:endParaRPr>
+          </a:p>
+        </p:txBody>
+      </p:sp>
+      <p:cxnSp>
+        <p:nvCxnSpPr>
+          <p:cNvPr id="42" name="Straight Arrow Connector 41"/>
+          <p:cNvCxnSpPr/>
+          <p:nvPr/>
+        </p:nvCxnSpPr>
+        <p:spPr>
+          <a:xfrm>
+            <a:off x="4702847" y="5901310"/>
+            <a:ext cx="7268" cy="347536"/>
+          </a:xfrm>
+          <a:prstGeom prst="straightConnector1">
+            <a:avLst/>
+          </a:prstGeom>
+          <a:ln>
+            <a:solidFill>
+              <a:srgbClr val="A6A6A6"/>
+            </a:solidFill>
+            <a:tailEnd type="arrow"/>
+          </a:ln>
+          <a:effectLst/>
+        </p:spPr>
+        <p:style>
+          <a:lnRef idx="2">
+            <a:schemeClr val="accent1"/>
+          </a:lnRef>
+          <a:fillRef idx="0">
+            <a:schemeClr val="accent1"/>
+          </a:fillRef>
+          <a:effectRef idx="1">
+            <a:schemeClr val="accent1"/>
+          </a:effectRef>
+          <a:fontRef idx="minor">
+            <a:schemeClr val="tx1"/>
+          </a:fontRef>
+        </p:style>
+      </p:cxnSp>
+      <p:cxnSp>
+        <p:nvCxnSpPr>
+          <p:cNvPr id="53" name="Straight Arrow Connector 52"/>
+          <p:cNvCxnSpPr/>
+          <p:nvPr/>
+        </p:nvCxnSpPr>
+        <p:spPr>
           <a:xfrm flipH="1">
-            <a:off x="3297711" y="4202100"/>
-            <a:ext cx="5053" cy="1396814"/>
+            <a:off x="3284162" y="2540000"/>
+            <a:ext cx="665473" cy="0"/>
           </a:xfrm>
           <a:prstGeom prst="straightConnector1">
             <a:avLst/>

</xml_diff>

<commit_message>
edits for collaborative network
</commit_message>
<xml_diff>
--- a/CollaborativeNetwork.pptx
+++ b/CollaborativeNetwork.pptx
@@ -3095,82 +3095,119 @@
           <a:chExt cx="0" cy="0"/>
         </a:xfrm>
       </p:grpSpPr>
-      <p:sp>
-        <p:nvSpPr>
-          <p:cNvPr id="4" name="Rounded Rectangle 3"/>
-          <p:cNvSpPr/>
+      <p:grpSp>
+        <p:nvGrpSpPr>
+          <p:cNvPr id="26" name="Group 25"/>
+          <p:cNvGrpSpPr/>
           <p:nvPr/>
-        </p:nvSpPr>
-        <p:spPr>
+        </p:nvGrpSpPr>
+        <p:grpSpPr>
           <a:xfrm>
-            <a:off x="1438862" y="1016000"/>
-            <a:ext cx="6470730" cy="4274398"/>
+            <a:off x="1559018" y="513460"/>
+            <a:ext cx="6025964" cy="5470798"/>
+            <a:chOff x="1357138" y="513460"/>
+            <a:chExt cx="6025964" cy="5470798"/>
           </a:xfrm>
-          <a:prstGeom prst="roundRect">
-            <a:avLst/>
-          </a:prstGeom>
-          <a:noFill/>
-          <a:ln>
-            <a:solidFill>
-              <a:schemeClr val="bg1">
-                <a:lumMod val="65000"/>
-              </a:schemeClr>
-            </a:solidFill>
-          </a:ln>
-          <a:effectLst/>
-        </p:spPr>
-        <p:style>
-          <a:lnRef idx="1">
-            <a:schemeClr val="accent1"/>
-          </a:lnRef>
-          <a:fillRef idx="3">
-            <a:schemeClr val="accent1"/>
-          </a:fillRef>
-          <a:effectRef idx="2">
-            <a:schemeClr val="accent1"/>
-          </a:effectRef>
-          <a:fontRef idx="minor">
-            <a:schemeClr val="lt1"/>
-          </a:fontRef>
-        </p:style>
-        <p:txBody>
-          <a:bodyPr rtlCol="0" anchor="ctr"/>
-          <a:lstStyle/>
-          <a:p>
-            <a:pPr algn="ctr"/>
-            <a:endParaRPr lang="en-US">
+        </p:grpSpPr>
+        <p:sp>
+          <p:nvSpPr>
+            <p:cNvPr id="4" name="Rounded Rectangle 3"/>
+            <p:cNvSpPr/>
+            <p:nvPr/>
+          </p:nvSpPr>
+          <p:spPr>
+            <a:xfrm>
+              <a:off x="1762124" y="1016000"/>
+              <a:ext cx="5620977" cy="4274398"/>
+            </a:xfrm>
+            <a:prstGeom prst="roundRect">
+              <a:avLst/>
+            </a:prstGeom>
+            <a:noFill/>
+            <a:ln>
               <a:solidFill>
-                <a:srgbClr val="7F7F7F"/>
+                <a:schemeClr val="bg1">
+                  <a:lumMod val="65000"/>
+                </a:schemeClr>
               </a:solidFill>
-            </a:endParaRPr>
-          </a:p>
-        </p:txBody>
-      </p:sp>
-      <p:sp>
-        <p:nvSpPr>
-          <p:cNvPr id="5" name="TextBox 4"/>
-          <p:cNvSpPr txBox="1"/>
-          <p:nvPr/>
-        </p:nvSpPr>
-        <p:spPr>
-          <a:xfrm>
-            <a:off x="3297711" y="513460"/>
-            <a:ext cx="2678625" cy="307777"/>
-          </a:xfrm>
-          <a:prstGeom prst="rect">
-            <a:avLst/>
-          </a:prstGeom>
-          <a:noFill/>
-        </p:spPr>
-        <p:txBody>
-          <a:bodyPr wrap="none" rtlCol="0">
-            <a:spAutoFit/>
-          </a:bodyPr>
-          <a:lstStyle/>
-          <a:p>
-            <a:pPr algn="ctr"/>
-            <a:r>
-              <a:rPr lang="en-US" sz="1400" b="1" dirty="0" smtClean="0">
+            </a:ln>
+            <a:effectLst/>
+          </p:spPr>
+          <p:style>
+            <a:lnRef idx="1">
+              <a:schemeClr val="accent1"/>
+            </a:lnRef>
+            <a:fillRef idx="3">
+              <a:schemeClr val="accent1"/>
+            </a:fillRef>
+            <a:effectRef idx="2">
+              <a:schemeClr val="accent1"/>
+            </a:effectRef>
+            <a:fontRef idx="minor">
+              <a:schemeClr val="lt1"/>
+            </a:fontRef>
+          </p:style>
+          <p:txBody>
+            <a:bodyPr rtlCol="0" anchor="ctr"/>
+            <a:lstStyle/>
+            <a:p>
+              <a:pPr algn="ctr"/>
+              <a:endParaRPr lang="en-US">
+                <a:solidFill>
+                  <a:srgbClr val="7F7F7F"/>
+                </a:solidFill>
+              </a:endParaRPr>
+            </a:p>
+          </p:txBody>
+        </p:sp>
+        <p:sp>
+          <p:nvSpPr>
+            <p:cNvPr id="5" name="TextBox 4"/>
+            <p:cNvSpPr txBox="1"/>
+            <p:nvPr/>
+          </p:nvSpPr>
+          <p:spPr>
+            <a:xfrm>
+              <a:off x="3297711" y="513460"/>
+              <a:ext cx="2678625" cy="307777"/>
+            </a:xfrm>
+            <a:prstGeom prst="rect">
+              <a:avLst/>
+            </a:prstGeom>
+            <a:noFill/>
+          </p:spPr>
+          <p:txBody>
+            <a:bodyPr wrap="none" rtlCol="0">
+              <a:spAutoFit/>
+            </a:bodyPr>
+            <a:lstStyle/>
+            <a:p>
+              <a:pPr algn="ctr"/>
+              <a:r>
+                <a:rPr lang="en-US" sz="1400" b="1" dirty="0" smtClean="0">
+                  <a:solidFill>
+                    <a:schemeClr val="bg1">
+                      <a:lumMod val="50000"/>
+                    </a:schemeClr>
+                  </a:solidFill>
+                  <a:latin typeface="Arial"/>
+                  <a:cs typeface="Arial"/>
+                </a:rPr>
+                <a:t>HCA Training Data </a:t>
+              </a:r>
+              <a:r>
+                <a:rPr lang="en-US" sz="1400" dirty="0" smtClean="0">
+                  <a:solidFill>
+                    <a:schemeClr val="bg1">
+                      <a:lumMod val="50000"/>
+                    </a:schemeClr>
+                  </a:solidFill>
+                  <a:latin typeface="Arial"/>
+                  <a:cs typeface="Arial"/>
+                </a:rPr>
+                <a:t>(Goff / Raj)</a:t>
+              </a:r>
+              <a:endParaRPr lang="en-US" sz="1400" dirty="0">
                 <a:solidFill>
                   <a:schemeClr val="bg1">
                     <a:lumMod val="50000"/>
@@ -3178,11 +3215,117 @@
                 </a:solidFill>
                 <a:latin typeface="Arial"/>
                 <a:cs typeface="Arial"/>
-              </a:rPr>
-              <a:t>HCA Training Data </a:t>
-            </a:r>
-            <a:r>
-              <a:rPr lang="en-US" sz="1400" dirty="0" smtClean="0">
+              </a:endParaRPr>
+            </a:p>
+          </p:txBody>
+        </p:sp>
+        <p:sp>
+          <p:nvSpPr>
+            <p:cNvPr id="6" name="TextBox 5"/>
+            <p:cNvSpPr txBox="1"/>
+            <p:nvPr/>
+          </p:nvSpPr>
+          <p:spPr>
+            <a:xfrm rot="16200000">
+              <a:off x="-704578" y="3082172"/>
+              <a:ext cx="4431209" cy="307777"/>
+            </a:xfrm>
+            <a:prstGeom prst="rect">
+              <a:avLst/>
+            </a:prstGeom>
+            <a:noFill/>
+          </p:spPr>
+          <p:txBody>
+            <a:bodyPr wrap="none" rtlCol="0">
+              <a:spAutoFit/>
+            </a:bodyPr>
+            <a:lstStyle/>
+            <a:p>
+              <a:r>
+                <a:rPr lang="en-US" sz="1400" b="1" dirty="0" smtClean="0">
+                  <a:solidFill>
+                    <a:schemeClr val="bg1">
+                      <a:lumMod val="50000"/>
+                    </a:schemeClr>
+                  </a:solidFill>
+                  <a:latin typeface="Arial"/>
+                  <a:cs typeface="Arial"/>
+                </a:rPr>
+                <a:t>Reproducible Workflows </a:t>
+              </a:r>
+              <a:r>
+                <a:rPr lang="en-US" sz="1400" dirty="0" smtClean="0">
+                  <a:solidFill>
+                    <a:schemeClr val="bg1">
+                      <a:lumMod val="50000"/>
+                    </a:schemeClr>
+                  </a:solidFill>
+                  <a:latin typeface="Arial"/>
+                  <a:cs typeface="Arial"/>
+                </a:rPr>
+                <a:t>(</a:t>
+              </a:r>
+              <a:r>
+                <a:rPr lang="en-US" sz="1400" dirty="0" err="1" smtClean="0">
+                  <a:solidFill>
+                    <a:schemeClr val="bg1">
+                      <a:lumMod val="50000"/>
+                    </a:schemeClr>
+                  </a:solidFill>
+                  <a:latin typeface="Arial"/>
+                  <a:cs typeface="Arial"/>
+                </a:rPr>
+                <a:t>Patro</a:t>
+              </a:r>
+              <a:r>
+                <a:rPr lang="en-US" sz="1400" dirty="0">
+                  <a:solidFill>
+                    <a:schemeClr val="bg1">
+                      <a:lumMod val="50000"/>
+                    </a:schemeClr>
+                  </a:solidFill>
+                  <a:latin typeface="Arial"/>
+                  <a:cs typeface="Arial"/>
+                </a:rPr>
+                <a:t> </a:t>
+              </a:r>
+              <a:r>
+                <a:rPr lang="en-US" sz="1400" dirty="0" smtClean="0">
+                  <a:solidFill>
+                    <a:schemeClr val="bg1">
+                      <a:lumMod val="50000"/>
+                    </a:schemeClr>
+                  </a:solidFill>
+                  <a:latin typeface="Arial"/>
+                  <a:cs typeface="Arial"/>
+                </a:rPr>
+                <a:t>/ </a:t>
+              </a:r>
+              <a:r>
+                <a:rPr lang="en-US" sz="1400" dirty="0" err="1" smtClean="0">
+                  <a:solidFill>
+                    <a:schemeClr val="bg1">
+                      <a:lumMod val="50000"/>
+                    </a:schemeClr>
+                  </a:solidFill>
+                  <a:latin typeface="Arial"/>
+                  <a:cs typeface="Arial"/>
+                </a:rPr>
+                <a:t>Garmire</a:t>
+              </a:r>
+              <a:r>
+                <a:rPr lang="en-US" sz="1400" dirty="0" smtClean="0">
+                  <a:solidFill>
+                    <a:schemeClr val="bg1">
+                      <a:lumMod val="50000"/>
+                    </a:schemeClr>
+                  </a:solidFill>
+                  <a:latin typeface="Arial"/>
+                  <a:cs typeface="Arial"/>
+                </a:rPr>
+                <a:t> / Greene)</a:t>
+              </a:r>
+              <a:endParaRPr lang="en-US" sz="1400" dirty="0">
                 <a:solidFill>
                   <a:schemeClr val="bg1">
                     <a:lumMod val="50000"/>
@@ -3190,45 +3333,46 @@
                 </a:solidFill>
                 <a:latin typeface="Arial"/>
                 <a:cs typeface="Arial"/>
-              </a:rPr>
-              <a:t>(Goff / Raj)</a:t>
-            </a:r>
-            <a:endParaRPr lang="en-US" sz="1400" dirty="0">
-              <a:solidFill>
-                <a:schemeClr val="bg1">
-                  <a:lumMod val="50000"/>
-                </a:schemeClr>
-              </a:solidFill>
-              <a:latin typeface="Arial"/>
-              <a:cs typeface="Arial"/>
-            </a:endParaRPr>
-          </a:p>
-        </p:txBody>
-      </p:sp>
-      <p:sp>
-        <p:nvSpPr>
-          <p:cNvPr id="6" name="TextBox 5"/>
-          <p:cNvSpPr txBox="1"/>
-          <p:nvPr/>
-        </p:nvSpPr>
-        <p:spPr>
-          <a:xfrm rot="16200000">
-            <a:off x="-1101453" y="3082172"/>
-            <a:ext cx="4431209" cy="307777"/>
-          </a:xfrm>
-          <a:prstGeom prst="rect">
-            <a:avLst/>
-          </a:prstGeom>
-          <a:noFill/>
-        </p:spPr>
-        <p:txBody>
-          <a:bodyPr wrap="none" rtlCol="0">
-            <a:spAutoFit/>
-          </a:bodyPr>
-          <a:lstStyle/>
-          <a:p>
-            <a:r>
-              <a:rPr lang="en-US" sz="1400" b="1" dirty="0" smtClean="0">
+              </a:endParaRPr>
+            </a:p>
+          </p:txBody>
+        </p:sp>
+        <p:sp>
+          <p:nvSpPr>
+            <p:cNvPr id="13" name="TextBox 12"/>
+            <p:cNvSpPr txBox="1"/>
+            <p:nvPr/>
+          </p:nvSpPr>
+          <p:spPr>
+            <a:xfrm>
+              <a:off x="3751357" y="4631756"/>
+              <a:ext cx="1910248" cy="523220"/>
+            </a:xfrm>
+            <a:prstGeom prst="rect">
+              <a:avLst/>
+            </a:prstGeom>
+            <a:noFill/>
+          </p:spPr>
+          <p:txBody>
+            <a:bodyPr wrap="none" rtlCol="0">
+              <a:spAutoFit/>
+            </a:bodyPr>
+            <a:lstStyle/>
+            <a:p>
+              <a:pPr algn="ctr"/>
+              <a:r>
+                <a:rPr lang="en-US" sz="1400" b="1" dirty="0" smtClean="0">
+                  <a:solidFill>
+                    <a:schemeClr val="bg1">
+                      <a:lumMod val="50000"/>
+                    </a:schemeClr>
+                  </a:solidFill>
+                  <a:latin typeface="Arial"/>
+                  <a:cs typeface="Arial"/>
+                </a:rPr>
+                <a:t>Model interpretation</a:t>
+              </a:r>
+              <a:endParaRPr lang="en-US" sz="1400" dirty="0" smtClean="0">
                 <a:solidFill>
                   <a:schemeClr val="bg1">
                     <a:lumMod val="50000"/>
@@ -3236,11 +3380,23 @@
                 </a:solidFill>
                 <a:latin typeface="Arial"/>
                 <a:cs typeface="Arial"/>
-              </a:rPr>
-              <a:t>Reproducible Workflows </a:t>
-            </a:r>
-            <a:r>
-              <a:rPr lang="en-US" sz="1400" dirty="0" smtClean="0">
+              </a:endParaRPr>
+            </a:p>
+            <a:p>
+              <a:pPr algn="ctr"/>
+              <a:r>
+                <a:rPr lang="en-US" sz="1400" dirty="0" smtClean="0">
+                  <a:solidFill>
+                    <a:schemeClr val="bg1">
+                      <a:lumMod val="50000"/>
+                    </a:schemeClr>
+                  </a:solidFill>
+                  <a:latin typeface="Arial"/>
+                  <a:cs typeface="Arial"/>
+                </a:rPr>
+                <a:t>(Goff)</a:t>
+              </a:r>
+              <a:endParaRPr lang="en-US" sz="1400" dirty="0">
                 <a:solidFill>
                   <a:schemeClr val="bg1">
                     <a:lumMod val="50000"/>
@@ -3248,11 +3404,46 @@
                 </a:solidFill>
                 <a:latin typeface="Arial"/>
                 <a:cs typeface="Arial"/>
-              </a:rPr>
-              <a:t>(</a:t>
-            </a:r>
-            <a:r>
-              <a:rPr lang="en-US" sz="1400" dirty="0" err="1" smtClean="0">
+              </a:endParaRPr>
+            </a:p>
+          </p:txBody>
+        </p:sp>
+        <p:sp>
+          <p:nvSpPr>
+            <p:cNvPr id="14" name="TextBox 13"/>
+            <p:cNvSpPr txBox="1"/>
+            <p:nvPr/>
+          </p:nvSpPr>
+          <p:spPr>
+            <a:xfrm>
+              <a:off x="2163954" y="5451314"/>
+              <a:ext cx="2269584" cy="523220"/>
+            </a:xfrm>
+            <a:prstGeom prst="rect">
+              <a:avLst/>
+            </a:prstGeom>
+            <a:noFill/>
+          </p:spPr>
+          <p:txBody>
+            <a:bodyPr wrap="none" rtlCol="0">
+              <a:spAutoFit/>
+            </a:bodyPr>
+            <a:lstStyle/>
+            <a:p>
+              <a:pPr algn="ctr"/>
+              <a:r>
+                <a:rPr lang="en-US" sz="1400" b="1" dirty="0" smtClean="0">
+                  <a:solidFill>
+                    <a:schemeClr val="bg1">
+                      <a:lumMod val="50000"/>
+                    </a:schemeClr>
+                  </a:solidFill>
+                  <a:latin typeface="Arial"/>
+                  <a:cs typeface="Arial"/>
+                </a:rPr>
+                <a:t>Visualization</a:t>
+              </a:r>
+              <a:endParaRPr lang="en-US" sz="1400" dirty="0" smtClean="0">
                 <a:solidFill>
                   <a:schemeClr val="bg1">
                     <a:lumMod val="50000"/>
@@ -3260,11 +3451,71 @@
                 </a:solidFill>
                 <a:latin typeface="Arial"/>
                 <a:cs typeface="Arial"/>
-              </a:rPr>
-              <a:t>Patro</a:t>
-            </a:r>
-            <a:r>
-              <a:rPr lang="en-US" sz="1400" dirty="0">
+              </a:endParaRPr>
+            </a:p>
+            <a:p>
+              <a:pPr algn="ctr"/>
+              <a:r>
+                <a:rPr lang="en-US" sz="1400" dirty="0" smtClean="0">
+                  <a:solidFill>
+                    <a:schemeClr val="bg1">
+                      <a:lumMod val="50000"/>
+                    </a:schemeClr>
+                  </a:solidFill>
+                  <a:latin typeface="Arial"/>
+                  <a:cs typeface="Arial"/>
+                </a:rPr>
+                <a:t>(</a:t>
+              </a:r>
+              <a:r>
+                <a:rPr lang="en-US" sz="1400" dirty="0" err="1" smtClean="0">
+                  <a:solidFill>
+                    <a:schemeClr val="bg1">
+                      <a:lumMod val="50000"/>
+                    </a:schemeClr>
+                  </a:solidFill>
+                  <a:latin typeface="Arial"/>
+                  <a:cs typeface="Arial"/>
+                </a:rPr>
+                <a:t>Garmire</a:t>
+              </a:r>
+              <a:r>
+                <a:rPr lang="en-US" sz="1400" dirty="0" smtClean="0">
+                  <a:solidFill>
+                    <a:schemeClr val="bg1">
+                      <a:lumMod val="50000"/>
+                    </a:schemeClr>
+                  </a:solidFill>
+                  <a:latin typeface="Arial"/>
+                  <a:cs typeface="Arial"/>
+                </a:rPr>
+                <a:t> / </a:t>
+              </a:r>
+              <a:r>
+                <a:rPr lang="en-US" sz="1400" dirty="0" err="1" smtClean="0">
+                  <a:solidFill>
+                    <a:schemeClr val="bg1">
+                      <a:lumMod val="50000"/>
+                    </a:schemeClr>
+                  </a:solidFill>
+                  <a:latin typeface="Arial"/>
+                  <a:cs typeface="Arial"/>
+                </a:rPr>
+                <a:t>Krishnaswamy</a:t>
+              </a:r>
+              <a:r>
+                <a:rPr lang="en-US" sz="1400" dirty="0" smtClean="0">
+                  <a:solidFill>
+                    <a:schemeClr val="bg1">
+                      <a:lumMod val="50000"/>
+                    </a:schemeClr>
+                  </a:solidFill>
+                  <a:latin typeface="Arial"/>
+                  <a:cs typeface="Arial"/>
+                </a:rPr>
+                <a:t>)</a:t>
+              </a:r>
+              <a:endParaRPr lang="en-US" sz="1400" dirty="0">
                 <a:solidFill>
                   <a:schemeClr val="bg1">
                     <a:lumMod val="50000"/>
@@ -3272,11 +3523,46 @@
                 </a:solidFill>
                 <a:latin typeface="Arial"/>
                 <a:cs typeface="Arial"/>
-              </a:rPr>
-              <a:t> </a:t>
-            </a:r>
-            <a:r>
-              <a:rPr lang="en-US" sz="1400" dirty="0" smtClean="0">
+              </a:endParaRPr>
+            </a:p>
+          </p:txBody>
+        </p:sp>
+        <p:sp>
+          <p:nvSpPr>
+            <p:cNvPr id="11" name="TextBox 10"/>
+            <p:cNvSpPr txBox="1"/>
+            <p:nvPr/>
+          </p:nvSpPr>
+          <p:spPr>
+            <a:xfrm>
+              <a:off x="5252816" y="3678880"/>
+              <a:ext cx="2130286" cy="523220"/>
+            </a:xfrm>
+            <a:prstGeom prst="rect">
+              <a:avLst/>
+            </a:prstGeom>
+            <a:noFill/>
+          </p:spPr>
+          <p:txBody>
+            <a:bodyPr wrap="none" rtlCol="0">
+              <a:spAutoFit/>
+            </a:bodyPr>
+            <a:lstStyle/>
+            <a:p>
+              <a:pPr algn="ctr"/>
+              <a:r>
+                <a:rPr lang="en-US" sz="1400" b="1" dirty="0" smtClean="0">
+                  <a:solidFill>
+                    <a:schemeClr val="bg1">
+                      <a:lumMod val="50000"/>
+                    </a:schemeClr>
+                  </a:solidFill>
+                  <a:latin typeface="Arial"/>
+                  <a:cs typeface="Arial"/>
+                </a:rPr>
+                <a:t>Gene signatures</a:t>
+              </a:r>
+              <a:endParaRPr lang="en-US" sz="1400" dirty="0" smtClean="0">
                 <a:solidFill>
                   <a:schemeClr val="bg1">
                     <a:lumMod val="50000"/>
@@ -3284,11 +3570,47 @@
                 </a:solidFill>
                 <a:latin typeface="Arial"/>
                 <a:cs typeface="Arial"/>
-              </a:rPr>
-              <a:t>/ </a:t>
-            </a:r>
-            <a:r>
-              <a:rPr lang="en-US" sz="1400" dirty="0" err="1" smtClean="0">
+              </a:endParaRPr>
+            </a:p>
+            <a:p>
+              <a:pPr algn="ctr"/>
+              <a:r>
+                <a:rPr lang="en-US" sz="1400" dirty="0" smtClean="0">
+                  <a:solidFill>
+                    <a:schemeClr val="bg1">
+                      <a:lumMod val="50000"/>
+                    </a:schemeClr>
+                  </a:solidFill>
+                  <a:latin typeface="Arial"/>
+                  <a:cs typeface="Arial"/>
+                </a:rPr>
+                <a:t>(Greene / </a:t>
+              </a:r>
+              <a:r>
+                <a:rPr lang="en-US" sz="1400" dirty="0" err="1" smtClean="0">
+                  <a:solidFill>
+                    <a:schemeClr val="bg1">
+                      <a:lumMod val="50000"/>
+                    </a:schemeClr>
+                  </a:solidFill>
+                  <a:latin typeface="Arial"/>
+                  <a:cs typeface="Arial"/>
+                </a:rPr>
+                <a:t>Krisnaswamy</a:t>
+              </a:r>
+              <a:r>
+                <a:rPr lang="en-US" sz="1400" dirty="0" smtClean="0">
+                  <a:solidFill>
+                    <a:schemeClr val="bg1">
+                      <a:lumMod val="50000"/>
+                    </a:schemeClr>
+                  </a:solidFill>
+                  <a:latin typeface="Arial"/>
+                  <a:cs typeface="Arial"/>
+                </a:rPr>
+                <a:t>)</a:t>
+              </a:r>
+              <a:endParaRPr lang="en-US" sz="1400" dirty="0">
                 <a:solidFill>
                   <a:schemeClr val="bg1">
                     <a:lumMod val="50000"/>
@@ -3296,11 +3618,204 @@
                 </a:solidFill>
                 <a:latin typeface="Arial"/>
                 <a:cs typeface="Arial"/>
-              </a:rPr>
-              <a:t>Garmire</a:t>
-            </a:r>
-            <a:r>
-              <a:rPr lang="en-US" sz="1400" dirty="0" smtClean="0">
+              </a:endParaRPr>
+            </a:p>
+          </p:txBody>
+        </p:sp>
+        <p:sp>
+          <p:nvSpPr>
+            <p:cNvPr id="12" name="TextBox 11"/>
+            <p:cNvSpPr txBox="1"/>
+            <p:nvPr/>
+          </p:nvSpPr>
+          <p:spPr>
+            <a:xfrm>
+              <a:off x="1948285" y="3678880"/>
+              <a:ext cx="2708957" cy="523220"/>
+            </a:xfrm>
+            <a:prstGeom prst="rect">
+              <a:avLst/>
+            </a:prstGeom>
+            <a:noFill/>
+          </p:spPr>
+          <p:txBody>
+            <a:bodyPr wrap="none" rtlCol="0">
+              <a:spAutoFit/>
+            </a:bodyPr>
+            <a:lstStyle/>
+            <a:p>
+              <a:pPr algn="ctr"/>
+              <a:r>
+                <a:rPr lang="en-US" sz="1400" b="1" dirty="0" smtClean="0">
+                  <a:solidFill>
+                    <a:srgbClr val="0000FF"/>
+                  </a:solidFill>
+                  <a:latin typeface="Arial"/>
+                  <a:cs typeface="Arial"/>
+                </a:rPr>
+                <a:t>Trajectory / temporal patterns</a:t>
+              </a:r>
+              <a:endParaRPr lang="en-US" sz="1400" dirty="0" smtClean="0">
+                <a:solidFill>
+                  <a:srgbClr val="0000FF"/>
+                </a:solidFill>
+                <a:latin typeface="Arial"/>
+                <a:cs typeface="Arial"/>
+              </a:endParaRPr>
+            </a:p>
+            <a:p>
+              <a:pPr algn="ctr"/>
+              <a:r>
+                <a:rPr lang="en-US" sz="1400" dirty="0" smtClean="0">
+                  <a:solidFill>
+                    <a:srgbClr val="0000FF"/>
+                  </a:solidFill>
+                  <a:latin typeface="Arial"/>
+                  <a:cs typeface="Arial"/>
+                </a:rPr>
+                <a:t>(Fertig)</a:t>
+              </a:r>
+              <a:endParaRPr lang="en-US" sz="1400" dirty="0">
+                <a:solidFill>
+                  <a:srgbClr val="0000FF"/>
+                </a:solidFill>
+                <a:latin typeface="Arial"/>
+                <a:cs typeface="Arial"/>
+              </a:endParaRPr>
+            </a:p>
+          </p:txBody>
+        </p:sp>
+        <p:sp>
+          <p:nvSpPr>
+            <p:cNvPr id="20" name="TextBox 19"/>
+            <p:cNvSpPr txBox="1"/>
+            <p:nvPr/>
+          </p:nvSpPr>
+          <p:spPr>
+            <a:xfrm rot="16200000">
+              <a:off x="2221010" y="2613916"/>
+              <a:ext cx="1664638" cy="461665"/>
+            </a:xfrm>
+            <a:prstGeom prst="rect">
+              <a:avLst/>
+            </a:prstGeom>
+            <a:noFill/>
+          </p:spPr>
+          <p:txBody>
+            <a:bodyPr wrap="none" rtlCol="0">
+              <a:spAutoFit/>
+            </a:bodyPr>
+            <a:lstStyle/>
+            <a:p>
+              <a:pPr algn="ctr"/>
+              <a:r>
+                <a:rPr lang="en-US" sz="1200" dirty="0" smtClean="0">
+                  <a:solidFill>
+                    <a:srgbClr val="0000FF"/>
+                  </a:solidFill>
+                  <a:latin typeface="Arial"/>
+                  <a:cs typeface="Arial"/>
+                </a:rPr>
+                <a:t>Sensitivity to input</a:t>
+              </a:r>
+            </a:p>
+            <a:p>
+              <a:pPr algn="ctr"/>
+              <a:r>
+                <a:rPr lang="en-US" sz="1200" dirty="0" smtClean="0">
+                  <a:solidFill>
+                    <a:srgbClr val="0000FF"/>
+                  </a:solidFill>
+                  <a:latin typeface="Arial"/>
+                  <a:cs typeface="Arial"/>
+                </a:rPr>
+                <a:t>features and variance</a:t>
+              </a:r>
+              <a:endParaRPr lang="en-US" sz="1200" dirty="0">
+                <a:solidFill>
+                  <a:srgbClr val="0000FF"/>
+                </a:solidFill>
+                <a:latin typeface="Arial"/>
+                <a:cs typeface="Arial"/>
+              </a:endParaRPr>
+            </a:p>
+          </p:txBody>
+        </p:sp>
+        <p:sp>
+          <p:nvSpPr>
+            <p:cNvPr id="9" name="TextBox 8"/>
+            <p:cNvSpPr txBox="1"/>
+            <p:nvPr/>
+          </p:nvSpPr>
+          <p:spPr>
+            <a:xfrm>
+              <a:off x="2272770" y="1503726"/>
+              <a:ext cx="2059979" cy="523220"/>
+            </a:xfrm>
+            <a:prstGeom prst="rect">
+              <a:avLst/>
+            </a:prstGeom>
+            <a:noFill/>
+          </p:spPr>
+          <p:txBody>
+            <a:bodyPr wrap="none" rtlCol="0">
+              <a:spAutoFit/>
+            </a:bodyPr>
+            <a:lstStyle/>
+            <a:p>
+              <a:pPr algn="ctr"/>
+              <a:r>
+                <a:rPr lang="en-US" sz="1400" b="1" dirty="0" smtClean="0">
+                  <a:solidFill>
+                    <a:schemeClr val="bg1">
+                      <a:lumMod val="50000"/>
+                    </a:schemeClr>
+                  </a:solidFill>
+                  <a:latin typeface="Arial"/>
+                  <a:cs typeface="Arial"/>
+                </a:rPr>
+                <a:t>Feature quantification</a:t>
+              </a:r>
+            </a:p>
+            <a:p>
+              <a:pPr algn="ctr"/>
+              <a:r>
+                <a:rPr lang="en-US" sz="1400" dirty="0" smtClean="0">
+                  <a:solidFill>
+                    <a:schemeClr val="bg1">
+                      <a:lumMod val="50000"/>
+                    </a:schemeClr>
+                  </a:solidFill>
+                  <a:latin typeface="Arial"/>
+                  <a:cs typeface="Arial"/>
+                </a:rPr>
+                <a:t>(</a:t>
+              </a:r>
+              <a:r>
+                <a:rPr lang="en-US" sz="1400" dirty="0" err="1" smtClean="0">
+                  <a:solidFill>
+                    <a:schemeClr val="bg1">
+                      <a:lumMod val="50000"/>
+                    </a:schemeClr>
+                  </a:solidFill>
+                  <a:latin typeface="Arial"/>
+                  <a:cs typeface="Arial"/>
+                </a:rPr>
+                <a:t>Patro</a:t>
+              </a:r>
+              <a:r>
+                <a:rPr lang="en-US" sz="1400" dirty="0" smtClean="0">
+                  <a:solidFill>
+                    <a:schemeClr val="bg1">
+                      <a:lumMod val="50000"/>
+                    </a:schemeClr>
+                  </a:solidFill>
+                  <a:latin typeface="Arial"/>
+                  <a:cs typeface="Arial"/>
+                </a:rPr>
+                <a:t>)</a:t>
+              </a:r>
+              <a:endParaRPr lang="en-US" sz="1400" dirty="0">
                 <a:solidFill>
                   <a:schemeClr val="bg1">
                     <a:lumMod val="50000"/>
@@ -3308,46 +3823,46 @@
                 </a:solidFill>
                 <a:latin typeface="Arial"/>
                 <a:cs typeface="Arial"/>
-              </a:rPr>
-              <a:t> / Greene)</a:t>
-            </a:r>
-            <a:endParaRPr lang="en-US" sz="1400" dirty="0">
-              <a:solidFill>
-                <a:schemeClr val="bg1">
-                  <a:lumMod val="50000"/>
-                </a:schemeClr>
-              </a:solidFill>
-              <a:latin typeface="Arial"/>
-              <a:cs typeface="Arial"/>
-            </a:endParaRPr>
-          </a:p>
-        </p:txBody>
-      </p:sp>
-      <p:sp>
-        <p:nvSpPr>
-          <p:cNvPr id="13" name="TextBox 12"/>
-          <p:cNvSpPr txBox="1"/>
-          <p:nvPr/>
-        </p:nvSpPr>
-        <p:spPr>
-          <a:xfrm>
-            <a:off x="3751357" y="4631756"/>
-            <a:ext cx="1910248" cy="523220"/>
-          </a:xfrm>
-          <a:prstGeom prst="rect">
-            <a:avLst/>
-          </a:prstGeom>
-          <a:noFill/>
-        </p:spPr>
-        <p:txBody>
-          <a:bodyPr wrap="none" rtlCol="0">
-            <a:spAutoFit/>
-          </a:bodyPr>
-          <a:lstStyle/>
-          <a:p>
-            <a:pPr algn="ctr"/>
-            <a:r>
-              <a:rPr lang="en-US" sz="1400" b="1" dirty="0" smtClean="0">
+              </a:endParaRPr>
+            </a:p>
+          </p:txBody>
+        </p:sp>
+        <p:sp>
+          <p:nvSpPr>
+            <p:cNvPr id="10" name="TextBox 9"/>
+            <p:cNvSpPr txBox="1"/>
+            <p:nvPr/>
+          </p:nvSpPr>
+          <p:spPr>
+            <a:xfrm>
+              <a:off x="5591980" y="1503726"/>
+              <a:ext cx="1451940" cy="523220"/>
+            </a:xfrm>
+            <a:prstGeom prst="rect">
+              <a:avLst/>
+            </a:prstGeom>
+            <a:noFill/>
+          </p:spPr>
+          <p:txBody>
+            <a:bodyPr wrap="none" rtlCol="0">
+              <a:spAutoFit/>
+            </a:bodyPr>
+            <a:lstStyle/>
+            <a:p>
+              <a:pPr algn="ctr"/>
+              <a:r>
+                <a:rPr lang="en-US" sz="1400" b="1" dirty="0" smtClean="0">
+                  <a:solidFill>
+                    <a:schemeClr val="bg1">
+                      <a:lumMod val="50000"/>
+                    </a:schemeClr>
+                  </a:solidFill>
+                  <a:latin typeface="Arial"/>
+                  <a:cs typeface="Arial"/>
+                </a:rPr>
+                <a:t>Image features</a:t>
+              </a:r>
+              <a:endParaRPr lang="en-US" sz="1400" dirty="0" smtClean="0">
                 <a:solidFill>
                   <a:schemeClr val="bg1">
                     <a:lumMod val="50000"/>
@@ -3355,23 +3870,23 @@
                 </a:solidFill>
                 <a:latin typeface="Arial"/>
                 <a:cs typeface="Arial"/>
-              </a:rPr>
-              <a:t>Model interpretation</a:t>
-            </a:r>
-            <a:endParaRPr lang="en-US" sz="1400" dirty="0" smtClean="0">
-              <a:solidFill>
-                <a:schemeClr val="bg1">
-                  <a:lumMod val="50000"/>
-                </a:schemeClr>
-              </a:solidFill>
-              <a:latin typeface="Arial"/>
-              <a:cs typeface="Arial"/>
-            </a:endParaRPr>
-          </a:p>
-          <a:p>
-            <a:pPr algn="ctr"/>
-            <a:r>
-              <a:rPr lang="en-US" sz="1400" dirty="0" smtClean="0">
+              </a:endParaRPr>
+            </a:p>
+            <a:p>
+              <a:pPr algn="ctr"/>
+              <a:r>
+                <a:rPr lang="en-US" sz="1400" dirty="0" smtClean="0">
+                  <a:solidFill>
+                    <a:schemeClr val="bg1">
+                      <a:lumMod val="50000"/>
+                    </a:schemeClr>
+                  </a:solidFill>
+                  <a:latin typeface="Arial"/>
+                  <a:cs typeface="Arial"/>
+                </a:rPr>
+                <a:t>(Raj)</a:t>
+              </a:r>
+              <a:endParaRPr lang="en-US" sz="1400" dirty="0">
                 <a:solidFill>
                   <a:schemeClr val="bg1">
                     <a:lumMod val="50000"/>
@@ -3379,46 +3894,46 @@
                 </a:solidFill>
                 <a:latin typeface="Arial"/>
                 <a:cs typeface="Arial"/>
-              </a:rPr>
-              <a:t>(Goff)</a:t>
-            </a:r>
-            <a:endParaRPr lang="en-US" sz="1400" dirty="0">
-              <a:solidFill>
-                <a:schemeClr val="bg1">
-                  <a:lumMod val="50000"/>
-                </a:schemeClr>
-              </a:solidFill>
-              <a:latin typeface="Arial"/>
-              <a:cs typeface="Arial"/>
-            </a:endParaRPr>
-          </a:p>
-        </p:txBody>
-      </p:sp>
-      <p:sp>
-        <p:nvSpPr>
-          <p:cNvPr id="14" name="TextBox 13"/>
-          <p:cNvSpPr txBox="1"/>
-          <p:nvPr/>
-        </p:nvSpPr>
-        <p:spPr>
-          <a:xfrm>
-            <a:off x="3571689" y="6207372"/>
-            <a:ext cx="2269584" cy="523220"/>
-          </a:xfrm>
-          <a:prstGeom prst="rect">
-            <a:avLst/>
-          </a:prstGeom>
-          <a:noFill/>
-        </p:spPr>
-        <p:txBody>
-          <a:bodyPr wrap="none" rtlCol="0">
-            <a:spAutoFit/>
-          </a:bodyPr>
-          <a:lstStyle/>
-          <a:p>
-            <a:pPr algn="ctr"/>
-            <a:r>
-              <a:rPr lang="en-US" sz="1400" b="1" dirty="0" smtClean="0">
+              </a:endParaRPr>
+            </a:p>
+          </p:txBody>
+        </p:sp>
+        <p:sp>
+          <p:nvSpPr>
+            <p:cNvPr id="15" name="TextBox 14"/>
+            <p:cNvSpPr txBox="1"/>
+            <p:nvPr/>
+          </p:nvSpPr>
+          <p:spPr>
+            <a:xfrm rot="16200000">
+              <a:off x="5996244" y="2656266"/>
+              <a:ext cx="1142861" cy="276999"/>
+            </a:xfrm>
+            <a:prstGeom prst="rect">
+              <a:avLst/>
+            </a:prstGeom>
+            <a:noFill/>
+          </p:spPr>
+          <p:txBody>
+            <a:bodyPr wrap="none" rtlCol="0">
+              <a:spAutoFit/>
+            </a:bodyPr>
+            <a:lstStyle/>
+            <a:p>
+              <a:pPr algn="ctr"/>
+              <a:r>
+                <a:rPr lang="en-US" sz="1200" dirty="0" smtClean="0">
+                  <a:solidFill>
+                    <a:schemeClr val="bg1">
+                      <a:lumMod val="50000"/>
+                    </a:schemeClr>
+                  </a:solidFill>
+                  <a:latin typeface="Arial"/>
+                  <a:cs typeface="Arial"/>
+                </a:rPr>
+                <a:t>Deep learning</a:t>
+              </a:r>
+              <a:endParaRPr lang="en-US" sz="1200" dirty="0">
                 <a:solidFill>
                   <a:schemeClr val="bg1">
                     <a:lumMod val="50000"/>
@@ -3426,23 +3941,586 @@
                 </a:solidFill>
                 <a:latin typeface="Arial"/>
                 <a:cs typeface="Arial"/>
-              </a:rPr>
-              <a:t>Visualization</a:t>
-            </a:r>
-            <a:endParaRPr lang="en-US" sz="1400" dirty="0" smtClean="0">
+              </a:endParaRPr>
+            </a:p>
+          </p:txBody>
+        </p:sp>
+        <p:cxnSp>
+          <p:nvCxnSpPr>
+            <p:cNvPr id="17" name="Straight Arrow Connector 16"/>
+            <p:cNvCxnSpPr>
+              <a:stCxn id="10" idx="2"/>
+            </p:cNvCxnSpPr>
+            <p:nvPr/>
+          </p:nvCxnSpPr>
+          <p:spPr>
+            <a:xfrm>
+              <a:off x="6317950" y="2026946"/>
+              <a:ext cx="1" cy="1630577"/>
+            </a:xfrm>
+            <a:prstGeom prst="straightConnector1">
+              <a:avLst/>
+            </a:prstGeom>
+            <a:ln>
               <a:solidFill>
-                <a:schemeClr val="bg1">
-                  <a:lumMod val="50000"/>
-                </a:schemeClr>
+                <a:srgbClr val="A6A6A6"/>
               </a:solidFill>
-              <a:latin typeface="Arial"/>
-              <a:cs typeface="Arial"/>
-            </a:endParaRPr>
-          </a:p>
-          <a:p>
-            <a:pPr algn="ctr"/>
-            <a:r>
-              <a:rPr lang="en-US" sz="1400" dirty="0" smtClean="0">
+              <a:prstDash val="dot"/>
+              <a:headEnd type="arrow"/>
+              <a:tailEnd type="arrow"/>
+            </a:ln>
+            <a:effectLst/>
+          </p:spPr>
+          <p:style>
+            <a:lnRef idx="2">
+              <a:schemeClr val="accent1"/>
+            </a:lnRef>
+            <a:fillRef idx="0">
+              <a:schemeClr val="accent1"/>
+            </a:fillRef>
+            <a:effectRef idx="1">
+              <a:schemeClr val="accent1"/>
+            </a:effectRef>
+            <a:fontRef idx="minor">
+              <a:schemeClr val="tx1"/>
+            </a:fontRef>
+          </p:style>
+        </p:cxnSp>
+        <p:cxnSp>
+          <p:nvCxnSpPr>
+            <p:cNvPr id="18" name="Straight Arrow Connector 17"/>
+            <p:cNvCxnSpPr/>
+            <p:nvPr/>
+          </p:nvCxnSpPr>
+          <p:spPr>
+            <a:xfrm>
+              <a:off x="2794670" y="2026946"/>
+              <a:ext cx="0" cy="1599670"/>
+            </a:xfrm>
+            <a:prstGeom prst="straightConnector1">
+              <a:avLst/>
+            </a:prstGeom>
+            <a:ln>
+              <a:solidFill>
+                <a:srgbClr val="0000FF"/>
+              </a:solidFill>
+              <a:prstDash val="dot"/>
+              <a:headEnd type="arrow"/>
+              <a:tailEnd type="arrow"/>
+            </a:ln>
+            <a:effectLst/>
+          </p:spPr>
+          <p:style>
+            <a:lnRef idx="2">
+              <a:schemeClr val="accent1"/>
+            </a:lnRef>
+            <a:fillRef idx="0">
+              <a:schemeClr val="accent1"/>
+            </a:fillRef>
+            <a:effectRef idx="1">
+              <a:schemeClr val="accent1"/>
+            </a:effectRef>
+            <a:fontRef idx="minor">
+              <a:schemeClr val="tx1"/>
+            </a:fontRef>
+          </p:style>
+        </p:cxnSp>
+        <p:cxnSp>
+          <p:nvCxnSpPr>
+            <p:cNvPr id="23" name="Curved Connector 22"/>
+            <p:cNvCxnSpPr>
+              <a:stCxn id="12" idx="0"/>
+              <a:endCxn id="11" idx="0"/>
+            </p:cNvCxnSpPr>
+            <p:nvPr/>
+          </p:nvCxnSpPr>
+          <p:spPr>
+            <a:xfrm rot="5400000" flipH="1" flipV="1">
+              <a:off x="4810361" y="2171283"/>
+              <a:ext cx="12700" cy="3015195"/>
+            </a:xfrm>
+            <a:prstGeom prst="curvedConnector3">
+              <a:avLst>
+                <a:gd name="adj1" fmla="val 1800000"/>
+              </a:avLst>
+            </a:prstGeom>
+            <a:ln>
+              <a:solidFill>
+                <a:srgbClr val="0000FF"/>
+              </a:solidFill>
+              <a:prstDash val="dot"/>
+              <a:headEnd type="arrow"/>
+              <a:tailEnd type="arrow"/>
+            </a:ln>
+            <a:effectLst/>
+          </p:spPr>
+          <p:style>
+            <a:lnRef idx="2">
+              <a:schemeClr val="accent1"/>
+            </a:lnRef>
+            <a:fillRef idx="0">
+              <a:schemeClr val="accent1"/>
+            </a:fillRef>
+            <a:effectRef idx="1">
+              <a:schemeClr val="accent1"/>
+            </a:effectRef>
+            <a:fontRef idx="minor">
+              <a:schemeClr val="tx1"/>
+            </a:fontRef>
+          </p:style>
+        </p:cxnSp>
+        <p:cxnSp>
+          <p:nvCxnSpPr>
+            <p:cNvPr id="27" name="Straight Arrow Connector 26"/>
+            <p:cNvCxnSpPr>
+              <a:stCxn id="28" idx="2"/>
+              <a:endCxn id="12" idx="0"/>
+            </p:cNvCxnSpPr>
+            <p:nvPr/>
+          </p:nvCxnSpPr>
+          <p:spPr>
+            <a:xfrm flipH="1">
+              <a:off x="3302764" y="2657078"/>
+              <a:ext cx="1332734" cy="1021802"/>
+            </a:xfrm>
+            <a:prstGeom prst="straightConnector1">
+              <a:avLst/>
+            </a:prstGeom>
+            <a:ln>
+              <a:solidFill>
+                <a:srgbClr val="0000FF"/>
+              </a:solidFill>
+              <a:tailEnd type="arrow"/>
+            </a:ln>
+            <a:effectLst/>
+          </p:spPr>
+          <p:style>
+            <a:lnRef idx="2">
+              <a:schemeClr val="accent1"/>
+            </a:lnRef>
+            <a:fillRef idx="0">
+              <a:schemeClr val="accent1"/>
+            </a:fillRef>
+            <a:effectRef idx="1">
+              <a:schemeClr val="accent1"/>
+            </a:effectRef>
+            <a:fontRef idx="minor">
+              <a:schemeClr val="tx1"/>
+            </a:fontRef>
+          </p:style>
+        </p:cxnSp>
+        <p:cxnSp>
+          <p:nvCxnSpPr>
+            <p:cNvPr id="29" name="Straight Arrow Connector 28"/>
+            <p:cNvCxnSpPr>
+              <a:stCxn id="28" idx="2"/>
+            </p:cNvCxnSpPr>
+            <p:nvPr/>
+          </p:nvCxnSpPr>
+          <p:spPr>
+            <a:xfrm>
+              <a:off x="4635498" y="2657078"/>
+              <a:ext cx="1682452" cy="868877"/>
+            </a:xfrm>
+            <a:prstGeom prst="straightConnector1">
+              <a:avLst/>
+            </a:prstGeom>
+            <a:ln>
+              <a:solidFill>
+                <a:srgbClr val="A6A6A6"/>
+              </a:solidFill>
+              <a:tailEnd type="arrow"/>
+            </a:ln>
+            <a:effectLst/>
+          </p:spPr>
+          <p:style>
+            <a:lnRef idx="2">
+              <a:schemeClr val="accent1"/>
+            </a:lnRef>
+            <a:fillRef idx="0">
+              <a:schemeClr val="accent1"/>
+            </a:fillRef>
+            <a:effectRef idx="1">
+              <a:schemeClr val="accent1"/>
+            </a:effectRef>
+            <a:fontRef idx="minor">
+              <a:schemeClr val="tx1"/>
+            </a:fontRef>
+          </p:style>
+        </p:cxnSp>
+        <p:sp>
+          <p:nvSpPr>
+            <p:cNvPr id="21" name="TextBox 20"/>
+            <p:cNvSpPr txBox="1"/>
+            <p:nvPr/>
+          </p:nvSpPr>
+          <p:spPr>
+            <a:xfrm>
+              <a:off x="3801453" y="3213483"/>
+              <a:ext cx="2049509" cy="276999"/>
+            </a:xfrm>
+            <a:prstGeom prst="rect">
+              <a:avLst/>
+            </a:prstGeom>
+            <a:noFill/>
+          </p:spPr>
+          <p:txBody>
+            <a:bodyPr wrap="none" rtlCol="0">
+              <a:spAutoFit/>
+            </a:bodyPr>
+            <a:lstStyle/>
+            <a:p>
+              <a:pPr algn="ctr"/>
+              <a:r>
+                <a:rPr lang="en-US" sz="1200" dirty="0" smtClean="0">
+                  <a:solidFill>
+                    <a:srgbClr val="0000FF"/>
+                  </a:solidFill>
+                  <a:latin typeface="Arial"/>
+                  <a:cs typeface="Arial"/>
+                </a:rPr>
+                <a:t>Sub/re-sampling evaluation</a:t>
+              </a:r>
+              <a:endParaRPr lang="en-US" sz="1200" dirty="0">
+                <a:solidFill>
+                  <a:srgbClr val="0000FF"/>
+                </a:solidFill>
+                <a:latin typeface="Arial"/>
+                <a:cs typeface="Arial"/>
+              </a:endParaRPr>
+            </a:p>
+          </p:txBody>
+        </p:sp>
+        <p:cxnSp>
+          <p:nvCxnSpPr>
+            <p:cNvPr id="39" name="Straight Arrow Connector 38"/>
+            <p:cNvCxnSpPr>
+              <a:stCxn id="12" idx="2"/>
+            </p:cNvCxnSpPr>
+            <p:nvPr/>
+          </p:nvCxnSpPr>
+          <p:spPr>
+            <a:xfrm>
+              <a:off x="3302764" y="4202100"/>
+              <a:ext cx="1332734" cy="429656"/>
+            </a:xfrm>
+            <a:prstGeom prst="straightConnector1">
+              <a:avLst/>
+            </a:prstGeom>
+            <a:ln>
+              <a:solidFill>
+                <a:srgbClr val="0000FF"/>
+              </a:solidFill>
+              <a:tailEnd type="arrow"/>
+            </a:ln>
+            <a:effectLst/>
+          </p:spPr>
+          <p:style>
+            <a:lnRef idx="2">
+              <a:schemeClr val="accent1"/>
+            </a:lnRef>
+            <a:fillRef idx="0">
+              <a:schemeClr val="accent1"/>
+            </a:fillRef>
+            <a:effectRef idx="1">
+              <a:schemeClr val="accent1"/>
+            </a:effectRef>
+            <a:fontRef idx="minor">
+              <a:schemeClr val="tx1"/>
+            </a:fontRef>
+          </p:style>
+        </p:cxnSp>
+        <p:cxnSp>
+          <p:nvCxnSpPr>
+            <p:cNvPr id="41" name="Straight Arrow Connector 40"/>
+            <p:cNvCxnSpPr>
+              <a:stCxn id="11" idx="2"/>
+              <a:endCxn id="13" idx="0"/>
+            </p:cNvCxnSpPr>
+            <p:nvPr/>
+          </p:nvCxnSpPr>
+          <p:spPr>
+            <a:xfrm flipH="1">
+              <a:off x="4706481" y="4202100"/>
+              <a:ext cx="1611478" cy="429656"/>
+            </a:xfrm>
+            <a:prstGeom prst="straightConnector1">
+              <a:avLst/>
+            </a:prstGeom>
+            <a:ln>
+              <a:solidFill>
+                <a:srgbClr val="A6A6A6"/>
+              </a:solidFill>
+              <a:tailEnd type="arrow"/>
+            </a:ln>
+            <a:effectLst/>
+          </p:spPr>
+          <p:style>
+            <a:lnRef idx="2">
+              <a:schemeClr val="accent1"/>
+            </a:lnRef>
+            <a:fillRef idx="0">
+              <a:schemeClr val="accent1"/>
+            </a:fillRef>
+            <a:effectRef idx="1">
+              <a:schemeClr val="accent1"/>
+            </a:effectRef>
+            <a:fontRef idx="minor">
+              <a:schemeClr val="tx1"/>
+            </a:fontRef>
+          </p:style>
+        </p:cxnSp>
+        <p:cxnSp>
+          <p:nvCxnSpPr>
+            <p:cNvPr id="43" name="Straight Arrow Connector 42"/>
+            <p:cNvCxnSpPr/>
+            <p:nvPr/>
+          </p:nvCxnSpPr>
+          <p:spPr>
+            <a:xfrm>
+              <a:off x="5043737" y="5154976"/>
+              <a:ext cx="1052263" cy="264588"/>
+            </a:xfrm>
+            <a:prstGeom prst="straightConnector1">
+              <a:avLst/>
+            </a:prstGeom>
+            <a:ln>
+              <a:solidFill>
+                <a:srgbClr val="A6A6A6"/>
+              </a:solidFill>
+              <a:tailEnd type="arrow"/>
+            </a:ln>
+            <a:effectLst/>
+          </p:spPr>
+          <p:style>
+            <a:lnRef idx="2">
+              <a:schemeClr val="accent1"/>
+            </a:lnRef>
+            <a:fillRef idx="0">
+              <a:schemeClr val="accent1"/>
+            </a:fillRef>
+            <a:effectRef idx="1">
+              <a:schemeClr val="accent1"/>
+            </a:effectRef>
+            <a:fontRef idx="minor">
+              <a:schemeClr val="tx1"/>
+            </a:fontRef>
+          </p:style>
+        </p:cxnSp>
+        <p:cxnSp>
+          <p:nvCxnSpPr>
+            <p:cNvPr id="48" name="Straight Arrow Connector 47"/>
+            <p:cNvCxnSpPr>
+              <a:stCxn id="5" idx="2"/>
+            </p:cNvCxnSpPr>
+            <p:nvPr/>
+          </p:nvCxnSpPr>
+          <p:spPr>
+            <a:xfrm flipH="1">
+              <a:off x="3571689" y="821237"/>
+              <a:ext cx="1065335" cy="593685"/>
+            </a:xfrm>
+            <a:prstGeom prst="straightConnector1">
+              <a:avLst/>
+            </a:prstGeom>
+            <a:ln>
+              <a:solidFill>
+                <a:srgbClr val="A6A6A6"/>
+              </a:solidFill>
+              <a:tailEnd type="arrow"/>
+            </a:ln>
+            <a:effectLst/>
+          </p:spPr>
+          <p:style>
+            <a:lnRef idx="2">
+              <a:schemeClr val="accent1"/>
+            </a:lnRef>
+            <a:fillRef idx="0">
+              <a:schemeClr val="accent1"/>
+            </a:fillRef>
+            <a:effectRef idx="1">
+              <a:schemeClr val="accent1"/>
+            </a:effectRef>
+            <a:fontRef idx="minor">
+              <a:schemeClr val="tx1"/>
+            </a:fontRef>
+          </p:style>
+        </p:cxnSp>
+        <p:cxnSp>
+          <p:nvCxnSpPr>
+            <p:cNvPr id="51" name="Straight Arrow Connector 50"/>
+            <p:cNvCxnSpPr>
+              <a:stCxn id="5" idx="2"/>
+            </p:cNvCxnSpPr>
+            <p:nvPr/>
+          </p:nvCxnSpPr>
+          <p:spPr>
+            <a:xfrm>
+              <a:off x="4637024" y="821237"/>
+              <a:ext cx="1069848" cy="593685"/>
+            </a:xfrm>
+            <a:prstGeom prst="straightConnector1">
+              <a:avLst/>
+            </a:prstGeom>
+            <a:ln>
+              <a:solidFill>
+                <a:srgbClr val="A6A6A6"/>
+              </a:solidFill>
+              <a:tailEnd type="arrow"/>
+            </a:ln>
+            <a:effectLst/>
+          </p:spPr>
+          <p:style>
+            <a:lnRef idx="2">
+              <a:schemeClr val="accent1"/>
+            </a:lnRef>
+            <a:fillRef idx="0">
+              <a:schemeClr val="accent1"/>
+            </a:fillRef>
+            <a:effectRef idx="1">
+              <a:schemeClr val="accent1"/>
+            </a:effectRef>
+            <a:fontRef idx="minor">
+              <a:schemeClr val="tx1"/>
+            </a:fontRef>
+          </p:style>
+        </p:cxnSp>
+        <p:sp>
+          <p:nvSpPr>
+            <p:cNvPr id="25" name="TextBox 24"/>
+            <p:cNvSpPr txBox="1"/>
+            <p:nvPr/>
+          </p:nvSpPr>
+          <p:spPr>
+            <a:xfrm rot="16200000">
+              <a:off x="2028475" y="2671432"/>
+              <a:ext cx="1014370" cy="461665"/>
+            </a:xfrm>
+            <a:prstGeom prst="rect">
+              <a:avLst/>
+            </a:prstGeom>
+            <a:noFill/>
+          </p:spPr>
+          <p:txBody>
+            <a:bodyPr wrap="none" rtlCol="0">
+              <a:spAutoFit/>
+            </a:bodyPr>
+            <a:lstStyle/>
+            <a:p>
+              <a:pPr algn="ctr"/>
+              <a:r>
+                <a:rPr lang="en-US" sz="1200" dirty="0" smtClean="0">
+                  <a:solidFill>
+                    <a:srgbClr val="0000FF"/>
+                  </a:solidFill>
+                  <a:latin typeface="Arial"/>
+                  <a:cs typeface="Arial"/>
+                </a:rPr>
+                <a:t>Efficient</a:t>
+              </a:r>
+            </a:p>
+            <a:p>
+              <a:pPr algn="ctr"/>
+              <a:r>
+                <a:rPr lang="en-US" sz="1200" dirty="0">
+                  <a:solidFill>
+                    <a:srgbClr val="0000FF"/>
+                  </a:solidFill>
+                  <a:latin typeface="Arial"/>
+                  <a:cs typeface="Arial"/>
+                </a:rPr>
+                <a:t>f</a:t>
+              </a:r>
+              <a:r>
+                <a:rPr lang="en-US" sz="1200" dirty="0" smtClean="0">
+                  <a:solidFill>
+                    <a:srgbClr val="0000FF"/>
+                  </a:solidFill>
+                  <a:latin typeface="Arial"/>
+                  <a:cs typeface="Arial"/>
+                </a:rPr>
+                <a:t>actorization</a:t>
+              </a:r>
+            </a:p>
+          </p:txBody>
+        </p:sp>
+        <p:cxnSp>
+          <p:nvCxnSpPr>
+            <p:cNvPr id="22" name="Straight Arrow Connector 21"/>
+            <p:cNvCxnSpPr>
+              <a:stCxn id="12" idx="2"/>
+            </p:cNvCxnSpPr>
+            <p:nvPr/>
+          </p:nvCxnSpPr>
+          <p:spPr>
+            <a:xfrm>
+              <a:off x="3302764" y="4202100"/>
+              <a:ext cx="6349" cy="1249565"/>
+            </a:xfrm>
+            <a:prstGeom prst="straightConnector1">
+              <a:avLst/>
+            </a:prstGeom>
+            <a:ln>
+              <a:solidFill>
+                <a:srgbClr val="0000FF"/>
+              </a:solidFill>
+              <a:prstDash val="dot"/>
+              <a:headEnd type="arrow"/>
+              <a:tailEnd type="arrow"/>
+            </a:ln>
+            <a:effectLst/>
+          </p:spPr>
+          <p:style>
+            <a:lnRef idx="2">
+              <a:schemeClr val="accent1"/>
+            </a:lnRef>
+            <a:fillRef idx="0">
+              <a:schemeClr val="accent1"/>
+            </a:fillRef>
+            <a:effectRef idx="1">
+              <a:schemeClr val="accent1"/>
+            </a:effectRef>
+            <a:fontRef idx="minor">
+              <a:schemeClr val="tx1"/>
+            </a:fontRef>
+          </p:style>
+        </p:cxnSp>
+        <p:sp>
+          <p:nvSpPr>
+            <p:cNvPr id="28" name="TextBox 27"/>
+            <p:cNvSpPr txBox="1"/>
+            <p:nvPr/>
+          </p:nvSpPr>
+          <p:spPr>
+            <a:xfrm>
+              <a:off x="3949634" y="2133858"/>
+              <a:ext cx="1371727" cy="523220"/>
+            </a:xfrm>
+            <a:prstGeom prst="rect">
+              <a:avLst/>
+            </a:prstGeom>
+            <a:noFill/>
+          </p:spPr>
+          <p:txBody>
+            <a:bodyPr wrap="none" rtlCol="0">
+              <a:spAutoFit/>
+            </a:bodyPr>
+            <a:lstStyle/>
+            <a:p>
+              <a:pPr algn="ctr"/>
+              <a:r>
+                <a:rPr lang="en-US" sz="1400" b="1" dirty="0" err="1" smtClean="0">
+                  <a:solidFill>
+                    <a:schemeClr val="bg1">
+                      <a:lumMod val="50000"/>
+                    </a:schemeClr>
+                  </a:solidFill>
+                  <a:latin typeface="Arial"/>
+                  <a:cs typeface="Arial"/>
+                </a:rPr>
+                <a:t>Denoising</a:t>
+              </a:r>
+              <a:endParaRPr lang="en-US" sz="1400" b="1" dirty="0" smtClean="0">
                 <a:solidFill>
                   <a:schemeClr val="bg1">
                     <a:lumMod val="50000"/>
@@ -3450,11 +4528,47 @@
                 </a:solidFill>
                 <a:latin typeface="Arial"/>
                 <a:cs typeface="Arial"/>
-              </a:rPr>
-              <a:t>(</a:t>
-            </a:r>
-            <a:r>
-              <a:rPr lang="en-US" sz="1400" dirty="0" err="1" smtClean="0">
+              </a:endParaRPr>
+            </a:p>
+            <a:p>
+              <a:pPr algn="ctr"/>
+              <a:r>
+                <a:rPr lang="en-US" sz="1400" dirty="0" smtClean="0">
+                  <a:solidFill>
+                    <a:schemeClr val="bg1">
+                      <a:lumMod val="50000"/>
+                    </a:schemeClr>
+                  </a:solidFill>
+                  <a:latin typeface="Arial"/>
+                  <a:cs typeface="Arial"/>
+                </a:rPr>
+                <a:t>(</a:t>
+              </a:r>
+              <a:r>
+                <a:rPr lang="en-US" sz="1400" dirty="0" err="1" smtClean="0">
+                  <a:solidFill>
+                    <a:schemeClr val="bg1">
+                      <a:lumMod val="50000"/>
+                    </a:schemeClr>
+                  </a:solidFill>
+                  <a:latin typeface="Arial"/>
+                  <a:cs typeface="Arial"/>
+                </a:rPr>
+                <a:t>Krisnaswamy</a:t>
+              </a:r>
+              <a:r>
+                <a:rPr lang="en-US" sz="1400" dirty="0" smtClean="0">
+                  <a:solidFill>
+                    <a:schemeClr val="bg1">
+                      <a:lumMod val="50000"/>
+                    </a:schemeClr>
+                  </a:solidFill>
+                  <a:latin typeface="Arial"/>
+                  <a:cs typeface="Arial"/>
+                </a:rPr>
+                <a:t>)</a:t>
+              </a:r>
+              <a:endParaRPr lang="en-US" sz="1400" dirty="0">
                 <a:solidFill>
                   <a:schemeClr val="bg1">
                     <a:lumMod val="50000"/>
@@ -3462,11 +4576,87 @@
                 </a:solidFill>
                 <a:latin typeface="Arial"/>
                 <a:cs typeface="Arial"/>
-              </a:rPr>
-              <a:t>Garmire</a:t>
-            </a:r>
-            <a:r>
-              <a:rPr lang="en-US" sz="1400" dirty="0" smtClean="0">
+              </a:endParaRPr>
+            </a:p>
+          </p:txBody>
+        </p:sp>
+        <p:cxnSp>
+          <p:nvCxnSpPr>
+            <p:cNvPr id="16" name="Straight Arrow Connector 15"/>
+            <p:cNvCxnSpPr>
+              <a:endCxn id="28" idx="1"/>
+            </p:cNvCxnSpPr>
+            <p:nvPr/>
+          </p:nvCxnSpPr>
+          <p:spPr>
+            <a:xfrm>
+              <a:off x="3297711" y="2104571"/>
+              <a:ext cx="651923" cy="290897"/>
+            </a:xfrm>
+            <a:prstGeom prst="straightConnector1">
+              <a:avLst/>
+            </a:prstGeom>
+            <a:ln>
+              <a:solidFill>
+                <a:schemeClr val="bg1">
+                  <a:lumMod val="65000"/>
+                </a:schemeClr>
+              </a:solidFill>
+              <a:tailEnd type="arrow"/>
+            </a:ln>
+            <a:effectLst/>
+          </p:spPr>
+          <p:style>
+            <a:lnRef idx="2">
+              <a:schemeClr val="accent1"/>
+            </a:lnRef>
+            <a:fillRef idx="0">
+              <a:schemeClr val="accent1"/>
+            </a:fillRef>
+            <a:effectRef idx="1">
+              <a:schemeClr val="accent1"/>
+            </a:effectRef>
+            <a:fontRef idx="minor">
+              <a:schemeClr val="tx1"/>
+            </a:fontRef>
+          </p:style>
+        </p:cxnSp>
+        <p:sp>
+          <p:nvSpPr>
+            <p:cNvPr id="36" name="TextBox 35"/>
+            <p:cNvSpPr txBox="1"/>
+            <p:nvPr/>
+          </p:nvSpPr>
+          <p:spPr>
+            <a:xfrm>
+              <a:off x="5043737" y="5461038"/>
+              <a:ext cx="2339365" cy="523220"/>
+            </a:xfrm>
+            <a:prstGeom prst="rect">
+              <a:avLst/>
+            </a:prstGeom>
+            <a:noFill/>
+          </p:spPr>
+          <p:txBody>
+            <a:bodyPr wrap="none" rtlCol="0">
+              <a:spAutoFit/>
+            </a:bodyPr>
+            <a:lstStyle/>
+            <a:p>
+              <a:pPr algn="ctr"/>
+              <a:r>
+                <a:rPr lang="en-US" sz="1400" b="1" dirty="0" smtClean="0">
+                  <a:solidFill>
+                    <a:schemeClr val="bg1">
+                      <a:lumMod val="50000"/>
+                    </a:schemeClr>
+                  </a:solidFill>
+                  <a:latin typeface="Arial"/>
+                  <a:cs typeface="Arial"/>
+                </a:rPr>
+                <a:t>Biologist-facing Interface</a:t>
+              </a:r>
+              <a:endParaRPr lang="en-US" sz="1400" dirty="0" smtClean="0">
                 <a:solidFill>
                   <a:schemeClr val="bg1">
                     <a:lumMod val="50000"/>
@@ -3474,11 +4664,47 @@
                 </a:solidFill>
                 <a:latin typeface="Arial"/>
                 <a:cs typeface="Arial"/>
-              </a:rPr>
-              <a:t> / </a:t>
-            </a:r>
-            <a:r>
-              <a:rPr lang="en-US" sz="1400" dirty="0" err="1" smtClean="0">
+              </a:endParaRPr>
+            </a:p>
+            <a:p>
+              <a:pPr algn="ctr"/>
+              <a:r>
+                <a:rPr lang="en-US" sz="1400" dirty="0" smtClean="0">
+                  <a:solidFill>
+                    <a:schemeClr val="bg1">
+                      <a:lumMod val="50000"/>
+                    </a:schemeClr>
+                  </a:solidFill>
+                  <a:latin typeface="Arial"/>
+                  <a:cs typeface="Arial"/>
+                </a:rPr>
+                <a:t>(</a:t>
+              </a:r>
+              <a:r>
+                <a:rPr lang="en-US" sz="1400" dirty="0" err="1" smtClean="0">
+                  <a:solidFill>
+                    <a:schemeClr val="bg1">
+                      <a:lumMod val="50000"/>
+                    </a:schemeClr>
+                  </a:solidFill>
+                  <a:latin typeface="Arial"/>
+                  <a:cs typeface="Arial"/>
+                </a:rPr>
+                <a:t>Garmire</a:t>
+              </a:r>
+              <a:r>
+                <a:rPr lang="en-US" sz="1400" dirty="0" smtClean="0">
+                  <a:solidFill>
+                    <a:schemeClr val="bg1">
+                      <a:lumMod val="50000"/>
+                    </a:schemeClr>
+                  </a:solidFill>
+                  <a:latin typeface="Arial"/>
+                  <a:cs typeface="Arial"/>
+                </a:rPr>
+                <a:t>)</a:t>
+              </a:r>
+              <a:endParaRPr lang="en-US" sz="1400" dirty="0">
                 <a:solidFill>
                   <a:schemeClr val="bg1">
                     <a:lumMod val="50000"/>
@@ -3486,1383 +4712,89 @@
                 </a:solidFill>
                 <a:latin typeface="Arial"/>
                 <a:cs typeface="Arial"/>
-              </a:rPr>
-              <a:t>Krishnaswamy</a:t>
-            </a:r>
-            <a:r>
-              <a:rPr lang="en-US" sz="1400" dirty="0" smtClean="0">
-                <a:solidFill>
-                  <a:schemeClr val="bg1">
-                    <a:lumMod val="50000"/>
-                  </a:schemeClr>
-                </a:solidFill>
-                <a:latin typeface="Arial"/>
-                <a:cs typeface="Arial"/>
-              </a:rPr>
-              <a:t>)</a:t>
-            </a:r>
-            <a:endParaRPr lang="en-US" sz="1400" dirty="0">
+              </a:endParaRPr>
+            </a:p>
+          </p:txBody>
+        </p:sp>
+        <p:cxnSp>
+          <p:nvCxnSpPr>
+            <p:cNvPr id="53" name="Straight Arrow Connector 52"/>
+            <p:cNvCxnSpPr/>
+            <p:nvPr/>
+          </p:nvCxnSpPr>
+          <p:spPr>
+            <a:xfrm flipH="1">
+              <a:off x="3284162" y="2540000"/>
+              <a:ext cx="665473" cy="0"/>
+            </a:xfrm>
+            <a:prstGeom prst="straightConnector1">
+              <a:avLst/>
+            </a:prstGeom>
+            <a:ln>
+              <a:solidFill>
+                <a:srgbClr val="0000FF"/>
+              </a:solidFill>
+              <a:prstDash val="dot"/>
+              <a:headEnd type="arrow"/>
+              <a:tailEnd type="arrow"/>
+            </a:ln>
+            <a:effectLst/>
+          </p:spPr>
+          <p:style>
+            <a:lnRef idx="2">
+              <a:schemeClr val="accent1"/>
+            </a:lnRef>
+            <a:fillRef idx="0">
+              <a:schemeClr val="accent1"/>
+            </a:fillRef>
+            <a:effectRef idx="1">
+              <a:schemeClr val="accent1"/>
+            </a:effectRef>
+            <a:fontRef idx="minor">
+              <a:schemeClr val="tx1"/>
+            </a:fontRef>
+          </p:style>
+        </p:cxnSp>
+        <p:cxnSp>
+          <p:nvCxnSpPr>
+            <p:cNvPr id="19" name="Straight Arrow Connector 18"/>
+            <p:cNvCxnSpPr/>
+            <p:nvPr/>
+          </p:nvCxnSpPr>
+          <p:spPr>
+            <a:xfrm flipH="1" flipV="1">
+              <a:off x="4079875" y="5633549"/>
+              <a:ext cx="884488" cy="0"/>
+            </a:xfrm>
+            <a:prstGeom prst="straightConnector1">
+              <a:avLst/>
+            </a:prstGeom>
+            <a:ln>
               <a:solidFill>
                 <a:schemeClr val="bg1">
                   <a:lumMod val="50000"/>
                 </a:schemeClr>
               </a:solidFill>
-              <a:latin typeface="Arial"/>
-              <a:cs typeface="Arial"/>
-            </a:endParaRPr>
-          </a:p>
-        </p:txBody>
-      </p:sp>
-      <p:sp>
-        <p:nvSpPr>
-          <p:cNvPr id="11" name="TextBox 10"/>
-          <p:cNvSpPr txBox="1"/>
-          <p:nvPr/>
-        </p:nvSpPr>
-        <p:spPr>
-          <a:xfrm>
-            <a:off x="5252816" y="3678880"/>
-            <a:ext cx="2130286" cy="523220"/>
-          </a:xfrm>
-          <a:prstGeom prst="rect">
-            <a:avLst/>
-          </a:prstGeom>
-          <a:noFill/>
-        </p:spPr>
-        <p:txBody>
-          <a:bodyPr wrap="none" rtlCol="0">
-            <a:spAutoFit/>
-          </a:bodyPr>
-          <a:lstStyle/>
-          <a:p>
-            <a:pPr algn="ctr"/>
-            <a:r>
-              <a:rPr lang="en-US" sz="1400" b="1" dirty="0" smtClean="0">
-                <a:solidFill>
-                  <a:schemeClr val="bg1">
-                    <a:lumMod val="50000"/>
-                  </a:schemeClr>
-                </a:solidFill>
-                <a:latin typeface="Arial"/>
-                <a:cs typeface="Arial"/>
-              </a:rPr>
-              <a:t>Gene signatures</a:t>
-            </a:r>
-            <a:endParaRPr lang="en-US" sz="1400" dirty="0" smtClean="0">
-              <a:solidFill>
-                <a:schemeClr val="bg1">
-                  <a:lumMod val="50000"/>
-                </a:schemeClr>
-              </a:solidFill>
-              <a:latin typeface="Arial"/>
-              <a:cs typeface="Arial"/>
-            </a:endParaRPr>
-          </a:p>
-          <a:p>
-            <a:pPr algn="ctr"/>
-            <a:r>
-              <a:rPr lang="en-US" sz="1400" dirty="0" smtClean="0">
-                <a:solidFill>
-                  <a:schemeClr val="bg1">
-                    <a:lumMod val="50000"/>
-                  </a:schemeClr>
-                </a:solidFill>
-                <a:latin typeface="Arial"/>
-                <a:cs typeface="Arial"/>
-              </a:rPr>
-              <a:t>(</a:t>
-            </a:r>
-            <a:r>
-              <a:rPr lang="en-US" sz="1400" dirty="0" smtClean="0">
-                <a:solidFill>
-                  <a:schemeClr val="bg1">
-                    <a:lumMod val="50000"/>
-                  </a:schemeClr>
-                </a:solidFill>
-                <a:latin typeface="Arial"/>
-                <a:cs typeface="Arial"/>
-              </a:rPr>
-              <a:t>Greene / </a:t>
-            </a:r>
-            <a:r>
-              <a:rPr lang="en-US" sz="1400" dirty="0" err="1" smtClean="0">
-                <a:solidFill>
-                  <a:schemeClr val="bg1">
-                    <a:lumMod val="50000"/>
-                  </a:schemeClr>
-                </a:solidFill>
-                <a:latin typeface="Arial"/>
-                <a:cs typeface="Arial"/>
-              </a:rPr>
-              <a:t>Krisnaswamy</a:t>
-            </a:r>
-            <a:r>
-              <a:rPr lang="en-US" sz="1400" dirty="0" smtClean="0">
-                <a:solidFill>
-                  <a:schemeClr val="bg1">
-                    <a:lumMod val="50000"/>
-                  </a:schemeClr>
-                </a:solidFill>
-                <a:latin typeface="Arial"/>
-                <a:cs typeface="Arial"/>
-              </a:rPr>
-              <a:t>)</a:t>
-            </a:r>
-            <a:endParaRPr lang="en-US" sz="1400" dirty="0">
-              <a:solidFill>
-                <a:schemeClr val="bg1">
-                  <a:lumMod val="50000"/>
-                </a:schemeClr>
-              </a:solidFill>
-              <a:latin typeface="Arial"/>
-              <a:cs typeface="Arial"/>
-            </a:endParaRPr>
-          </a:p>
-        </p:txBody>
-      </p:sp>
-      <p:sp>
-        <p:nvSpPr>
-          <p:cNvPr id="12" name="TextBox 11"/>
-          <p:cNvSpPr txBox="1"/>
-          <p:nvPr/>
-        </p:nvSpPr>
-        <p:spPr>
-          <a:xfrm>
-            <a:off x="1948285" y="3678880"/>
-            <a:ext cx="2708957" cy="523220"/>
-          </a:xfrm>
-          <a:prstGeom prst="rect">
-            <a:avLst/>
-          </a:prstGeom>
-          <a:noFill/>
-        </p:spPr>
-        <p:txBody>
-          <a:bodyPr wrap="none" rtlCol="0">
-            <a:spAutoFit/>
-          </a:bodyPr>
-          <a:lstStyle/>
-          <a:p>
-            <a:pPr algn="ctr"/>
-            <a:r>
-              <a:rPr lang="en-US" sz="1400" b="1" dirty="0" smtClean="0">
-                <a:solidFill>
-                  <a:srgbClr val="0000FF"/>
-                </a:solidFill>
-                <a:latin typeface="Arial"/>
-                <a:cs typeface="Arial"/>
-              </a:rPr>
-              <a:t>Trajectory / temporal patterns</a:t>
-            </a:r>
-            <a:endParaRPr lang="en-US" sz="1400" dirty="0" smtClean="0">
-              <a:solidFill>
-                <a:srgbClr val="0000FF"/>
-              </a:solidFill>
-              <a:latin typeface="Arial"/>
-              <a:cs typeface="Arial"/>
-            </a:endParaRPr>
-          </a:p>
-          <a:p>
-            <a:pPr algn="ctr"/>
-            <a:r>
-              <a:rPr lang="en-US" sz="1400" dirty="0" smtClean="0">
-                <a:solidFill>
-                  <a:srgbClr val="0000FF"/>
-                </a:solidFill>
-                <a:latin typeface="Arial"/>
-                <a:cs typeface="Arial"/>
-              </a:rPr>
-              <a:t>(Fertig)</a:t>
-            </a:r>
-            <a:endParaRPr lang="en-US" sz="1400" dirty="0">
-              <a:solidFill>
-                <a:srgbClr val="0000FF"/>
-              </a:solidFill>
-              <a:latin typeface="Arial"/>
-              <a:cs typeface="Arial"/>
-            </a:endParaRPr>
-          </a:p>
-        </p:txBody>
-      </p:sp>
-      <p:sp>
-        <p:nvSpPr>
-          <p:cNvPr id="20" name="TextBox 19"/>
-          <p:cNvSpPr txBox="1"/>
-          <p:nvPr/>
-        </p:nvSpPr>
-        <p:spPr>
-          <a:xfrm rot="16200000">
-            <a:off x="2221010" y="2613916"/>
-            <a:ext cx="1664638" cy="461665"/>
-          </a:xfrm>
-          <a:prstGeom prst="rect">
-            <a:avLst/>
-          </a:prstGeom>
-          <a:noFill/>
-        </p:spPr>
-        <p:txBody>
-          <a:bodyPr wrap="none" rtlCol="0">
-            <a:spAutoFit/>
-          </a:bodyPr>
-          <a:lstStyle/>
-          <a:p>
-            <a:pPr algn="ctr"/>
-            <a:r>
-              <a:rPr lang="en-US" sz="1200" dirty="0" smtClean="0">
-                <a:solidFill>
-                  <a:srgbClr val="0000FF"/>
-                </a:solidFill>
-                <a:latin typeface="Arial"/>
-                <a:cs typeface="Arial"/>
-              </a:rPr>
-              <a:t>Sensitivity to input</a:t>
-            </a:r>
-          </a:p>
-          <a:p>
-            <a:pPr algn="ctr"/>
-            <a:r>
-              <a:rPr lang="en-US" sz="1200" dirty="0" smtClean="0">
-                <a:solidFill>
-                  <a:srgbClr val="0000FF"/>
-                </a:solidFill>
-                <a:latin typeface="Arial"/>
-                <a:cs typeface="Arial"/>
-              </a:rPr>
-              <a:t>features and variance</a:t>
-            </a:r>
-            <a:endParaRPr lang="en-US" sz="1200" dirty="0">
-              <a:solidFill>
-                <a:srgbClr val="0000FF"/>
-              </a:solidFill>
-              <a:latin typeface="Arial"/>
-              <a:cs typeface="Arial"/>
-            </a:endParaRPr>
-          </a:p>
-        </p:txBody>
-      </p:sp>
-      <p:sp>
-        <p:nvSpPr>
-          <p:cNvPr id="9" name="TextBox 8"/>
-          <p:cNvSpPr txBox="1"/>
-          <p:nvPr/>
-        </p:nvSpPr>
-        <p:spPr>
-          <a:xfrm>
-            <a:off x="2272770" y="1503726"/>
-            <a:ext cx="2059979" cy="523220"/>
-          </a:xfrm>
-          <a:prstGeom prst="rect">
-            <a:avLst/>
-          </a:prstGeom>
-          <a:noFill/>
-        </p:spPr>
-        <p:txBody>
-          <a:bodyPr wrap="none" rtlCol="0">
-            <a:spAutoFit/>
-          </a:bodyPr>
-          <a:lstStyle/>
-          <a:p>
-            <a:pPr algn="ctr"/>
-            <a:r>
-              <a:rPr lang="en-US" sz="1400" b="1" dirty="0" smtClean="0">
-                <a:solidFill>
-                  <a:schemeClr val="bg1">
-                    <a:lumMod val="50000"/>
-                  </a:schemeClr>
-                </a:solidFill>
-                <a:latin typeface="Arial"/>
-                <a:cs typeface="Arial"/>
-              </a:rPr>
-              <a:t>Feature </a:t>
-            </a:r>
-            <a:r>
-              <a:rPr lang="en-US" sz="1400" b="1" dirty="0" smtClean="0">
-                <a:solidFill>
-                  <a:schemeClr val="bg1">
-                    <a:lumMod val="50000"/>
-                  </a:schemeClr>
-                </a:solidFill>
-                <a:latin typeface="Arial"/>
-                <a:cs typeface="Arial"/>
-              </a:rPr>
-              <a:t>quantification</a:t>
-            </a:r>
-            <a:endParaRPr lang="en-US" sz="1400" b="1" dirty="0" smtClean="0">
-              <a:solidFill>
-                <a:schemeClr val="bg1">
-                  <a:lumMod val="50000"/>
-                </a:schemeClr>
-              </a:solidFill>
-              <a:latin typeface="Arial"/>
-              <a:cs typeface="Arial"/>
-            </a:endParaRPr>
-          </a:p>
-          <a:p>
-            <a:pPr algn="ctr"/>
-            <a:r>
-              <a:rPr lang="en-US" sz="1400" dirty="0" smtClean="0">
-                <a:solidFill>
-                  <a:schemeClr val="bg1">
-                    <a:lumMod val="50000"/>
-                  </a:schemeClr>
-                </a:solidFill>
-                <a:latin typeface="Arial"/>
-                <a:cs typeface="Arial"/>
-              </a:rPr>
-              <a:t>(</a:t>
-            </a:r>
-            <a:r>
-              <a:rPr lang="en-US" sz="1400" dirty="0" err="1" smtClean="0">
-                <a:solidFill>
-                  <a:schemeClr val="bg1">
-                    <a:lumMod val="50000"/>
-                  </a:schemeClr>
-                </a:solidFill>
-                <a:latin typeface="Arial"/>
-                <a:cs typeface="Arial"/>
-              </a:rPr>
-              <a:t>Patro</a:t>
-            </a:r>
-            <a:r>
-              <a:rPr lang="en-US" sz="1400" dirty="0" smtClean="0">
-                <a:solidFill>
-                  <a:schemeClr val="bg1">
-                    <a:lumMod val="50000"/>
-                  </a:schemeClr>
-                </a:solidFill>
-                <a:latin typeface="Arial"/>
-                <a:cs typeface="Arial"/>
-              </a:rPr>
-              <a:t>)</a:t>
-            </a:r>
-            <a:endParaRPr lang="en-US" sz="1400" dirty="0">
-              <a:solidFill>
-                <a:schemeClr val="bg1">
-                  <a:lumMod val="50000"/>
-                </a:schemeClr>
-              </a:solidFill>
-              <a:latin typeface="Arial"/>
-              <a:cs typeface="Arial"/>
-            </a:endParaRPr>
-          </a:p>
-        </p:txBody>
-      </p:sp>
-      <p:sp>
-        <p:nvSpPr>
-          <p:cNvPr id="10" name="TextBox 9"/>
-          <p:cNvSpPr txBox="1"/>
-          <p:nvPr/>
-        </p:nvSpPr>
-        <p:spPr>
-          <a:xfrm>
-            <a:off x="5591980" y="1503726"/>
-            <a:ext cx="1451940" cy="523220"/>
-          </a:xfrm>
-          <a:prstGeom prst="rect">
-            <a:avLst/>
-          </a:prstGeom>
-          <a:noFill/>
-        </p:spPr>
-        <p:txBody>
-          <a:bodyPr wrap="none" rtlCol="0">
-            <a:spAutoFit/>
-          </a:bodyPr>
-          <a:lstStyle/>
-          <a:p>
-            <a:pPr algn="ctr"/>
-            <a:r>
-              <a:rPr lang="en-US" sz="1400" b="1" dirty="0" smtClean="0">
-                <a:solidFill>
-                  <a:schemeClr val="bg1">
-                    <a:lumMod val="50000"/>
-                  </a:schemeClr>
-                </a:solidFill>
-                <a:latin typeface="Arial"/>
-                <a:cs typeface="Arial"/>
-              </a:rPr>
-              <a:t>Image features</a:t>
-            </a:r>
-            <a:endParaRPr lang="en-US" sz="1400" dirty="0" smtClean="0">
-              <a:solidFill>
-                <a:schemeClr val="bg1">
-                  <a:lumMod val="50000"/>
-                </a:schemeClr>
-              </a:solidFill>
-              <a:latin typeface="Arial"/>
-              <a:cs typeface="Arial"/>
-            </a:endParaRPr>
-          </a:p>
-          <a:p>
-            <a:pPr algn="ctr"/>
-            <a:r>
-              <a:rPr lang="en-US" sz="1400" dirty="0" smtClean="0">
-                <a:solidFill>
-                  <a:schemeClr val="bg1">
-                    <a:lumMod val="50000"/>
-                  </a:schemeClr>
-                </a:solidFill>
-                <a:latin typeface="Arial"/>
-                <a:cs typeface="Arial"/>
-              </a:rPr>
-              <a:t>(Raj)</a:t>
-            </a:r>
-            <a:endParaRPr lang="en-US" sz="1400" dirty="0">
-              <a:solidFill>
-                <a:schemeClr val="bg1">
-                  <a:lumMod val="50000"/>
-                </a:schemeClr>
-              </a:solidFill>
-              <a:latin typeface="Arial"/>
-              <a:cs typeface="Arial"/>
-            </a:endParaRPr>
-          </a:p>
-        </p:txBody>
-      </p:sp>
-      <p:sp>
-        <p:nvSpPr>
-          <p:cNvPr id="15" name="TextBox 14"/>
-          <p:cNvSpPr txBox="1"/>
-          <p:nvPr/>
-        </p:nvSpPr>
-        <p:spPr>
-          <a:xfrm rot="16200000">
-            <a:off x="6107366" y="2471600"/>
-            <a:ext cx="1142861" cy="646331"/>
-          </a:xfrm>
-          <a:prstGeom prst="rect">
-            <a:avLst/>
-          </a:prstGeom>
-          <a:noFill/>
-        </p:spPr>
-        <p:txBody>
-          <a:bodyPr wrap="none" rtlCol="0">
-            <a:spAutoFit/>
-          </a:bodyPr>
-          <a:lstStyle/>
-          <a:p>
-            <a:pPr algn="ctr"/>
-            <a:r>
-              <a:rPr lang="en-US" sz="1200" dirty="0" smtClean="0">
-                <a:solidFill>
-                  <a:schemeClr val="bg1">
-                    <a:lumMod val="50000"/>
-                  </a:schemeClr>
-                </a:solidFill>
-                <a:latin typeface="Arial"/>
-                <a:cs typeface="Arial"/>
-              </a:rPr>
-              <a:t>Deep learning</a:t>
-            </a:r>
-          </a:p>
-          <a:p>
-            <a:pPr algn="ctr"/>
-            <a:r>
-              <a:rPr lang="en-US" sz="1200" dirty="0" smtClean="0">
-                <a:solidFill>
-                  <a:schemeClr val="bg1">
-                    <a:lumMod val="50000"/>
-                  </a:schemeClr>
-                </a:solidFill>
-                <a:latin typeface="Arial"/>
-                <a:cs typeface="Arial"/>
-              </a:rPr>
-              <a:t>/ benchmark</a:t>
-            </a:r>
-          </a:p>
-          <a:p>
-            <a:pPr algn="ctr"/>
-            <a:r>
-              <a:rPr lang="en-US" sz="1200" dirty="0" smtClean="0">
-                <a:solidFill>
-                  <a:schemeClr val="bg1">
-                    <a:lumMod val="50000"/>
-                  </a:schemeClr>
-                </a:solidFill>
-                <a:latin typeface="Arial"/>
-                <a:cs typeface="Arial"/>
-              </a:rPr>
-              <a:t>data</a:t>
-            </a:r>
-            <a:endParaRPr lang="en-US" sz="1200" dirty="0">
-              <a:solidFill>
-                <a:schemeClr val="bg1">
-                  <a:lumMod val="50000"/>
-                </a:schemeClr>
-              </a:solidFill>
-              <a:latin typeface="Arial"/>
-              <a:cs typeface="Arial"/>
-            </a:endParaRPr>
-          </a:p>
-        </p:txBody>
-      </p:sp>
-      <p:cxnSp>
-        <p:nvCxnSpPr>
-          <p:cNvPr id="17" name="Straight Arrow Connector 16"/>
-          <p:cNvCxnSpPr>
-            <a:stCxn id="10" idx="2"/>
-          </p:cNvCxnSpPr>
-          <p:nvPr/>
-        </p:nvCxnSpPr>
-        <p:spPr>
-          <a:xfrm>
-            <a:off x="6317950" y="2026946"/>
-            <a:ext cx="1" cy="1630577"/>
-          </a:xfrm>
-          <a:prstGeom prst="straightConnector1">
-            <a:avLst/>
-          </a:prstGeom>
-          <a:ln>
-            <a:solidFill>
-              <a:srgbClr val="A6A6A6"/>
-            </a:solidFill>
-            <a:prstDash val="dot"/>
-            <a:headEnd type="arrow"/>
-            <a:tailEnd type="arrow"/>
-          </a:ln>
-          <a:effectLst/>
-        </p:spPr>
-        <p:style>
-          <a:lnRef idx="2">
-            <a:schemeClr val="accent1"/>
-          </a:lnRef>
-          <a:fillRef idx="0">
-            <a:schemeClr val="accent1"/>
-          </a:fillRef>
-          <a:effectRef idx="1">
-            <a:schemeClr val="accent1"/>
-          </a:effectRef>
-          <a:fontRef idx="minor">
-            <a:schemeClr val="tx1"/>
-          </a:fontRef>
-        </p:style>
-      </p:cxnSp>
-      <p:cxnSp>
-        <p:nvCxnSpPr>
-          <p:cNvPr id="18" name="Straight Arrow Connector 17"/>
-          <p:cNvCxnSpPr/>
-          <p:nvPr/>
-        </p:nvCxnSpPr>
-        <p:spPr>
-          <a:xfrm>
-            <a:off x="2794670" y="2026946"/>
-            <a:ext cx="0" cy="1599670"/>
-          </a:xfrm>
-          <a:prstGeom prst="straightConnector1">
-            <a:avLst/>
-          </a:prstGeom>
-          <a:ln>
-            <a:solidFill>
-              <a:srgbClr val="0000FF"/>
-            </a:solidFill>
-            <a:prstDash val="dot"/>
-            <a:headEnd type="arrow"/>
-            <a:tailEnd type="arrow"/>
-          </a:ln>
-          <a:effectLst/>
-        </p:spPr>
-        <p:style>
-          <a:lnRef idx="2">
-            <a:schemeClr val="accent1"/>
-          </a:lnRef>
-          <a:fillRef idx="0">
-            <a:schemeClr val="accent1"/>
-          </a:fillRef>
-          <a:effectRef idx="1">
-            <a:schemeClr val="accent1"/>
-          </a:effectRef>
-          <a:fontRef idx="minor">
-            <a:schemeClr val="tx1"/>
-          </a:fontRef>
-        </p:style>
-      </p:cxnSp>
-      <p:cxnSp>
-        <p:nvCxnSpPr>
-          <p:cNvPr id="23" name="Curved Connector 22"/>
-          <p:cNvCxnSpPr>
-            <a:stCxn id="12" idx="0"/>
-            <a:endCxn id="11" idx="0"/>
-          </p:cNvCxnSpPr>
-          <p:nvPr/>
-        </p:nvCxnSpPr>
-        <p:spPr>
-          <a:xfrm rot="5400000" flipH="1" flipV="1">
-            <a:off x="4810361" y="2171283"/>
-            <a:ext cx="12700" cy="3015195"/>
-          </a:xfrm>
-          <a:prstGeom prst="curvedConnector3">
-            <a:avLst>
-              <a:gd name="adj1" fmla="val 1800000"/>
-            </a:avLst>
-          </a:prstGeom>
-          <a:ln>
-            <a:solidFill>
-              <a:srgbClr val="0000FF"/>
-            </a:solidFill>
-            <a:prstDash val="dot"/>
-            <a:headEnd type="arrow"/>
-            <a:tailEnd type="arrow"/>
-          </a:ln>
-          <a:effectLst/>
-        </p:spPr>
-        <p:style>
-          <a:lnRef idx="2">
-            <a:schemeClr val="accent1"/>
-          </a:lnRef>
-          <a:fillRef idx="0">
-            <a:schemeClr val="accent1"/>
-          </a:fillRef>
-          <a:effectRef idx="1">
-            <a:schemeClr val="accent1"/>
-          </a:effectRef>
-          <a:fontRef idx="minor">
-            <a:schemeClr val="tx1"/>
-          </a:fontRef>
-        </p:style>
-      </p:cxnSp>
-      <p:cxnSp>
-        <p:nvCxnSpPr>
-          <p:cNvPr id="27" name="Straight Arrow Connector 26"/>
-          <p:cNvCxnSpPr>
-            <a:stCxn id="28" idx="2"/>
-            <a:endCxn id="12" idx="0"/>
-          </p:cNvCxnSpPr>
-          <p:nvPr/>
-        </p:nvCxnSpPr>
-        <p:spPr>
-          <a:xfrm flipH="1">
-            <a:off x="3302764" y="2657078"/>
-            <a:ext cx="1332734" cy="1021802"/>
-          </a:xfrm>
-          <a:prstGeom prst="straightConnector1">
-            <a:avLst/>
-          </a:prstGeom>
-          <a:ln>
-            <a:solidFill>
-              <a:srgbClr val="0000FF"/>
-            </a:solidFill>
-            <a:tailEnd type="arrow"/>
-          </a:ln>
-          <a:effectLst/>
-        </p:spPr>
-        <p:style>
-          <a:lnRef idx="2">
-            <a:schemeClr val="accent1"/>
-          </a:lnRef>
-          <a:fillRef idx="0">
-            <a:schemeClr val="accent1"/>
-          </a:fillRef>
-          <a:effectRef idx="1">
-            <a:schemeClr val="accent1"/>
-          </a:effectRef>
-          <a:fontRef idx="minor">
-            <a:schemeClr val="tx1"/>
-          </a:fontRef>
-        </p:style>
-      </p:cxnSp>
-      <p:cxnSp>
-        <p:nvCxnSpPr>
-          <p:cNvPr id="29" name="Straight Arrow Connector 28"/>
-          <p:cNvCxnSpPr>
-            <a:stCxn id="28" idx="2"/>
-          </p:cNvCxnSpPr>
-          <p:nvPr/>
-        </p:nvCxnSpPr>
-        <p:spPr>
-          <a:xfrm>
-            <a:off x="4635498" y="2657078"/>
-            <a:ext cx="1682452" cy="868877"/>
-          </a:xfrm>
-          <a:prstGeom prst="straightConnector1">
-            <a:avLst/>
-          </a:prstGeom>
-          <a:ln>
-            <a:solidFill>
-              <a:srgbClr val="A6A6A6"/>
-            </a:solidFill>
-            <a:tailEnd type="arrow"/>
-          </a:ln>
-          <a:effectLst/>
-        </p:spPr>
-        <p:style>
-          <a:lnRef idx="2">
-            <a:schemeClr val="accent1"/>
-          </a:lnRef>
-          <a:fillRef idx="0">
-            <a:schemeClr val="accent1"/>
-          </a:fillRef>
-          <a:effectRef idx="1">
-            <a:schemeClr val="accent1"/>
-          </a:effectRef>
-          <a:fontRef idx="minor">
-            <a:schemeClr val="tx1"/>
-          </a:fontRef>
-        </p:style>
-      </p:cxnSp>
-      <p:sp>
-        <p:nvSpPr>
-          <p:cNvPr id="21" name="TextBox 20"/>
-          <p:cNvSpPr txBox="1"/>
-          <p:nvPr/>
-        </p:nvSpPr>
-        <p:spPr>
-          <a:xfrm>
-            <a:off x="3801453" y="3213483"/>
-            <a:ext cx="2049509" cy="276999"/>
-          </a:xfrm>
-          <a:prstGeom prst="rect">
-            <a:avLst/>
-          </a:prstGeom>
-          <a:noFill/>
-        </p:spPr>
-        <p:txBody>
-          <a:bodyPr wrap="none" rtlCol="0">
-            <a:spAutoFit/>
-          </a:bodyPr>
-          <a:lstStyle/>
-          <a:p>
-            <a:pPr algn="ctr"/>
-            <a:r>
-              <a:rPr lang="en-US" sz="1200" dirty="0" smtClean="0">
-                <a:solidFill>
-                  <a:srgbClr val="0000FF"/>
-                </a:solidFill>
-                <a:latin typeface="Arial"/>
-                <a:cs typeface="Arial"/>
-              </a:rPr>
-              <a:t>Sub/re-</a:t>
-            </a:r>
-            <a:r>
-              <a:rPr lang="en-US" sz="1200" dirty="0" smtClean="0">
-                <a:solidFill>
-                  <a:srgbClr val="0000FF"/>
-                </a:solidFill>
-                <a:latin typeface="Arial"/>
-                <a:cs typeface="Arial"/>
-              </a:rPr>
-              <a:t>sampling evaluation</a:t>
-            </a:r>
-            <a:endParaRPr lang="en-US" sz="1200" dirty="0">
-              <a:solidFill>
-                <a:srgbClr val="0000FF"/>
-              </a:solidFill>
-              <a:latin typeface="Arial"/>
-              <a:cs typeface="Arial"/>
-            </a:endParaRPr>
-          </a:p>
-        </p:txBody>
-      </p:sp>
-      <p:cxnSp>
-        <p:nvCxnSpPr>
-          <p:cNvPr id="39" name="Straight Arrow Connector 38"/>
-          <p:cNvCxnSpPr>
-            <a:stCxn id="12" idx="2"/>
-          </p:cNvCxnSpPr>
-          <p:nvPr/>
-        </p:nvCxnSpPr>
-        <p:spPr>
-          <a:xfrm>
-            <a:off x="3302764" y="4202100"/>
-            <a:ext cx="1332734" cy="429656"/>
-          </a:xfrm>
-          <a:prstGeom prst="straightConnector1">
-            <a:avLst/>
-          </a:prstGeom>
-          <a:ln>
-            <a:solidFill>
-              <a:srgbClr val="0000FF"/>
-            </a:solidFill>
-            <a:tailEnd type="arrow"/>
-          </a:ln>
-          <a:effectLst/>
-        </p:spPr>
-        <p:style>
-          <a:lnRef idx="2">
-            <a:schemeClr val="accent1"/>
-          </a:lnRef>
-          <a:fillRef idx="0">
-            <a:schemeClr val="accent1"/>
-          </a:fillRef>
-          <a:effectRef idx="1">
-            <a:schemeClr val="accent1"/>
-          </a:effectRef>
-          <a:fontRef idx="minor">
-            <a:schemeClr val="tx1"/>
-          </a:fontRef>
-        </p:style>
-      </p:cxnSp>
-      <p:cxnSp>
-        <p:nvCxnSpPr>
-          <p:cNvPr id="41" name="Straight Arrow Connector 40"/>
-          <p:cNvCxnSpPr>
-            <a:stCxn id="11" idx="2"/>
-            <a:endCxn id="13" idx="0"/>
-          </p:cNvCxnSpPr>
-          <p:nvPr/>
-        </p:nvCxnSpPr>
-        <p:spPr>
-          <a:xfrm flipH="1">
-            <a:off x="4706481" y="4202100"/>
-            <a:ext cx="1611478" cy="429656"/>
-          </a:xfrm>
-          <a:prstGeom prst="straightConnector1">
-            <a:avLst/>
-          </a:prstGeom>
-          <a:ln>
-            <a:solidFill>
-              <a:srgbClr val="A6A6A6"/>
-            </a:solidFill>
-            <a:tailEnd type="arrow"/>
-          </a:ln>
-          <a:effectLst/>
-        </p:spPr>
-        <p:style>
-          <a:lnRef idx="2">
-            <a:schemeClr val="accent1"/>
-          </a:lnRef>
-          <a:fillRef idx="0">
-            <a:schemeClr val="accent1"/>
-          </a:fillRef>
-          <a:effectRef idx="1">
-            <a:schemeClr val="accent1"/>
-          </a:effectRef>
-          <a:fontRef idx="minor">
-            <a:schemeClr val="tx1"/>
-          </a:fontRef>
-        </p:style>
-      </p:cxnSp>
-      <p:cxnSp>
-        <p:nvCxnSpPr>
-          <p:cNvPr id="43" name="Straight Arrow Connector 42"/>
-          <p:cNvCxnSpPr/>
-          <p:nvPr/>
-        </p:nvCxnSpPr>
-        <p:spPr>
-          <a:xfrm>
-            <a:off x="4702847" y="5113502"/>
-            <a:ext cx="7268" cy="347536"/>
-          </a:xfrm>
-          <a:prstGeom prst="straightConnector1">
-            <a:avLst/>
-          </a:prstGeom>
-          <a:ln>
-            <a:solidFill>
-              <a:srgbClr val="A6A6A6"/>
-            </a:solidFill>
-            <a:tailEnd type="arrow"/>
-          </a:ln>
-          <a:effectLst/>
-        </p:spPr>
-        <p:style>
-          <a:lnRef idx="2">
-            <a:schemeClr val="accent1"/>
-          </a:lnRef>
-          <a:fillRef idx="0">
-            <a:schemeClr val="accent1"/>
-          </a:fillRef>
-          <a:effectRef idx="1">
-            <a:schemeClr val="accent1"/>
-          </a:effectRef>
-          <a:fontRef idx="minor">
-            <a:schemeClr val="tx1"/>
-          </a:fontRef>
-        </p:style>
-      </p:cxnSp>
-      <p:cxnSp>
-        <p:nvCxnSpPr>
-          <p:cNvPr id="48" name="Straight Arrow Connector 47"/>
-          <p:cNvCxnSpPr>
-            <a:stCxn id="5" idx="2"/>
-          </p:cNvCxnSpPr>
-          <p:nvPr/>
-        </p:nvCxnSpPr>
-        <p:spPr>
-          <a:xfrm flipH="1">
-            <a:off x="3571689" y="821237"/>
-            <a:ext cx="1065335" cy="593685"/>
-          </a:xfrm>
-          <a:prstGeom prst="straightConnector1">
-            <a:avLst/>
-          </a:prstGeom>
-          <a:ln>
-            <a:solidFill>
-              <a:srgbClr val="A6A6A6"/>
-            </a:solidFill>
-            <a:tailEnd type="arrow"/>
-          </a:ln>
-          <a:effectLst/>
-        </p:spPr>
-        <p:style>
-          <a:lnRef idx="2">
-            <a:schemeClr val="accent1"/>
-          </a:lnRef>
-          <a:fillRef idx="0">
-            <a:schemeClr val="accent1"/>
-          </a:fillRef>
-          <a:effectRef idx="1">
-            <a:schemeClr val="accent1"/>
-          </a:effectRef>
-          <a:fontRef idx="minor">
-            <a:schemeClr val="tx1"/>
-          </a:fontRef>
-        </p:style>
-      </p:cxnSp>
-      <p:cxnSp>
-        <p:nvCxnSpPr>
-          <p:cNvPr id="51" name="Straight Arrow Connector 50"/>
-          <p:cNvCxnSpPr>
-            <a:stCxn id="5" idx="2"/>
-          </p:cNvCxnSpPr>
-          <p:nvPr/>
-        </p:nvCxnSpPr>
-        <p:spPr>
-          <a:xfrm>
-            <a:off x="4637024" y="821237"/>
-            <a:ext cx="1069848" cy="593685"/>
-          </a:xfrm>
-          <a:prstGeom prst="straightConnector1">
-            <a:avLst/>
-          </a:prstGeom>
-          <a:ln>
-            <a:solidFill>
-              <a:srgbClr val="A6A6A6"/>
-            </a:solidFill>
-            <a:tailEnd type="arrow"/>
-          </a:ln>
-          <a:effectLst/>
-        </p:spPr>
-        <p:style>
-          <a:lnRef idx="2">
-            <a:schemeClr val="accent1"/>
-          </a:lnRef>
-          <a:fillRef idx="0">
-            <a:schemeClr val="accent1"/>
-          </a:fillRef>
-          <a:effectRef idx="1">
-            <a:schemeClr val="accent1"/>
-          </a:effectRef>
-          <a:fontRef idx="minor">
-            <a:schemeClr val="tx1"/>
-          </a:fontRef>
-        </p:style>
-      </p:cxnSp>
-      <p:sp>
-        <p:nvSpPr>
-          <p:cNvPr id="25" name="TextBox 24"/>
-          <p:cNvSpPr txBox="1"/>
-          <p:nvPr/>
-        </p:nvSpPr>
-        <p:spPr>
-          <a:xfrm rot="16200000">
-            <a:off x="2028475" y="2671432"/>
-            <a:ext cx="1014370" cy="461665"/>
-          </a:xfrm>
-          <a:prstGeom prst="rect">
-            <a:avLst/>
-          </a:prstGeom>
-          <a:noFill/>
-        </p:spPr>
-        <p:txBody>
-          <a:bodyPr wrap="none" rtlCol="0">
-            <a:spAutoFit/>
-          </a:bodyPr>
-          <a:lstStyle/>
-          <a:p>
-            <a:pPr algn="ctr"/>
-            <a:r>
-              <a:rPr lang="en-US" sz="1200" dirty="0" smtClean="0">
-                <a:solidFill>
-                  <a:srgbClr val="0000FF"/>
-                </a:solidFill>
-                <a:latin typeface="Arial"/>
-                <a:cs typeface="Arial"/>
-              </a:rPr>
-              <a:t>Efficient</a:t>
-            </a:r>
-          </a:p>
-          <a:p>
-            <a:pPr algn="ctr"/>
-            <a:r>
-              <a:rPr lang="en-US" sz="1200" dirty="0">
-                <a:solidFill>
-                  <a:srgbClr val="0000FF"/>
-                </a:solidFill>
-                <a:latin typeface="Arial"/>
-                <a:cs typeface="Arial"/>
-              </a:rPr>
-              <a:t>f</a:t>
-            </a:r>
-            <a:r>
-              <a:rPr lang="en-US" sz="1200" dirty="0" smtClean="0">
-                <a:solidFill>
-                  <a:srgbClr val="0000FF"/>
-                </a:solidFill>
-                <a:latin typeface="Arial"/>
-                <a:cs typeface="Arial"/>
-              </a:rPr>
-              <a:t>actorization</a:t>
-            </a:r>
-          </a:p>
-        </p:txBody>
-      </p:sp>
-      <p:cxnSp>
-        <p:nvCxnSpPr>
-          <p:cNvPr id="22" name="Straight Arrow Connector 21"/>
-          <p:cNvCxnSpPr>
-            <a:stCxn id="12" idx="2"/>
-          </p:cNvCxnSpPr>
-          <p:nvPr/>
-        </p:nvCxnSpPr>
-        <p:spPr>
-          <a:xfrm>
-            <a:off x="3302764" y="4202100"/>
-            <a:ext cx="343950" cy="2238614"/>
-          </a:xfrm>
-          <a:prstGeom prst="straightConnector1">
-            <a:avLst/>
-          </a:prstGeom>
-          <a:ln>
-            <a:solidFill>
-              <a:srgbClr val="0000FF"/>
-            </a:solidFill>
-            <a:prstDash val="dot"/>
-            <a:headEnd type="arrow"/>
-            <a:tailEnd type="arrow"/>
-          </a:ln>
-          <a:effectLst/>
-        </p:spPr>
-        <p:style>
-          <a:lnRef idx="2">
-            <a:schemeClr val="accent1"/>
-          </a:lnRef>
-          <a:fillRef idx="0">
-            <a:schemeClr val="accent1"/>
-          </a:fillRef>
-          <a:effectRef idx="1">
-            <a:schemeClr val="accent1"/>
-          </a:effectRef>
-          <a:fontRef idx="minor">
-            <a:schemeClr val="tx1"/>
-          </a:fontRef>
-        </p:style>
-      </p:cxnSp>
-      <p:sp>
-        <p:nvSpPr>
-          <p:cNvPr id="28" name="TextBox 27"/>
-          <p:cNvSpPr txBox="1"/>
-          <p:nvPr/>
-        </p:nvSpPr>
-        <p:spPr>
-          <a:xfrm>
-            <a:off x="3949634" y="2133858"/>
-            <a:ext cx="1371727" cy="523220"/>
-          </a:xfrm>
-          <a:prstGeom prst="rect">
-            <a:avLst/>
-          </a:prstGeom>
-          <a:noFill/>
-        </p:spPr>
-        <p:txBody>
-          <a:bodyPr wrap="none" rtlCol="0">
-            <a:spAutoFit/>
-          </a:bodyPr>
-          <a:lstStyle/>
-          <a:p>
-            <a:pPr algn="ctr"/>
-            <a:r>
-              <a:rPr lang="en-US" sz="1400" b="1" dirty="0" err="1" smtClean="0">
-                <a:solidFill>
-                  <a:schemeClr val="bg1">
-                    <a:lumMod val="50000"/>
-                  </a:schemeClr>
-                </a:solidFill>
-                <a:latin typeface="Arial"/>
-                <a:cs typeface="Arial"/>
-              </a:rPr>
-              <a:t>Denoising</a:t>
-            </a:r>
-            <a:endParaRPr lang="en-US" sz="1400" b="1" dirty="0" smtClean="0">
-              <a:solidFill>
-                <a:schemeClr val="bg1">
-                  <a:lumMod val="50000"/>
-                </a:schemeClr>
-              </a:solidFill>
-              <a:latin typeface="Arial"/>
-              <a:cs typeface="Arial"/>
-            </a:endParaRPr>
-          </a:p>
-          <a:p>
-            <a:pPr algn="ctr"/>
-            <a:r>
-              <a:rPr lang="en-US" sz="1400" dirty="0" smtClean="0">
-                <a:solidFill>
-                  <a:schemeClr val="bg1">
-                    <a:lumMod val="50000"/>
-                  </a:schemeClr>
-                </a:solidFill>
-                <a:latin typeface="Arial"/>
-                <a:cs typeface="Arial"/>
-              </a:rPr>
-              <a:t>(</a:t>
-            </a:r>
-            <a:r>
-              <a:rPr lang="en-US" sz="1400" dirty="0" err="1" smtClean="0">
-                <a:solidFill>
-                  <a:schemeClr val="bg1">
-                    <a:lumMod val="50000"/>
-                  </a:schemeClr>
-                </a:solidFill>
-                <a:latin typeface="Arial"/>
-                <a:cs typeface="Arial"/>
-              </a:rPr>
-              <a:t>Krisnaswamy</a:t>
-            </a:r>
-            <a:r>
-              <a:rPr lang="en-US" sz="1400" dirty="0" smtClean="0">
-                <a:solidFill>
-                  <a:schemeClr val="bg1">
-                    <a:lumMod val="50000"/>
-                  </a:schemeClr>
-                </a:solidFill>
-                <a:latin typeface="Arial"/>
-                <a:cs typeface="Arial"/>
-              </a:rPr>
-              <a:t>)</a:t>
-            </a:r>
-            <a:endParaRPr lang="en-US" sz="1400" dirty="0">
-              <a:solidFill>
-                <a:schemeClr val="bg1">
-                  <a:lumMod val="50000"/>
-                </a:schemeClr>
-              </a:solidFill>
-              <a:latin typeface="Arial"/>
-              <a:cs typeface="Arial"/>
-            </a:endParaRPr>
-          </a:p>
-        </p:txBody>
-      </p:sp>
-      <p:cxnSp>
-        <p:nvCxnSpPr>
-          <p:cNvPr id="16" name="Straight Arrow Connector 15"/>
-          <p:cNvCxnSpPr>
-            <a:endCxn id="28" idx="1"/>
-          </p:cNvCxnSpPr>
-          <p:nvPr/>
-        </p:nvCxnSpPr>
-        <p:spPr>
-          <a:xfrm>
-            <a:off x="3297711" y="2104571"/>
-            <a:ext cx="651923" cy="290897"/>
-          </a:xfrm>
-          <a:prstGeom prst="straightConnector1">
-            <a:avLst/>
-          </a:prstGeom>
-          <a:ln>
-            <a:solidFill>
-              <a:schemeClr val="bg1">
-                <a:lumMod val="65000"/>
-              </a:schemeClr>
-            </a:solidFill>
-            <a:tailEnd type="arrow"/>
-          </a:ln>
-          <a:effectLst/>
-        </p:spPr>
-        <p:style>
-          <a:lnRef idx="2">
-            <a:schemeClr val="accent1"/>
-          </a:lnRef>
-          <a:fillRef idx="0">
-            <a:schemeClr val="accent1"/>
-          </a:fillRef>
-          <a:effectRef idx="1">
-            <a:schemeClr val="accent1"/>
-          </a:effectRef>
-          <a:fontRef idx="minor">
-            <a:schemeClr val="tx1"/>
-          </a:fontRef>
-        </p:style>
-      </p:cxnSp>
-      <p:sp>
-        <p:nvSpPr>
-          <p:cNvPr id="36" name="TextBox 35"/>
-          <p:cNvSpPr txBox="1"/>
-          <p:nvPr/>
-        </p:nvSpPr>
-        <p:spPr>
-          <a:xfrm>
-            <a:off x="3536799" y="5419564"/>
-            <a:ext cx="2339365" cy="523220"/>
-          </a:xfrm>
-          <a:prstGeom prst="rect">
-            <a:avLst/>
-          </a:prstGeom>
-          <a:noFill/>
-        </p:spPr>
-        <p:txBody>
-          <a:bodyPr wrap="none" rtlCol="0">
-            <a:spAutoFit/>
-          </a:bodyPr>
-          <a:lstStyle/>
-          <a:p>
-            <a:pPr algn="ctr"/>
-            <a:r>
-              <a:rPr lang="en-US" sz="1400" b="1" dirty="0" smtClean="0">
-                <a:solidFill>
-                  <a:schemeClr val="bg1">
-                    <a:lumMod val="50000"/>
-                  </a:schemeClr>
-                </a:solidFill>
-                <a:latin typeface="Arial"/>
-                <a:cs typeface="Arial"/>
-              </a:rPr>
-              <a:t>Biologist</a:t>
-            </a:r>
-            <a:r>
-              <a:rPr lang="en-US" sz="1400" b="1" dirty="0" smtClean="0">
-                <a:solidFill>
-                  <a:schemeClr val="bg1">
-                    <a:lumMod val="50000"/>
-                  </a:schemeClr>
-                </a:solidFill>
-                <a:latin typeface="Arial"/>
-                <a:cs typeface="Arial"/>
-              </a:rPr>
-              <a:t>-facing Interface</a:t>
-            </a:r>
-            <a:endParaRPr lang="en-US" sz="1400" dirty="0" smtClean="0">
-              <a:solidFill>
-                <a:schemeClr val="bg1">
-                  <a:lumMod val="50000"/>
-                </a:schemeClr>
-              </a:solidFill>
-              <a:latin typeface="Arial"/>
-              <a:cs typeface="Arial"/>
-            </a:endParaRPr>
-          </a:p>
-          <a:p>
-            <a:pPr algn="ctr"/>
-            <a:r>
-              <a:rPr lang="en-US" sz="1400" dirty="0" smtClean="0">
-                <a:solidFill>
-                  <a:schemeClr val="bg1">
-                    <a:lumMod val="50000"/>
-                  </a:schemeClr>
-                </a:solidFill>
-                <a:latin typeface="Arial"/>
-                <a:cs typeface="Arial"/>
-              </a:rPr>
-              <a:t>(</a:t>
-            </a:r>
-            <a:r>
-              <a:rPr lang="en-US" sz="1400" dirty="0" err="1" smtClean="0">
-                <a:solidFill>
-                  <a:schemeClr val="bg1">
-                    <a:lumMod val="50000"/>
-                  </a:schemeClr>
-                </a:solidFill>
-                <a:latin typeface="Arial"/>
-                <a:cs typeface="Arial"/>
-              </a:rPr>
-              <a:t>Garmire</a:t>
-            </a:r>
-            <a:r>
-              <a:rPr lang="en-US" sz="1400" dirty="0" smtClean="0">
-                <a:solidFill>
-                  <a:schemeClr val="bg1">
-                    <a:lumMod val="50000"/>
-                  </a:schemeClr>
-                </a:solidFill>
-                <a:latin typeface="Arial"/>
-                <a:cs typeface="Arial"/>
-              </a:rPr>
-              <a:t>)</a:t>
-            </a:r>
-            <a:endParaRPr lang="en-US" sz="1400" dirty="0">
-              <a:solidFill>
-                <a:schemeClr val="bg1">
-                  <a:lumMod val="50000"/>
-                </a:schemeClr>
-              </a:solidFill>
-              <a:latin typeface="Arial"/>
-              <a:cs typeface="Arial"/>
-            </a:endParaRPr>
-          </a:p>
-        </p:txBody>
-      </p:sp>
-      <p:cxnSp>
-        <p:nvCxnSpPr>
-          <p:cNvPr id="42" name="Straight Arrow Connector 41"/>
-          <p:cNvCxnSpPr/>
-          <p:nvPr/>
-        </p:nvCxnSpPr>
-        <p:spPr>
-          <a:xfrm>
-            <a:off x="4702847" y="5901310"/>
-            <a:ext cx="7268" cy="347536"/>
-          </a:xfrm>
-          <a:prstGeom prst="straightConnector1">
-            <a:avLst/>
-          </a:prstGeom>
-          <a:ln>
-            <a:solidFill>
-              <a:srgbClr val="A6A6A6"/>
-            </a:solidFill>
-            <a:tailEnd type="arrow"/>
-          </a:ln>
-          <a:effectLst/>
-        </p:spPr>
-        <p:style>
-          <a:lnRef idx="2">
-            <a:schemeClr val="accent1"/>
-          </a:lnRef>
-          <a:fillRef idx="0">
-            <a:schemeClr val="accent1"/>
-          </a:fillRef>
-          <a:effectRef idx="1">
-            <a:schemeClr val="accent1"/>
-          </a:effectRef>
-          <a:fontRef idx="minor">
-            <a:schemeClr val="tx1"/>
-          </a:fontRef>
-        </p:style>
-      </p:cxnSp>
-      <p:cxnSp>
-        <p:nvCxnSpPr>
-          <p:cNvPr id="53" name="Straight Arrow Connector 52"/>
-          <p:cNvCxnSpPr/>
-          <p:nvPr/>
-        </p:nvCxnSpPr>
-        <p:spPr>
-          <a:xfrm flipH="1">
-            <a:off x="3284162" y="2540000"/>
-            <a:ext cx="665473" cy="0"/>
-          </a:xfrm>
-          <a:prstGeom prst="straightConnector1">
-            <a:avLst/>
-          </a:prstGeom>
-          <a:ln>
-            <a:solidFill>
-              <a:srgbClr val="0000FF"/>
-            </a:solidFill>
-            <a:prstDash val="dot"/>
-            <a:headEnd type="arrow"/>
-            <a:tailEnd type="arrow"/>
-          </a:ln>
-          <a:effectLst/>
-        </p:spPr>
-        <p:style>
-          <a:lnRef idx="2">
-            <a:schemeClr val="accent1"/>
-          </a:lnRef>
-          <a:fillRef idx="0">
-            <a:schemeClr val="accent1"/>
-          </a:fillRef>
-          <a:effectRef idx="1">
-            <a:schemeClr val="accent1"/>
-          </a:effectRef>
-          <a:fontRef idx="minor">
-            <a:schemeClr val="tx1"/>
-          </a:fontRef>
-        </p:style>
-      </p:cxnSp>
+              <a:tailEnd type="arrow"/>
+            </a:ln>
+            <a:effectLst/>
+          </p:spPr>
+          <p:style>
+            <a:lnRef idx="2">
+              <a:schemeClr val="accent1"/>
+            </a:lnRef>
+            <a:fillRef idx="0">
+              <a:schemeClr val="accent1"/>
+            </a:fillRef>
+            <a:effectRef idx="1">
+              <a:schemeClr val="accent1"/>
+            </a:effectRef>
+            <a:fontRef idx="minor">
+              <a:schemeClr val="tx1"/>
+            </a:fontRef>
+          </p:style>
+        </p:cxnSp>
+      </p:grpSp>
     </p:spTree>
     <p:extLst>
       <p:ext uri="{BB962C8B-B14F-4D97-AF65-F5344CB8AC3E}">

</xml_diff>

<commit_message>
small fix to network figure
</commit_message>
<xml_diff>
--- a/CollaborativeNetwork.pptx
+++ b/CollaborativeNetwork.pptx
@@ -3252,19 +3252,7 @@
                   <a:latin typeface="Arial"/>
                   <a:cs typeface="Arial"/>
                 </a:rPr>
-                <a:t>Reproducible </a:t>
-              </a:r>
-              <a:r>
-                <a:rPr lang="en-US" sz="1400" b="1" dirty="0" smtClean="0">
-                  <a:solidFill>
-                    <a:schemeClr val="bg1">
-                      <a:lumMod val="50000"/>
-                    </a:schemeClr>
-                  </a:solidFill>
-                  <a:latin typeface="Arial"/>
-                  <a:cs typeface="Arial"/>
-                </a:rPr>
-                <a:t>Workflows</a:t>
+                <a:t>Reproducible Workflows</a:t>
               </a:r>
             </a:p>
             <a:p>
@@ -3303,19 +3291,7 @@
                   <a:latin typeface="Arial"/>
                   <a:cs typeface="Arial"/>
                 </a:rPr>
-                <a:t> / </a:t>
-              </a:r>
-              <a:r>
-                <a:rPr lang="en-US" sz="1400" dirty="0" smtClean="0">
-                  <a:solidFill>
-                    <a:schemeClr val="bg1">
-                      <a:lumMod val="50000"/>
-                    </a:schemeClr>
-                  </a:solidFill>
-                  <a:latin typeface="Arial"/>
-                  <a:cs typeface="Arial"/>
-                </a:rPr>
-                <a:t>Greene / </a:t>
+                <a:t> / Greene / </a:t>
               </a:r>
               <a:r>
                 <a:rPr lang="en-US" sz="1400" dirty="0" err="1" smtClean="0">
@@ -4136,7 +4112,7 @@
           <p:spPr>
             <a:xfrm>
               <a:off x="4953000" y="2657078"/>
-              <a:ext cx="1682450" cy="868877"/>
+              <a:ext cx="1364950" cy="905195"/>
             </a:xfrm>
             <a:prstGeom prst="straightConnector1">
               <a:avLst/>
@@ -4548,15 +4524,6 @@
                 </a:rPr>
                 <a:t> / Filtering</a:t>
               </a:r>
-              <a:endParaRPr lang="en-US" sz="1400" b="1" dirty="0" smtClean="0">
-                <a:solidFill>
-                  <a:schemeClr val="bg1">
-                    <a:lumMod val="50000"/>
-                  </a:schemeClr>
-                </a:solidFill>
-                <a:latin typeface="Arial"/>
-                <a:cs typeface="Arial"/>
-              </a:endParaRPr>
             </a:p>
             <a:p>
               <a:pPr algn="ctr"/>

</xml_diff>